<commit_message>
add keda and argocd demos
</commit_message>
<xml_diff>
--- a/kubernetes_vol2.pptx
+++ b/kubernetes_vol2.pptx
@@ -5,7 +5,7 @@
     <p:sldMasterId id="2147483648" r:id="rId1"/>
   </p:sldMasterIdLst>
   <p:notesMasterIdLst>
-    <p:notesMasterId r:id="rId18"/>
+    <p:notesMasterId r:id="rId28"/>
   </p:notesMasterIdLst>
   <p:sldIdLst>
     <p:sldId id="270" r:id="rId2"/>
@@ -20,10 +20,20 @@
     <p:sldId id="264" r:id="rId11"/>
     <p:sldId id="265" r:id="rId12"/>
     <p:sldId id="275" r:id="rId13"/>
-    <p:sldId id="259" r:id="rId14"/>
-    <p:sldId id="260" r:id="rId15"/>
-    <p:sldId id="261" r:id="rId16"/>
-    <p:sldId id="262" r:id="rId17"/>
+    <p:sldId id="277" r:id="rId14"/>
+    <p:sldId id="278" r:id="rId15"/>
+    <p:sldId id="279" r:id="rId16"/>
+    <p:sldId id="280" r:id="rId17"/>
+    <p:sldId id="259" r:id="rId18"/>
+    <p:sldId id="288" r:id="rId19"/>
+    <p:sldId id="287" r:id="rId20"/>
+    <p:sldId id="281" r:id="rId21"/>
+    <p:sldId id="282" r:id="rId22"/>
+    <p:sldId id="284" r:id="rId23"/>
+    <p:sldId id="283" r:id="rId24"/>
+    <p:sldId id="285" r:id="rId25"/>
+    <p:sldId id="286" r:id="rId26"/>
+    <p:sldId id="262" r:id="rId27"/>
   </p:sldIdLst>
   <p:sldSz cx="12192000" cy="6858000"/>
   <p:notesSz cx="6858000" cy="9144000"/>
@@ -220,7 +230,7 @@
           <a:p>
             <a:fld id="{DCC8936C-A665-D643-82B2-FBEEA565F87D}" type="datetimeFigureOut">
               <a:rPr lang="en-PL" smtClean="0"/>
-              <a:t>20/10/2025</a:t>
+              <a:t>22/10/2025</a:t>
             </a:fld>
             <a:endParaRPr lang="en-PL"/>
           </a:p>
@@ -553,7 +563,7 @@
           <a:p>
             <a:fld id="{86963E6A-0AE7-3244-B105-59B2DE698F05}" type="slidenum">
               <a:rPr lang="en-PL" smtClean="0"/>
-              <a:t>13</a:t>
+              <a:t>17</a:t>
             </a:fld>
             <a:endParaRPr lang="en-PL"/>
           </a:p>
@@ -563,90 +573,6 @@
     <p:extLst>
       <p:ext uri="{BB962C8B-B14F-4D97-AF65-F5344CB8AC3E}">
         <p14:creationId xmlns:p14="http://schemas.microsoft.com/office/powerpoint/2010/main" val="857860165"/>
-      </p:ext>
-    </p:extLst>
-  </p:cSld>
-  <p:clrMapOvr>
-    <a:masterClrMapping/>
-  </p:clrMapOvr>
-</p:notes>
-</file>
-
-<file path=ppt/notesSlides/notesSlide2.xml><?xml version="1.0" encoding="utf-8"?>
-<p:notes xmlns:a="http://schemas.openxmlformats.org/drawingml/2006/main" xmlns:r="http://schemas.openxmlformats.org/officeDocument/2006/relationships" xmlns:p="http://schemas.openxmlformats.org/presentationml/2006/main">
-  <p:cSld>
-    <p:spTree>
-      <p:nvGrpSpPr>
-        <p:cNvPr id="1" name=""/>
-        <p:cNvGrpSpPr/>
-        <p:nvPr/>
-      </p:nvGrpSpPr>
-      <p:grpSpPr>
-        <a:xfrm>
-          <a:off x="0" y="0"/>
-          <a:ext cx="0" cy="0"/>
-          <a:chOff x="0" y="0"/>
-          <a:chExt cx="0" cy="0"/>
-        </a:xfrm>
-      </p:grpSpPr>
-      <p:sp>
-        <p:nvSpPr>
-          <p:cNvPr id="2" name="Slide Image Placeholder 1"/>
-          <p:cNvSpPr>
-            <a:spLocks noGrp="1" noRot="1" noChangeAspect="1"/>
-          </p:cNvSpPr>
-          <p:nvPr>
-            <p:ph type="sldImg"/>
-          </p:nvPr>
-        </p:nvSpPr>
-        <p:spPr/>
-      </p:sp>
-      <p:sp>
-        <p:nvSpPr>
-          <p:cNvPr id="3" name="Notes Placeholder 2"/>
-          <p:cNvSpPr>
-            <a:spLocks noGrp="1"/>
-          </p:cNvSpPr>
-          <p:nvPr>
-            <p:ph type="body" idx="1"/>
-          </p:nvPr>
-        </p:nvSpPr>
-        <p:spPr/>
-        <p:txBody>
-          <a:bodyPr/>
-          <a:lstStyle/>
-          <a:p>
-            <a:endParaRPr lang="en-PL" dirty="0"/>
-          </a:p>
-        </p:txBody>
-      </p:sp>
-      <p:sp>
-        <p:nvSpPr>
-          <p:cNvPr id="4" name="Slide Number Placeholder 3"/>
-          <p:cNvSpPr>
-            <a:spLocks noGrp="1"/>
-          </p:cNvSpPr>
-          <p:nvPr>
-            <p:ph type="sldNum" sz="quarter" idx="5"/>
-          </p:nvPr>
-        </p:nvSpPr>
-        <p:spPr/>
-        <p:txBody>
-          <a:bodyPr/>
-          <a:lstStyle/>
-          <a:p>
-            <a:fld id="{86963E6A-0AE7-3244-B105-59B2DE698F05}" type="slidenum">
-              <a:rPr lang="en-PL" smtClean="0"/>
-              <a:t>14</a:t>
-            </a:fld>
-            <a:endParaRPr lang="en-PL"/>
-          </a:p>
-        </p:txBody>
-      </p:sp>
-    </p:spTree>
-    <p:extLst>
-      <p:ext uri="{BB962C8B-B14F-4D97-AF65-F5344CB8AC3E}">
-        <p14:creationId xmlns:p14="http://schemas.microsoft.com/office/powerpoint/2010/main" val="2787229468"/>
       </p:ext>
     </p:extLst>
   </p:cSld>
@@ -805,7 +731,7 @@
           <a:p>
             <a:fld id="{F53B405D-6549-0F4F-BB25-72B97A11A2DB}" type="datetimeFigureOut">
               <a:rPr lang="en-PL" smtClean="0"/>
-              <a:t>20/10/2025</a:t>
+              <a:t>22/10/2025</a:t>
             </a:fld>
             <a:endParaRPr lang="en-PL"/>
           </a:p>
@@ -1005,7 +931,7 @@
           <a:p>
             <a:fld id="{F53B405D-6549-0F4F-BB25-72B97A11A2DB}" type="datetimeFigureOut">
               <a:rPr lang="en-PL" smtClean="0"/>
-              <a:t>20/10/2025</a:t>
+              <a:t>22/10/2025</a:t>
             </a:fld>
             <a:endParaRPr lang="en-PL"/>
           </a:p>
@@ -1215,7 +1141,7 @@
           <a:p>
             <a:fld id="{F53B405D-6549-0F4F-BB25-72B97A11A2DB}" type="datetimeFigureOut">
               <a:rPr lang="en-PL" smtClean="0"/>
-              <a:t>20/10/2025</a:t>
+              <a:t>22/10/2025</a:t>
             </a:fld>
             <a:endParaRPr lang="en-PL"/>
           </a:p>
@@ -1415,7 +1341,7 @@
           <a:p>
             <a:fld id="{F53B405D-6549-0F4F-BB25-72B97A11A2DB}" type="datetimeFigureOut">
               <a:rPr lang="en-PL" smtClean="0"/>
-              <a:t>20/10/2025</a:t>
+              <a:t>22/10/2025</a:t>
             </a:fld>
             <a:endParaRPr lang="en-PL"/>
           </a:p>
@@ -1691,7 +1617,7 @@
           <a:p>
             <a:fld id="{F53B405D-6549-0F4F-BB25-72B97A11A2DB}" type="datetimeFigureOut">
               <a:rPr lang="en-PL" smtClean="0"/>
-              <a:t>20/10/2025</a:t>
+              <a:t>22/10/2025</a:t>
             </a:fld>
             <a:endParaRPr lang="en-PL"/>
           </a:p>
@@ -1959,7 +1885,7 @@
           <a:p>
             <a:fld id="{F53B405D-6549-0F4F-BB25-72B97A11A2DB}" type="datetimeFigureOut">
               <a:rPr lang="en-PL" smtClean="0"/>
-              <a:t>20/10/2025</a:t>
+              <a:t>22/10/2025</a:t>
             </a:fld>
             <a:endParaRPr lang="en-PL"/>
           </a:p>
@@ -2374,7 +2300,7 @@
           <a:p>
             <a:fld id="{F53B405D-6549-0F4F-BB25-72B97A11A2DB}" type="datetimeFigureOut">
               <a:rPr lang="en-PL" smtClean="0"/>
-              <a:t>20/10/2025</a:t>
+              <a:t>22/10/2025</a:t>
             </a:fld>
             <a:endParaRPr lang="en-PL"/>
           </a:p>
@@ -2516,7 +2442,7 @@
           <a:p>
             <a:fld id="{F53B405D-6549-0F4F-BB25-72B97A11A2DB}" type="datetimeFigureOut">
               <a:rPr lang="en-PL" smtClean="0"/>
-              <a:t>20/10/2025</a:t>
+              <a:t>22/10/2025</a:t>
             </a:fld>
             <a:endParaRPr lang="en-PL"/>
           </a:p>
@@ -2629,7 +2555,7 @@
           <a:p>
             <a:fld id="{F53B405D-6549-0F4F-BB25-72B97A11A2DB}" type="datetimeFigureOut">
               <a:rPr lang="en-PL" smtClean="0"/>
-              <a:t>20/10/2025</a:t>
+              <a:t>22/10/2025</a:t>
             </a:fld>
             <a:endParaRPr lang="en-PL"/>
           </a:p>
@@ -2942,7 +2868,7 @@
           <a:p>
             <a:fld id="{F53B405D-6549-0F4F-BB25-72B97A11A2DB}" type="datetimeFigureOut">
               <a:rPr lang="en-PL" smtClean="0"/>
-              <a:t>20/10/2025</a:t>
+              <a:t>22/10/2025</a:t>
             </a:fld>
             <a:endParaRPr lang="en-PL"/>
           </a:p>
@@ -3231,7 +3157,7 @@
           <a:p>
             <a:fld id="{F53B405D-6549-0F4F-BB25-72B97A11A2DB}" type="datetimeFigureOut">
               <a:rPr lang="en-PL" smtClean="0"/>
-              <a:t>20/10/2025</a:t>
+              <a:t>22/10/2025</a:t>
             </a:fld>
             <a:endParaRPr lang="en-PL"/>
           </a:p>
@@ -3474,7 +3400,7 @@
           <a:p>
             <a:fld id="{F53B405D-6549-0F4F-BB25-72B97A11A2DB}" type="datetimeFigureOut">
               <a:rPr lang="en-PL" smtClean="0"/>
-              <a:t>20/10/2025</a:t>
+              <a:t>22/10/2025</a:t>
             </a:fld>
             <a:endParaRPr lang="en-PL"/>
           </a:p>
@@ -3914,11 +3840,13 @@
           </a:xfrm>
         </p:spPr>
         <p:txBody>
-          <a:bodyPr/>
-          <a:lstStyle/>
-          <a:p>
-            <a:r>
-              <a:rPr lang="en-PL" dirty="0"/>
+          <a:bodyPr>
+            <a:normAutofit/>
+          </a:bodyPr>
+          <a:lstStyle/>
+          <a:p>
+            <a:r>
+              <a:rPr lang="en-PL" sz="8000" dirty="0"/>
               <a:t>Service</a:t>
             </a:r>
           </a:p>
@@ -4050,35 +3978,163 @@
           <a:bodyPr/>
           <a:lstStyle/>
           <a:p>
-            <a:r>
-              <a:rPr lang="en-PL" dirty="0"/>
-              <a:t>Service Accounts / IRSA</a:t>
-            </a:r>
-          </a:p>
-        </p:txBody>
-      </p:sp>
-      <p:sp>
-        <p:nvSpPr>
-          <p:cNvPr id="3" name="Content Placeholder 2">
-            <a:extLst>
-              <a:ext uri="{FF2B5EF4-FFF2-40B4-BE49-F238E27FC236}">
-                <a16:creationId xmlns:a16="http://schemas.microsoft.com/office/drawing/2014/main" id="{47711457-3509-8E6A-43DA-5FBC486F52C4}"/>
-              </a:ext>
-            </a:extLst>
-          </p:cNvPr>
-          <p:cNvSpPr>
-            <a:spLocks noGrp="1"/>
-          </p:cNvSpPr>
+            <a:pPr algn="ctr"/>
+            <a:r>
+              <a:rPr lang="en-PL" b="1" dirty="0"/>
+              <a:t>IRSA = </a:t>
+            </a:r>
+            <a:r>
+              <a:rPr lang="en-GB" b="1" dirty="0">
+                <a:solidFill>
+                  <a:srgbClr val="FF0000"/>
+                </a:solidFill>
+              </a:rPr>
+              <a:t>I</a:t>
+            </a:r>
+            <a:r>
+              <a:rPr lang="en-GB" b="1" dirty="0"/>
+              <a:t>AM </a:t>
+            </a:r>
+            <a:r>
+              <a:rPr lang="en-GB" b="1" dirty="0">
+                <a:solidFill>
+                  <a:srgbClr val="FF0000"/>
+                </a:solidFill>
+              </a:rPr>
+              <a:t>R</a:t>
+            </a:r>
+            <a:r>
+              <a:rPr lang="en-GB" b="1" dirty="0"/>
+              <a:t>oles for </a:t>
+            </a:r>
+            <a:r>
+              <a:rPr lang="en-GB" b="1" dirty="0">
+                <a:solidFill>
+                  <a:srgbClr val="FF0000"/>
+                </a:solidFill>
+              </a:rPr>
+              <a:t>S</a:t>
+            </a:r>
+            <a:r>
+              <a:rPr lang="en-GB" b="1" dirty="0"/>
+              <a:t>ervice </a:t>
+            </a:r>
+            <a:r>
+              <a:rPr lang="en-GB" b="1" dirty="0">
+                <a:solidFill>
+                  <a:srgbClr val="FF0000"/>
+                </a:solidFill>
+              </a:rPr>
+              <a:t>A</a:t>
+            </a:r>
+            <a:r>
+              <a:rPr lang="en-GB" b="1" dirty="0"/>
+              <a:t>ccounts</a:t>
+            </a:r>
+            <a:endParaRPr lang="en-PL" b="1" dirty="0"/>
+          </a:p>
+        </p:txBody>
+      </p:sp>
+      <p:pic>
+        <p:nvPicPr>
+          <p:cNvPr id="1026" name="Picture 2">
+            <a:extLst>
+              <a:ext uri="{FF2B5EF4-FFF2-40B4-BE49-F238E27FC236}">
+                <a16:creationId xmlns:a16="http://schemas.microsoft.com/office/drawing/2014/main" id="{4B360831-753B-F228-6DD4-78DB1CAC0E25}"/>
+              </a:ext>
+            </a:extLst>
+          </p:cNvPr>
+          <p:cNvPicPr>
+            <a:picLocks noGrp="1" noChangeAspect="1" noChangeArrowheads="1"/>
+          </p:cNvPicPr>
           <p:nvPr>
             <p:ph idx="1"/>
           </p:nvPr>
-        </p:nvSpPr>
-        <p:spPr/>
-        <p:txBody>
-          <a:bodyPr/>
-          <a:lstStyle/>
-          <a:p>
-            <a:endParaRPr lang="en-PL"/>
+        </p:nvPicPr>
+        <p:blipFill>
+          <a:blip r:embed="rId2">
+            <a:extLst>
+              <a:ext uri="{28A0092B-C50C-407E-A947-70E740481C1C}">
+                <a14:useLocalDpi xmlns:a14="http://schemas.microsoft.com/office/drawing/2010/main" val="0"/>
+              </a:ext>
+            </a:extLst>
+          </a:blip>
+          <a:srcRect/>
+          <a:stretch>
+            <a:fillRect/>
+          </a:stretch>
+        </p:blipFill>
+        <p:spPr bwMode="auto">
+          <a:xfrm>
+            <a:off x="2230598" y="1825625"/>
+            <a:ext cx="7730803" cy="4351338"/>
+          </a:xfrm>
+          <a:prstGeom prst="rect">
+            <a:avLst/>
+          </a:prstGeom>
+          <a:noFill/>
+          <a:extLst>
+            <a:ext uri="{909E8E84-426E-40DD-AFC4-6F175D3DCCD1}">
+              <a14:hiddenFill xmlns:a14="http://schemas.microsoft.com/office/drawing/2010/main">
+                <a:solidFill>
+                  <a:srgbClr val="FFFFFF"/>
+                </a:solidFill>
+              </a14:hiddenFill>
+            </a:ext>
+          </a:extLst>
+        </p:spPr>
+      </p:pic>
+      <p:sp>
+        <p:nvSpPr>
+          <p:cNvPr id="4" name="Title 1">
+            <a:extLst>
+              <a:ext uri="{FF2B5EF4-FFF2-40B4-BE49-F238E27FC236}">
+                <a16:creationId xmlns:a16="http://schemas.microsoft.com/office/drawing/2014/main" id="{BD5D4D1B-6929-0FFB-9CA5-EB1BAAA76E26}"/>
+              </a:ext>
+            </a:extLst>
+          </p:cNvPr>
+          <p:cNvSpPr txBox="1">
+            <a:spLocks/>
+          </p:cNvSpPr>
+          <p:nvPr/>
+        </p:nvSpPr>
+        <p:spPr>
+          <a:xfrm>
+            <a:off x="9644742" y="6040380"/>
+            <a:ext cx="1415143" cy="543039"/>
+          </a:xfrm>
+          <a:prstGeom prst="rect">
+            <a:avLst/>
+          </a:prstGeom>
+        </p:spPr>
+        <p:txBody>
+          <a:bodyPr vert="horz" lIns="91440" tIns="45720" rIns="91440" bIns="45720" rtlCol="0" anchor="ctr">
+            <a:normAutofit/>
+          </a:bodyPr>
+          <a:lstStyle>
+            <a:lvl1pPr algn="l" defTabSz="914400" rtl="0" eaLnBrk="1" latinLnBrk="0" hangingPunct="1">
+              <a:lnSpc>
+                <a:spcPct val="90000"/>
+              </a:lnSpc>
+              <a:spcBef>
+                <a:spcPct val="0"/>
+              </a:spcBef>
+              <a:buNone/>
+              <a:defRPr sz="4400" kern="1200">
+                <a:solidFill>
+                  <a:schemeClr val="tx1"/>
+                </a:solidFill>
+                <a:latin typeface="+mj-lt"/>
+                <a:ea typeface="+mj-ea"/>
+                <a:cs typeface="+mj-cs"/>
+              </a:defRPr>
+            </a:lvl1pPr>
+          </a:lstStyle>
+          <a:p>
+            <a:r>
+              <a:rPr lang="en-PL" sz="1200" dirty="0"/>
+              <a:t>Source: [Diagram1]</a:t>
+            </a:r>
           </a:p>
         </p:txBody>
       </p:sp>
@@ -4128,15 +4184,22 @@
             <p:ph type="title"/>
           </p:nvPr>
         </p:nvSpPr>
-        <p:spPr/>
+        <p:spPr>
+          <a:xfrm>
+            <a:off x="838200" y="0"/>
+            <a:ext cx="10515600" cy="1325563"/>
+          </a:xfrm>
+        </p:spPr>
         <p:txBody>
           <a:bodyPr/>
           <a:lstStyle/>
           <a:p>
-            <a:r>
-              <a:rPr lang="en-PL" dirty="0"/>
-              <a:t>TODO</a:t>
-            </a:r>
+            <a:pPr algn="ctr"/>
+            <a:r>
+              <a:rPr lang="en-GB" b="1" dirty="0"/>
+              <a:t>Amazon EKS Pod Identity Webhook</a:t>
+            </a:r>
+            <a:endParaRPr lang="en-PL" dirty="0"/>
           </a:p>
         </p:txBody>
       </p:sp>
@@ -4156,12 +4219,347 @@
             <p:ph idx="1"/>
           </p:nvPr>
         </p:nvSpPr>
-        <p:spPr/>
-        <p:txBody>
-          <a:bodyPr/>
-          <a:lstStyle/>
-          <a:p>
-            <a:endParaRPr lang="en-PL" dirty="0"/>
+        <p:spPr>
+          <a:xfrm>
+            <a:off x="838200" y="1175657"/>
+            <a:ext cx="10341429" cy="5508171"/>
+          </a:xfrm>
+        </p:spPr>
+        <p:txBody>
+          <a:bodyPr>
+            <a:noAutofit/>
+          </a:bodyPr>
+          <a:lstStyle/>
+          <a:p>
+            <a:pPr marL="0" indent="0">
+              <a:buNone/>
+            </a:pPr>
+            <a:r>
+              <a:rPr lang="en-GB" sz="1600" dirty="0" err="1">
+                <a:solidFill>
+                  <a:srgbClr val="FF0000"/>
+                </a:solidFill>
+                <a:latin typeface="Consolas" panose="020B0609020204030204" pitchFamily="49" charset="0"/>
+                <a:cs typeface="Consolas" panose="020B0609020204030204" pitchFamily="49" charset="0"/>
+              </a:rPr>
+              <a:t>ServiceAccount</a:t>
+            </a:r>
+            <a:r>
+              <a:rPr lang="en-GB" sz="1600" dirty="0">
+                <a:solidFill>
+                  <a:srgbClr val="FF0000"/>
+                </a:solidFill>
+                <a:latin typeface="Consolas" panose="020B0609020204030204" pitchFamily="49" charset="0"/>
+                <a:cs typeface="Consolas" panose="020B0609020204030204" pitchFamily="49" charset="0"/>
+              </a:rPr>
+              <a:t> (</a:t>
+            </a:r>
+            <a:r>
+              <a:rPr lang="en-GB" sz="1600" dirty="0" err="1">
+                <a:solidFill>
+                  <a:srgbClr val="FF0000"/>
+                </a:solidFill>
+                <a:latin typeface="Consolas" panose="020B0609020204030204" pitchFamily="49" charset="0"/>
+                <a:cs typeface="Consolas" panose="020B0609020204030204" pitchFamily="49" charset="0"/>
+              </a:rPr>
+              <a:t>sa</a:t>
+            </a:r>
+            <a:r>
+              <a:rPr lang="en-GB" sz="1600" dirty="0">
+                <a:solidFill>
+                  <a:srgbClr val="FF0000"/>
+                </a:solidFill>
+                <a:latin typeface="Consolas" panose="020B0609020204030204" pitchFamily="49" charset="0"/>
+                <a:cs typeface="Consolas" panose="020B0609020204030204" pitchFamily="49" charset="0"/>
+              </a:rPr>
+              <a:t>-test) annotated with:</a:t>
+            </a:r>
+          </a:p>
+          <a:p>
+            <a:pPr marL="0" indent="0">
+              <a:buNone/>
+            </a:pPr>
+            <a:r>
+              <a:rPr lang="en-GB" sz="1600" dirty="0" err="1">
+                <a:latin typeface="Consolas" panose="020B0609020204030204" pitchFamily="49" charset="0"/>
+                <a:cs typeface="Consolas" panose="020B0609020204030204" pitchFamily="49" charset="0"/>
+              </a:rPr>
+              <a:t>eks.amazonaws.com</a:t>
+            </a:r>
+            <a:r>
+              <a:rPr lang="en-GB" sz="1600" dirty="0">
+                <a:latin typeface="Consolas" panose="020B0609020204030204" pitchFamily="49" charset="0"/>
+                <a:cs typeface="Consolas" panose="020B0609020204030204" pitchFamily="49" charset="0"/>
+              </a:rPr>
+              <a:t>/role-</a:t>
+            </a:r>
+            <a:r>
+              <a:rPr lang="en-GB" sz="1600" dirty="0" err="1">
+                <a:latin typeface="Consolas" panose="020B0609020204030204" pitchFamily="49" charset="0"/>
+                <a:cs typeface="Consolas" panose="020B0609020204030204" pitchFamily="49" charset="0"/>
+              </a:rPr>
+              <a:t>arn</a:t>
+            </a:r>
+            <a:r>
+              <a:rPr lang="en-GB" sz="1600" dirty="0">
+                <a:latin typeface="Consolas" panose="020B0609020204030204" pitchFamily="49" charset="0"/>
+                <a:cs typeface="Consolas" panose="020B0609020204030204" pitchFamily="49" charset="0"/>
+              </a:rPr>
+              <a:t>: "</a:t>
+            </a:r>
+            <a:r>
+              <a:rPr lang="en-GB" sz="1600" dirty="0" err="1">
+                <a:latin typeface="Consolas" panose="020B0609020204030204" pitchFamily="49" charset="0"/>
+                <a:cs typeface="Consolas" panose="020B0609020204030204" pitchFamily="49" charset="0"/>
+              </a:rPr>
+              <a:t>arn:aws:iam</a:t>
+            </a:r>
+            <a:r>
+              <a:rPr lang="en-GB" sz="1600" dirty="0">
+                <a:latin typeface="Consolas" panose="020B0609020204030204" pitchFamily="49" charset="0"/>
+                <a:cs typeface="Consolas" panose="020B0609020204030204" pitchFamily="49" charset="0"/>
+              </a:rPr>
+              <a:t>::{account-id}:role/{</a:t>
+            </a:r>
+            <a:r>
+              <a:rPr lang="en-GB" sz="1600" dirty="0" err="1">
+                <a:latin typeface="Consolas" panose="020B0609020204030204" pitchFamily="49" charset="0"/>
+                <a:cs typeface="Consolas" panose="020B0609020204030204" pitchFamily="49" charset="0"/>
+              </a:rPr>
+              <a:t>iam</a:t>
+            </a:r>
+            <a:r>
+              <a:rPr lang="en-GB" sz="1600" dirty="0">
+                <a:latin typeface="Consolas" panose="020B0609020204030204" pitchFamily="49" charset="0"/>
+                <a:cs typeface="Consolas" panose="020B0609020204030204" pitchFamily="49" charset="0"/>
+              </a:rPr>
+              <a:t>-role}"</a:t>
+            </a:r>
+            <a:endParaRPr lang="en-GB" sz="1600" dirty="0">
+              <a:solidFill>
+                <a:srgbClr val="FF0000"/>
+              </a:solidFill>
+              <a:latin typeface="Consolas" panose="020B0609020204030204" pitchFamily="49" charset="0"/>
+              <a:cs typeface="Consolas" panose="020B0609020204030204" pitchFamily="49" charset="0"/>
+            </a:endParaRPr>
+          </a:p>
+          <a:p>
+            <a:pPr marL="0" indent="0">
+              <a:buNone/>
+            </a:pPr>
+            <a:endParaRPr lang="en-GB" sz="1600" dirty="0">
+              <a:solidFill>
+                <a:srgbClr val="FF0000"/>
+              </a:solidFill>
+              <a:latin typeface="Consolas" panose="020B0609020204030204" pitchFamily="49" charset="0"/>
+              <a:cs typeface="Consolas" panose="020B0609020204030204" pitchFamily="49" charset="0"/>
+            </a:endParaRPr>
+          </a:p>
+          <a:p>
+            <a:pPr marL="0" indent="0">
+              <a:buNone/>
+            </a:pPr>
+            <a:r>
+              <a:rPr lang="en-GB" sz="1600" dirty="0">
+                <a:solidFill>
+                  <a:srgbClr val="FF0000"/>
+                </a:solidFill>
+                <a:latin typeface="Consolas" panose="020B0609020204030204" pitchFamily="49" charset="0"/>
+                <a:cs typeface="Consolas" panose="020B0609020204030204" pitchFamily="49" charset="0"/>
+              </a:rPr>
+              <a:t>(new) Pod using:</a:t>
+            </a:r>
+          </a:p>
+          <a:p>
+            <a:pPr marL="0" indent="0">
+              <a:buNone/>
+            </a:pPr>
+            <a:r>
+              <a:rPr lang="en-GB" sz="1600" dirty="0" err="1">
+                <a:latin typeface="Consolas" panose="020B0609020204030204" pitchFamily="49" charset="0"/>
+                <a:cs typeface="Consolas" panose="020B0609020204030204" pitchFamily="49" charset="0"/>
+              </a:rPr>
+              <a:t>spec.serviceAccountName</a:t>
+            </a:r>
+            <a:r>
+              <a:rPr lang="en-GB" sz="1600" dirty="0">
+                <a:latin typeface="Consolas" panose="020B0609020204030204" pitchFamily="49" charset="0"/>
+                <a:cs typeface="Consolas" panose="020B0609020204030204" pitchFamily="49" charset="0"/>
+              </a:rPr>
+              <a:t>: </a:t>
+            </a:r>
+            <a:r>
+              <a:rPr lang="en-GB" sz="1600" dirty="0" err="1">
+                <a:latin typeface="Consolas" panose="020B0609020204030204" pitchFamily="49" charset="0"/>
+                <a:cs typeface="Consolas" panose="020B0609020204030204" pitchFamily="49" charset="0"/>
+              </a:rPr>
+              <a:t>sa</a:t>
+            </a:r>
+            <a:r>
+              <a:rPr lang="en-GB" sz="1600" dirty="0">
+                <a:latin typeface="Consolas" panose="020B0609020204030204" pitchFamily="49" charset="0"/>
+                <a:cs typeface="Consolas" panose="020B0609020204030204" pitchFamily="49" charset="0"/>
+              </a:rPr>
+              <a:t>-test</a:t>
+            </a:r>
+          </a:p>
+          <a:p>
+            <a:pPr marL="0" indent="0">
+              <a:buNone/>
+            </a:pPr>
+            <a:br>
+              <a:rPr lang="en-GB" sz="1600" dirty="0">
+                <a:solidFill>
+                  <a:srgbClr val="FF0000"/>
+                </a:solidFill>
+                <a:latin typeface="Consolas" panose="020B0609020204030204" pitchFamily="49" charset="0"/>
+                <a:cs typeface="Consolas" panose="020B0609020204030204" pitchFamily="49" charset="0"/>
+              </a:rPr>
+            </a:br>
+            <a:r>
+              <a:rPr lang="en-GB" sz="1600" dirty="0">
+                <a:solidFill>
+                  <a:srgbClr val="FF0000"/>
+                </a:solidFill>
+                <a:latin typeface="Consolas" panose="020B0609020204030204" pitchFamily="49" charset="0"/>
+                <a:cs typeface="Consolas" panose="020B0609020204030204" pitchFamily="49" charset="0"/>
+              </a:rPr>
+              <a:t>Injections (by web hook):</a:t>
+            </a:r>
+            <a:endParaRPr lang="en-GB" sz="1600" dirty="0">
+              <a:latin typeface="Consolas" panose="020B0609020204030204" pitchFamily="49" charset="0"/>
+              <a:cs typeface="Consolas" panose="020B0609020204030204" pitchFamily="49" charset="0"/>
+            </a:endParaRPr>
+          </a:p>
+          <a:p>
+            <a:pPr marL="0" indent="0">
+              <a:buNone/>
+            </a:pPr>
+            <a:r>
+              <a:rPr lang="en-GB" sz="1600" dirty="0">
+                <a:latin typeface="Consolas" panose="020B0609020204030204" pitchFamily="49" charset="0"/>
+                <a:cs typeface="Consolas" panose="020B0609020204030204" pitchFamily="49" charset="0"/>
+              </a:rPr>
+              <a:t>Environment variables:</a:t>
+            </a:r>
+          </a:p>
+          <a:p>
+            <a:pPr marL="0" indent="0">
+              <a:buNone/>
+            </a:pPr>
+            <a:r>
+              <a:rPr lang="en-GB" sz="1600" dirty="0">
+                <a:latin typeface="Consolas" panose="020B0609020204030204" pitchFamily="49" charset="0"/>
+                <a:cs typeface="Consolas" panose="020B0609020204030204" pitchFamily="49" charset="0"/>
+              </a:rPr>
+              <a:t>	- AWS_DEFAULT_REGION</a:t>
+            </a:r>
+          </a:p>
+          <a:p>
+            <a:pPr marL="0" indent="0">
+              <a:buNone/>
+            </a:pPr>
+            <a:r>
+              <a:rPr lang="en-GB" sz="1600" dirty="0">
+                <a:latin typeface="Consolas" panose="020B0609020204030204" pitchFamily="49" charset="0"/>
+                <a:cs typeface="Consolas" panose="020B0609020204030204" pitchFamily="49" charset="0"/>
+              </a:rPr>
+              <a:t>	- AWS_REGION</a:t>
+            </a:r>
+          </a:p>
+          <a:p>
+            <a:pPr marL="0" indent="0">
+              <a:buNone/>
+            </a:pPr>
+            <a:r>
+              <a:rPr lang="en-GB" sz="1600" dirty="0">
+                <a:latin typeface="Consolas" panose="020B0609020204030204" pitchFamily="49" charset="0"/>
+                <a:cs typeface="Consolas" panose="020B0609020204030204" pitchFamily="49" charset="0"/>
+              </a:rPr>
+              <a:t>	- AWS_ROLE_ARN</a:t>
+            </a:r>
+          </a:p>
+          <a:p>
+            <a:pPr marL="0" indent="0">
+              <a:buNone/>
+            </a:pPr>
+            <a:r>
+              <a:rPr lang="en-GB" sz="1600" dirty="0">
+                <a:latin typeface="Consolas" panose="020B0609020204030204" pitchFamily="49" charset="0"/>
+                <a:cs typeface="Consolas" panose="020B0609020204030204" pitchFamily="49" charset="0"/>
+              </a:rPr>
+              <a:t>	- AWS_WEB_IDENTITY_TOKEN_FILE</a:t>
+            </a:r>
+          </a:p>
+          <a:p>
+            <a:pPr marL="0" indent="0">
+              <a:buNone/>
+            </a:pPr>
+            <a:r>
+              <a:rPr lang="en-GB" sz="1600" dirty="0">
+                <a:latin typeface="Consolas" panose="020B0609020204030204" pitchFamily="49" charset="0"/>
+                <a:cs typeface="Consolas" panose="020B0609020204030204" pitchFamily="49" charset="0"/>
+              </a:rPr>
+              <a:t>	- AWS_STS_REGIONAL_ENDPOINTS</a:t>
+            </a:r>
+          </a:p>
+          <a:p>
+            <a:pPr marL="0" indent="0">
+              <a:buNone/>
+            </a:pPr>
+            <a:r>
+              <a:rPr lang="en-GB" sz="1600" dirty="0">
+                <a:latin typeface="Consolas" panose="020B0609020204030204" pitchFamily="49" charset="0"/>
+                <a:cs typeface="Consolas" panose="020B0609020204030204" pitchFamily="49" charset="0"/>
+              </a:rPr>
+              <a:t>Volumes:</a:t>
+            </a:r>
+          </a:p>
+          <a:p>
+            <a:pPr marL="0" indent="0">
+              <a:buNone/>
+            </a:pPr>
+            <a:r>
+              <a:rPr lang="en-GB" sz="1600" dirty="0">
+                <a:latin typeface="Consolas" panose="020B0609020204030204" pitchFamily="49" charset="0"/>
+                <a:cs typeface="Consolas" panose="020B0609020204030204" pitchFamily="49" charset="0"/>
+              </a:rPr>
+              <a:t>    - var/run/secrets/</a:t>
+            </a:r>
+            <a:r>
+              <a:rPr lang="en-GB" sz="1600" dirty="0" err="1">
+                <a:latin typeface="Consolas" panose="020B0609020204030204" pitchFamily="49" charset="0"/>
+                <a:cs typeface="Consolas" panose="020B0609020204030204" pitchFamily="49" charset="0"/>
+              </a:rPr>
+              <a:t>eks.amazonaws.com</a:t>
+            </a:r>
+            <a:r>
+              <a:rPr lang="en-GB" sz="1600" dirty="0">
+                <a:latin typeface="Consolas" panose="020B0609020204030204" pitchFamily="49" charset="0"/>
+                <a:cs typeface="Consolas" panose="020B0609020204030204" pitchFamily="49" charset="0"/>
+              </a:rPr>
+              <a:t>/</a:t>
+            </a:r>
+            <a:r>
+              <a:rPr lang="en-GB" sz="1600" dirty="0" err="1">
+                <a:latin typeface="Consolas" panose="020B0609020204030204" pitchFamily="49" charset="0"/>
+                <a:cs typeface="Consolas" panose="020B0609020204030204" pitchFamily="49" charset="0"/>
+              </a:rPr>
+              <a:t>serviceaccount</a:t>
+            </a:r>
+            <a:r>
+              <a:rPr lang="en-GB" sz="1600" dirty="0">
+                <a:latin typeface="Consolas" panose="020B0609020204030204" pitchFamily="49" charset="0"/>
+                <a:cs typeface="Consolas" panose="020B0609020204030204" pitchFamily="49" charset="0"/>
+              </a:rPr>
+              <a:t>/token</a:t>
+            </a:r>
+          </a:p>
+          <a:p>
+            <a:endParaRPr lang="en-PL" sz="2000" dirty="0">
+              <a:latin typeface="Consolas" panose="020B0609020204030204" pitchFamily="49" charset="0"/>
+              <a:cs typeface="Consolas" panose="020B0609020204030204" pitchFamily="49" charset="0"/>
+            </a:endParaRPr>
           </a:p>
         </p:txBody>
       </p:sp>
@@ -4197,54 +4595,711 @@
       </p:grpSpPr>
       <p:sp>
         <p:nvSpPr>
-          <p:cNvPr id="2" name="Title 1">
-            <a:extLst>
-              <a:ext uri="{FF2B5EF4-FFF2-40B4-BE49-F238E27FC236}">
-                <a16:creationId xmlns:a16="http://schemas.microsoft.com/office/drawing/2014/main" id="{50D2AD80-9719-1CA8-C9C7-6BEA2E6E50C9}"/>
-              </a:ext>
-            </a:extLst>
-          </p:cNvPr>
-          <p:cNvSpPr>
-            <a:spLocks noGrp="1"/>
-          </p:cNvSpPr>
-          <p:nvPr>
-            <p:ph type="title"/>
-          </p:nvPr>
-        </p:nvSpPr>
-        <p:spPr/>
-        <p:txBody>
-          <a:bodyPr/>
-          <a:lstStyle/>
-          <a:p>
-            <a:endParaRPr lang="en-PL" dirty="0"/>
-          </a:p>
-        </p:txBody>
-      </p:sp>
-      <p:sp>
-        <p:nvSpPr>
-          <p:cNvPr id="3" name="Content Placeholder 2">
-            <a:extLst>
-              <a:ext uri="{FF2B5EF4-FFF2-40B4-BE49-F238E27FC236}">
-                <a16:creationId xmlns:a16="http://schemas.microsoft.com/office/drawing/2014/main" id="{8332D87A-4160-607D-7AC0-DB6731117C1D}"/>
-              </a:ext>
-            </a:extLst>
-          </p:cNvPr>
-          <p:cNvSpPr>
-            <a:spLocks noGrp="1"/>
-          </p:cNvSpPr>
-          <p:nvPr>
-            <p:ph idx="1"/>
-          </p:nvPr>
-        </p:nvSpPr>
-        <p:spPr/>
-        <p:txBody>
-          <a:bodyPr/>
-          <a:lstStyle/>
-          <a:p>
-            <a:endParaRPr lang="en-PL"/>
-          </a:p>
-        </p:txBody>
-      </p:sp>
+          <p:cNvPr id="5" name="TextBox 4">
+            <a:extLst>
+              <a:ext uri="{FF2B5EF4-FFF2-40B4-BE49-F238E27FC236}">
+                <a16:creationId xmlns:a16="http://schemas.microsoft.com/office/drawing/2014/main" id="{709AEAE0-23B0-2E36-7497-538BA5EC74AE}"/>
+              </a:ext>
+            </a:extLst>
+          </p:cNvPr>
+          <p:cNvSpPr txBox="1"/>
+          <p:nvPr/>
+        </p:nvSpPr>
+        <p:spPr>
+          <a:xfrm>
+            <a:off x="740228" y="977988"/>
+            <a:ext cx="10189029" cy="1754326"/>
+          </a:xfrm>
+          <a:prstGeom prst="rect">
+            <a:avLst/>
+          </a:prstGeom>
+          <a:solidFill>
+            <a:schemeClr val="tx1">
+              <a:lumMod val="85000"/>
+              <a:lumOff val="15000"/>
+            </a:schemeClr>
+          </a:solidFill>
+        </p:spPr>
+        <p:txBody>
+          <a:bodyPr wrap="square">
+            <a:spAutoFit/>
+          </a:bodyPr>
+          <a:lstStyle/>
+          <a:p>
+            <a:pPr>
+              <a:buNone/>
+            </a:pPr>
+            <a:r>
+              <a:rPr lang="en-GB" sz="1800" dirty="0" err="1">
+                <a:solidFill>
+                  <a:srgbClr val="CF8E6D"/>
+                </a:solidFill>
+                <a:effectLst/>
+                <a:latin typeface="Consolas" panose="020B0609020204030204" pitchFamily="49" charset="0"/>
+                <a:cs typeface="Consolas" panose="020B0609020204030204" pitchFamily="49" charset="0"/>
+              </a:rPr>
+              <a:t>val</a:t>
+            </a:r>
+            <a:r>
+              <a:rPr lang="en-GB" sz="1800" dirty="0">
+                <a:solidFill>
+                  <a:srgbClr val="CF8E6D"/>
+                </a:solidFill>
+                <a:effectLst/>
+                <a:latin typeface="Consolas" panose="020B0609020204030204" pitchFamily="49" charset="0"/>
+                <a:cs typeface="Consolas" panose="020B0609020204030204" pitchFamily="49" charset="0"/>
+              </a:rPr>
+              <a:t> </a:t>
+            </a:r>
+            <a:r>
+              <a:rPr lang="en-GB" sz="1800" dirty="0">
+                <a:solidFill>
+                  <a:srgbClr val="BCBEC4"/>
+                </a:solidFill>
+                <a:effectLst/>
+                <a:latin typeface="Consolas" panose="020B0609020204030204" pitchFamily="49" charset="0"/>
+                <a:cs typeface="Consolas" panose="020B0609020204030204" pitchFamily="49" charset="0"/>
+              </a:rPr>
+              <a:t>client = S3Client</a:t>
+            </a:r>
+            <a:br>
+              <a:rPr lang="en-GB" sz="1800" dirty="0">
+                <a:solidFill>
+                  <a:srgbClr val="BCBEC4"/>
+                </a:solidFill>
+                <a:effectLst/>
+                <a:latin typeface="Consolas" panose="020B0609020204030204" pitchFamily="49" charset="0"/>
+                <a:cs typeface="Consolas" panose="020B0609020204030204" pitchFamily="49" charset="0"/>
+              </a:rPr>
+            </a:br>
+            <a:r>
+              <a:rPr lang="en-GB" sz="1800" dirty="0">
+                <a:solidFill>
+                  <a:srgbClr val="BCBEC4"/>
+                </a:solidFill>
+                <a:effectLst/>
+                <a:latin typeface="Consolas" panose="020B0609020204030204" pitchFamily="49" charset="0"/>
+                <a:cs typeface="Consolas" panose="020B0609020204030204" pitchFamily="49" charset="0"/>
+              </a:rPr>
+              <a:t>    .builder().</a:t>
+            </a:r>
+            <a:r>
+              <a:rPr lang="en-GB" sz="1800" dirty="0" err="1">
+                <a:solidFill>
+                  <a:srgbClr val="BCBEC4"/>
+                </a:solidFill>
+                <a:effectLst/>
+                <a:latin typeface="Consolas" panose="020B0609020204030204" pitchFamily="49" charset="0"/>
+                <a:cs typeface="Consolas" panose="020B0609020204030204" pitchFamily="49" charset="0"/>
+              </a:rPr>
+              <a:t>credentialsProvider</a:t>
+            </a:r>
+            <a:r>
+              <a:rPr lang="en-GB" sz="1800" dirty="0">
+                <a:solidFill>
+                  <a:srgbClr val="BCBEC4"/>
+                </a:solidFill>
+                <a:effectLst/>
+                <a:latin typeface="Consolas" panose="020B0609020204030204" pitchFamily="49" charset="0"/>
+                <a:cs typeface="Consolas" panose="020B0609020204030204" pitchFamily="49" charset="0"/>
+              </a:rPr>
+              <a:t>(</a:t>
+            </a:r>
+            <a:br>
+              <a:rPr lang="en-GB" sz="1800" dirty="0">
+                <a:solidFill>
+                  <a:srgbClr val="BCBEC4"/>
+                </a:solidFill>
+                <a:effectLst/>
+                <a:latin typeface="Consolas" panose="020B0609020204030204" pitchFamily="49" charset="0"/>
+                <a:cs typeface="Consolas" panose="020B0609020204030204" pitchFamily="49" charset="0"/>
+              </a:rPr>
+            </a:br>
+            <a:r>
+              <a:rPr lang="en-GB" sz="1800" dirty="0">
+                <a:solidFill>
+                  <a:srgbClr val="BCBEC4"/>
+                </a:solidFill>
+                <a:effectLst/>
+                <a:latin typeface="Consolas" panose="020B0609020204030204" pitchFamily="49" charset="0"/>
+                <a:cs typeface="Consolas" panose="020B0609020204030204" pitchFamily="49" charset="0"/>
+              </a:rPr>
+              <a:t>        </a:t>
+            </a:r>
+            <a:r>
+              <a:rPr lang="en-GB" sz="1800" dirty="0" err="1">
+                <a:solidFill>
+                  <a:srgbClr val="BCBEC4"/>
+                </a:solidFill>
+                <a:effectLst/>
+                <a:latin typeface="Consolas" panose="020B0609020204030204" pitchFamily="49" charset="0"/>
+                <a:cs typeface="Consolas" panose="020B0609020204030204" pitchFamily="49" charset="0"/>
+              </a:rPr>
+              <a:t>StsAssumeRoleWithWebIdentityCredentialsProvider.builder</a:t>
+            </a:r>
+            <a:r>
+              <a:rPr lang="en-GB" sz="1800" dirty="0">
+                <a:solidFill>
+                  <a:srgbClr val="BCBEC4"/>
+                </a:solidFill>
+                <a:effectLst/>
+                <a:latin typeface="Consolas" panose="020B0609020204030204" pitchFamily="49" charset="0"/>
+                <a:cs typeface="Consolas" panose="020B0609020204030204" pitchFamily="49" charset="0"/>
+              </a:rPr>
+              <a:t>().build()</a:t>
+            </a:r>
+            <a:br>
+              <a:rPr lang="en-GB" sz="1800" dirty="0">
+                <a:solidFill>
+                  <a:srgbClr val="BCBEC4"/>
+                </a:solidFill>
+                <a:effectLst/>
+                <a:latin typeface="Consolas" panose="020B0609020204030204" pitchFamily="49" charset="0"/>
+                <a:cs typeface="Consolas" panose="020B0609020204030204" pitchFamily="49" charset="0"/>
+              </a:rPr>
+            </a:br>
+            <a:r>
+              <a:rPr lang="en-GB" sz="1800" dirty="0">
+                <a:solidFill>
+                  <a:srgbClr val="BCBEC4"/>
+                </a:solidFill>
+                <a:effectLst/>
+                <a:latin typeface="Consolas" panose="020B0609020204030204" pitchFamily="49" charset="0"/>
+                <a:cs typeface="Consolas" panose="020B0609020204030204" pitchFamily="49" charset="0"/>
+              </a:rPr>
+              <a:t>    )</a:t>
+            </a:r>
+            <a:br>
+              <a:rPr lang="en-GB" sz="1800" dirty="0">
+                <a:solidFill>
+                  <a:srgbClr val="BCBEC4"/>
+                </a:solidFill>
+                <a:effectLst/>
+                <a:latin typeface="Consolas" panose="020B0609020204030204" pitchFamily="49" charset="0"/>
+                <a:cs typeface="Consolas" panose="020B0609020204030204" pitchFamily="49" charset="0"/>
+              </a:rPr>
+            </a:br>
+            <a:r>
+              <a:rPr lang="en-GB" sz="1800" dirty="0">
+                <a:solidFill>
+                  <a:srgbClr val="BCBEC4"/>
+                </a:solidFill>
+                <a:effectLst/>
+                <a:latin typeface="Consolas" panose="020B0609020204030204" pitchFamily="49" charset="0"/>
+                <a:cs typeface="Consolas" panose="020B0609020204030204" pitchFamily="49" charset="0"/>
+              </a:rPr>
+              <a:t>    .region(</a:t>
+            </a:r>
+            <a:r>
+              <a:rPr lang="en-GB" sz="1800" i="1" dirty="0">
+                <a:solidFill>
+                  <a:srgbClr val="C77DBB"/>
+                </a:solidFill>
+                <a:effectLst/>
+                <a:latin typeface="Consolas" panose="020B0609020204030204" pitchFamily="49" charset="0"/>
+                <a:cs typeface="Consolas" panose="020B0609020204030204" pitchFamily="49" charset="0"/>
+              </a:rPr>
+              <a:t>US_EAST_1</a:t>
+            </a:r>
+            <a:r>
+              <a:rPr lang="en-GB" sz="1800" dirty="0">
+                <a:solidFill>
+                  <a:srgbClr val="BCBEC4"/>
+                </a:solidFill>
+                <a:effectLst/>
+                <a:latin typeface="Consolas" panose="020B0609020204030204" pitchFamily="49" charset="0"/>
+                <a:cs typeface="Consolas" panose="020B0609020204030204" pitchFamily="49" charset="0"/>
+              </a:rPr>
+              <a:t>)</a:t>
+            </a:r>
+            <a:br>
+              <a:rPr lang="en-GB" sz="1800" dirty="0">
+                <a:solidFill>
+                  <a:srgbClr val="BCBEC4"/>
+                </a:solidFill>
+                <a:effectLst/>
+                <a:latin typeface="Consolas" panose="020B0609020204030204" pitchFamily="49" charset="0"/>
+                <a:cs typeface="Consolas" panose="020B0609020204030204" pitchFamily="49" charset="0"/>
+              </a:rPr>
+            </a:br>
+            <a:r>
+              <a:rPr lang="en-GB" sz="1800" dirty="0">
+                <a:solidFill>
+                  <a:srgbClr val="BCBEC4"/>
+                </a:solidFill>
+                <a:effectLst/>
+                <a:latin typeface="Consolas" panose="020B0609020204030204" pitchFamily="49" charset="0"/>
+                <a:cs typeface="Consolas" panose="020B0609020204030204" pitchFamily="49" charset="0"/>
+              </a:rPr>
+              <a:t>    .build()</a:t>
+            </a:r>
+          </a:p>
+        </p:txBody>
+      </p:sp>
+      <p:sp>
+        <p:nvSpPr>
+          <p:cNvPr id="8" name="TextBox 7">
+            <a:extLst>
+              <a:ext uri="{FF2B5EF4-FFF2-40B4-BE49-F238E27FC236}">
+                <a16:creationId xmlns:a16="http://schemas.microsoft.com/office/drawing/2014/main" id="{21DB96C3-043F-2A07-5EFE-216F567621F4}"/>
+              </a:ext>
+            </a:extLst>
+          </p:cNvPr>
+          <p:cNvSpPr txBox="1"/>
+          <p:nvPr/>
+        </p:nvSpPr>
+        <p:spPr>
+          <a:xfrm>
+            <a:off x="370114" y="3777344"/>
+            <a:ext cx="10711542" cy="1384995"/>
+          </a:xfrm>
+          <a:prstGeom prst="rect">
+            <a:avLst/>
+          </a:prstGeom>
+          <a:solidFill>
+            <a:schemeClr val="tx1">
+              <a:lumMod val="85000"/>
+              <a:lumOff val="15000"/>
+            </a:schemeClr>
+          </a:solidFill>
+        </p:spPr>
+        <p:txBody>
+          <a:bodyPr wrap="square">
+            <a:spAutoFit/>
+          </a:bodyPr>
+          <a:lstStyle/>
+          <a:p>
+            <a:pPr>
+              <a:buNone/>
+            </a:pPr>
+            <a:r>
+              <a:rPr lang="en-GB" sz="1400" dirty="0">
+                <a:solidFill>
+                  <a:srgbClr val="CF8E6D"/>
+                </a:solidFill>
+                <a:effectLst/>
+                <a:latin typeface="Consolas" panose="020B0609020204030204" pitchFamily="49" charset="0"/>
+                <a:cs typeface="Consolas" panose="020B0609020204030204" pitchFamily="49" charset="0"/>
+              </a:rPr>
+              <a:t>private </a:t>
+            </a:r>
+            <a:r>
+              <a:rPr lang="en-GB" sz="1400" dirty="0" err="1">
+                <a:solidFill>
+                  <a:srgbClr val="56A8F5"/>
+                </a:solidFill>
+                <a:effectLst/>
+                <a:latin typeface="Consolas" panose="020B0609020204030204" pitchFamily="49" charset="0"/>
+                <a:cs typeface="Consolas" panose="020B0609020204030204" pitchFamily="49" charset="0"/>
+              </a:rPr>
+              <a:t>StsWebIdentityTokenFileCredentialsProvider</a:t>
+            </a:r>
+            <a:r>
+              <a:rPr lang="en-GB" sz="1400" dirty="0">
+                <a:solidFill>
+                  <a:srgbClr val="BCBEC4"/>
+                </a:solidFill>
+                <a:effectLst/>
+                <a:latin typeface="Consolas" panose="020B0609020204030204" pitchFamily="49" charset="0"/>
+                <a:cs typeface="Consolas" panose="020B0609020204030204" pitchFamily="49" charset="0"/>
+              </a:rPr>
+              <a:t>(Builder builder) {</a:t>
+            </a:r>
+            <a:br>
+              <a:rPr lang="en-GB" sz="1400" dirty="0">
+                <a:solidFill>
+                  <a:srgbClr val="BCBEC4"/>
+                </a:solidFill>
+                <a:effectLst/>
+                <a:latin typeface="Consolas" panose="020B0609020204030204" pitchFamily="49" charset="0"/>
+                <a:cs typeface="Consolas" panose="020B0609020204030204" pitchFamily="49" charset="0"/>
+              </a:rPr>
+            </a:br>
+            <a:r>
+              <a:rPr lang="en-GB" sz="1400" dirty="0">
+                <a:solidFill>
+                  <a:srgbClr val="BCBEC4"/>
+                </a:solidFill>
+                <a:effectLst/>
+                <a:latin typeface="Consolas" panose="020B0609020204030204" pitchFamily="49" charset="0"/>
+                <a:cs typeface="Consolas" panose="020B0609020204030204" pitchFamily="49" charset="0"/>
+              </a:rPr>
+              <a:t>    </a:t>
+            </a:r>
+            <a:r>
+              <a:rPr lang="en-GB" sz="1400" dirty="0">
+                <a:solidFill>
+                  <a:srgbClr val="CF8E6D"/>
+                </a:solidFill>
+                <a:effectLst/>
+                <a:latin typeface="Consolas" panose="020B0609020204030204" pitchFamily="49" charset="0"/>
+                <a:cs typeface="Consolas" panose="020B0609020204030204" pitchFamily="49" charset="0"/>
+              </a:rPr>
+              <a:t>super</a:t>
+            </a:r>
+            <a:r>
+              <a:rPr lang="en-GB" sz="1400" dirty="0">
+                <a:solidFill>
+                  <a:srgbClr val="BCBEC4"/>
+                </a:solidFill>
+                <a:effectLst/>
+                <a:latin typeface="Consolas" panose="020B0609020204030204" pitchFamily="49" charset="0"/>
+                <a:cs typeface="Consolas" panose="020B0609020204030204" pitchFamily="49" charset="0"/>
+              </a:rPr>
+              <a:t>(builder, </a:t>
+            </a:r>
+            <a:r>
+              <a:rPr lang="en-GB" sz="1400" dirty="0">
+                <a:solidFill>
+                  <a:srgbClr val="6AAB73"/>
+                </a:solidFill>
+                <a:effectLst/>
+                <a:latin typeface="Consolas" panose="020B0609020204030204" pitchFamily="49" charset="0"/>
+                <a:cs typeface="Consolas" panose="020B0609020204030204" pitchFamily="49" charset="0"/>
+              </a:rPr>
+              <a:t>"</a:t>
+            </a:r>
+            <a:r>
+              <a:rPr lang="en-GB" sz="1400" dirty="0" err="1">
+                <a:solidFill>
+                  <a:srgbClr val="6AAB73"/>
+                </a:solidFill>
+                <a:effectLst/>
+                <a:latin typeface="Consolas" panose="020B0609020204030204" pitchFamily="49" charset="0"/>
+                <a:cs typeface="Consolas" panose="020B0609020204030204" pitchFamily="49" charset="0"/>
+              </a:rPr>
+              <a:t>sts</a:t>
+            </a:r>
+            <a:r>
+              <a:rPr lang="en-GB" sz="1400" dirty="0">
+                <a:solidFill>
+                  <a:srgbClr val="6AAB73"/>
+                </a:solidFill>
+                <a:effectLst/>
+                <a:latin typeface="Consolas" panose="020B0609020204030204" pitchFamily="49" charset="0"/>
+                <a:cs typeface="Consolas" panose="020B0609020204030204" pitchFamily="49" charset="0"/>
+              </a:rPr>
+              <a:t>-assume-role-with-web-identity-credentials-provider"</a:t>
+            </a:r>
+            <a:r>
+              <a:rPr lang="en-GB" sz="1400" dirty="0">
+                <a:solidFill>
+                  <a:srgbClr val="BCBEC4"/>
+                </a:solidFill>
+                <a:effectLst/>
+                <a:latin typeface="Consolas" panose="020B0609020204030204" pitchFamily="49" charset="0"/>
+                <a:cs typeface="Consolas" panose="020B0609020204030204" pitchFamily="49" charset="0"/>
+              </a:rPr>
+              <a:t>);</a:t>
+            </a:r>
+            <a:br>
+              <a:rPr lang="en-GB" sz="1400" dirty="0">
+                <a:solidFill>
+                  <a:srgbClr val="BCBEC4"/>
+                </a:solidFill>
+                <a:effectLst/>
+                <a:latin typeface="Consolas" panose="020B0609020204030204" pitchFamily="49" charset="0"/>
+                <a:cs typeface="Consolas" panose="020B0609020204030204" pitchFamily="49" charset="0"/>
+              </a:rPr>
+            </a:br>
+            <a:r>
+              <a:rPr lang="en-GB" sz="1400" dirty="0">
+                <a:solidFill>
+                  <a:srgbClr val="BCBEC4"/>
+                </a:solidFill>
+                <a:effectLst/>
+                <a:latin typeface="Consolas" panose="020B0609020204030204" pitchFamily="49" charset="0"/>
+                <a:cs typeface="Consolas" panose="020B0609020204030204" pitchFamily="49" charset="0"/>
+              </a:rPr>
+              <a:t>    Path </a:t>
+            </a:r>
+            <a:r>
+              <a:rPr lang="en-GB" sz="1400" dirty="0" err="1">
+                <a:solidFill>
+                  <a:srgbClr val="BCBEC4"/>
+                </a:solidFill>
+                <a:effectLst/>
+                <a:latin typeface="Consolas" panose="020B0609020204030204" pitchFamily="49" charset="0"/>
+                <a:cs typeface="Consolas" panose="020B0609020204030204" pitchFamily="49" charset="0"/>
+              </a:rPr>
+              <a:t>webIdentityTokenFile</a:t>
+            </a:r>
+            <a:r>
+              <a:rPr lang="en-GB" sz="1400" dirty="0">
+                <a:solidFill>
+                  <a:srgbClr val="BCBEC4"/>
+                </a:solidFill>
+                <a:effectLst/>
+                <a:latin typeface="Consolas" panose="020B0609020204030204" pitchFamily="49" charset="0"/>
+                <a:cs typeface="Consolas" panose="020B0609020204030204" pitchFamily="49" charset="0"/>
+              </a:rPr>
+              <a:t> =</a:t>
+            </a:r>
+            <a:br>
+              <a:rPr lang="en-GB" sz="1400" dirty="0">
+                <a:solidFill>
+                  <a:srgbClr val="BCBEC4"/>
+                </a:solidFill>
+                <a:effectLst/>
+                <a:latin typeface="Consolas" panose="020B0609020204030204" pitchFamily="49" charset="0"/>
+                <a:cs typeface="Consolas" panose="020B0609020204030204" pitchFamily="49" charset="0"/>
+              </a:rPr>
+            </a:br>
+            <a:r>
+              <a:rPr lang="en-GB" sz="1400" dirty="0">
+                <a:solidFill>
+                  <a:srgbClr val="BCBEC4"/>
+                </a:solidFill>
+                <a:effectLst/>
+                <a:latin typeface="Consolas" panose="020B0609020204030204" pitchFamily="49" charset="0"/>
+                <a:cs typeface="Consolas" panose="020B0609020204030204" pitchFamily="49" charset="0"/>
+              </a:rPr>
+              <a:t>        </a:t>
+            </a:r>
+            <a:r>
+              <a:rPr lang="en-GB" sz="1400" dirty="0" err="1">
+                <a:solidFill>
+                  <a:srgbClr val="BCBEC4"/>
+                </a:solidFill>
+                <a:effectLst/>
+                <a:latin typeface="Consolas" panose="020B0609020204030204" pitchFamily="49" charset="0"/>
+                <a:cs typeface="Consolas" panose="020B0609020204030204" pitchFamily="49" charset="0"/>
+              </a:rPr>
+              <a:t>builder.</a:t>
+            </a:r>
+            <a:r>
+              <a:rPr lang="en-GB" sz="1400" dirty="0" err="1">
+                <a:solidFill>
+                  <a:srgbClr val="C77DBB"/>
+                </a:solidFill>
+                <a:effectLst/>
+                <a:latin typeface="Consolas" panose="020B0609020204030204" pitchFamily="49" charset="0"/>
+                <a:cs typeface="Consolas" panose="020B0609020204030204" pitchFamily="49" charset="0"/>
+              </a:rPr>
+              <a:t>webIdentityTokenFile</a:t>
+            </a:r>
+            <a:r>
+              <a:rPr lang="en-GB" sz="1400" dirty="0">
+                <a:solidFill>
+                  <a:srgbClr val="C77DBB"/>
+                </a:solidFill>
+                <a:effectLst/>
+                <a:latin typeface="Consolas" panose="020B0609020204030204" pitchFamily="49" charset="0"/>
+                <a:cs typeface="Consolas" panose="020B0609020204030204" pitchFamily="49" charset="0"/>
+              </a:rPr>
+              <a:t> </a:t>
+            </a:r>
+            <a:r>
+              <a:rPr lang="en-GB" sz="1400" dirty="0">
+                <a:solidFill>
+                  <a:srgbClr val="BCBEC4"/>
+                </a:solidFill>
+                <a:effectLst/>
+                <a:latin typeface="Consolas" panose="020B0609020204030204" pitchFamily="49" charset="0"/>
+                <a:cs typeface="Consolas" panose="020B0609020204030204" pitchFamily="49" charset="0"/>
+              </a:rPr>
+              <a:t>!= </a:t>
+            </a:r>
+            <a:r>
+              <a:rPr lang="en-GB" sz="1400" dirty="0">
+                <a:solidFill>
+                  <a:srgbClr val="CF8E6D"/>
+                </a:solidFill>
+                <a:effectLst/>
+                <a:latin typeface="Consolas" panose="020B0609020204030204" pitchFamily="49" charset="0"/>
+                <a:cs typeface="Consolas" panose="020B0609020204030204" pitchFamily="49" charset="0"/>
+              </a:rPr>
+              <a:t>null</a:t>
+            </a:r>
+          </a:p>
+          <a:p>
+            <a:pPr>
+              <a:buNone/>
+            </a:pPr>
+            <a:r>
+              <a:rPr lang="en-GB" sz="1400" dirty="0">
+                <a:solidFill>
+                  <a:srgbClr val="BCBEC4"/>
+                </a:solidFill>
+                <a:effectLst/>
+                <a:latin typeface="Consolas" panose="020B0609020204030204" pitchFamily="49" charset="0"/>
+                <a:cs typeface="Consolas" panose="020B0609020204030204" pitchFamily="49" charset="0"/>
+              </a:rPr>
+              <a:t>		? </a:t>
+            </a:r>
+            <a:r>
+              <a:rPr lang="en-GB" sz="1400" dirty="0" err="1">
+                <a:solidFill>
+                  <a:srgbClr val="BCBEC4"/>
+                </a:solidFill>
+                <a:effectLst/>
+                <a:latin typeface="Consolas" panose="020B0609020204030204" pitchFamily="49" charset="0"/>
+                <a:cs typeface="Consolas" panose="020B0609020204030204" pitchFamily="49" charset="0"/>
+              </a:rPr>
+              <a:t>builder.</a:t>
+            </a:r>
+            <a:r>
+              <a:rPr lang="en-GB" sz="1400" dirty="0" err="1">
+                <a:solidFill>
+                  <a:srgbClr val="C77DBB"/>
+                </a:solidFill>
+                <a:effectLst/>
+                <a:latin typeface="Consolas" panose="020B0609020204030204" pitchFamily="49" charset="0"/>
+                <a:cs typeface="Consolas" panose="020B0609020204030204" pitchFamily="49" charset="0"/>
+              </a:rPr>
+              <a:t>webIdentityTokenFile</a:t>
+            </a:r>
+            <a:br>
+              <a:rPr lang="en-GB" sz="1400" dirty="0">
+                <a:solidFill>
+                  <a:srgbClr val="C77DBB"/>
+                </a:solidFill>
+                <a:effectLst/>
+                <a:latin typeface="Consolas" panose="020B0609020204030204" pitchFamily="49" charset="0"/>
+                <a:cs typeface="Consolas" panose="020B0609020204030204" pitchFamily="49" charset="0"/>
+              </a:rPr>
+            </a:br>
+            <a:r>
+              <a:rPr lang="en-GB" sz="1400" dirty="0">
+                <a:solidFill>
+                  <a:srgbClr val="C77DBB"/>
+                </a:solidFill>
+                <a:effectLst/>
+                <a:latin typeface="Consolas" panose="020B0609020204030204" pitchFamily="49" charset="0"/>
+                <a:cs typeface="Consolas" panose="020B0609020204030204" pitchFamily="49" charset="0"/>
+              </a:rPr>
+              <a:t>		</a:t>
+            </a:r>
+            <a:r>
+              <a:rPr lang="en-GB" sz="1400" dirty="0">
+                <a:solidFill>
+                  <a:srgbClr val="BCBEC4"/>
+                </a:solidFill>
+                <a:effectLst/>
+                <a:latin typeface="Consolas" panose="020B0609020204030204" pitchFamily="49" charset="0"/>
+                <a:cs typeface="Consolas" panose="020B0609020204030204" pitchFamily="49" charset="0"/>
+              </a:rPr>
+              <a:t>: </a:t>
+            </a:r>
+            <a:r>
+              <a:rPr lang="en-GB" sz="1400" dirty="0" err="1">
+                <a:solidFill>
+                  <a:srgbClr val="BCBEC4"/>
+                </a:solidFill>
+                <a:effectLst/>
+                <a:latin typeface="Consolas" panose="020B0609020204030204" pitchFamily="49" charset="0"/>
+                <a:cs typeface="Consolas" panose="020B0609020204030204" pitchFamily="49" charset="0"/>
+              </a:rPr>
+              <a:t>Paths.</a:t>
+            </a:r>
+            <a:r>
+              <a:rPr lang="en-GB" sz="1400" i="1" dirty="0" err="1">
+                <a:solidFill>
+                  <a:srgbClr val="BCBEC4"/>
+                </a:solidFill>
+                <a:effectLst/>
+                <a:latin typeface="Consolas" panose="020B0609020204030204" pitchFamily="49" charset="0"/>
+                <a:cs typeface="Consolas" panose="020B0609020204030204" pitchFamily="49" charset="0"/>
+              </a:rPr>
+              <a:t>get</a:t>
+            </a:r>
+            <a:r>
+              <a:rPr lang="en-GB" sz="1400" dirty="0">
+                <a:solidFill>
+                  <a:srgbClr val="BCBEC4"/>
+                </a:solidFill>
+                <a:effectLst/>
+                <a:latin typeface="Consolas" panose="020B0609020204030204" pitchFamily="49" charset="0"/>
+                <a:cs typeface="Consolas" panose="020B0609020204030204" pitchFamily="49" charset="0"/>
+              </a:rPr>
+              <a:t>(</a:t>
+            </a:r>
+            <a:r>
+              <a:rPr lang="en-GB" sz="1400" i="1" dirty="0">
+                <a:solidFill>
+                  <a:srgbClr val="BCBEC4"/>
+                </a:solidFill>
+                <a:effectLst/>
+                <a:latin typeface="Consolas" panose="020B0609020204030204" pitchFamily="49" charset="0"/>
+                <a:cs typeface="Consolas" panose="020B0609020204030204" pitchFamily="49" charset="0"/>
+              </a:rPr>
+              <a:t>trim</a:t>
+            </a:r>
+            <a:r>
+              <a:rPr lang="en-GB" sz="1400" dirty="0">
+                <a:solidFill>
+                  <a:srgbClr val="BCBEC4"/>
+                </a:solidFill>
+                <a:effectLst/>
+                <a:latin typeface="Consolas" panose="020B0609020204030204" pitchFamily="49" charset="0"/>
+                <a:cs typeface="Consolas" panose="020B0609020204030204" pitchFamily="49" charset="0"/>
+              </a:rPr>
+              <a:t>(SdkSystemSetting.</a:t>
+            </a:r>
+            <a:r>
+              <a:rPr lang="en-GB" sz="1400" i="1" dirty="0">
+                <a:solidFill>
+                  <a:srgbClr val="C77DBB"/>
+                </a:solidFill>
+                <a:effectLst/>
+                <a:latin typeface="Consolas" panose="020B0609020204030204" pitchFamily="49" charset="0"/>
+                <a:cs typeface="Consolas" panose="020B0609020204030204" pitchFamily="49" charset="0"/>
+              </a:rPr>
+              <a:t>AWS_WEB_IDENTITY_TOKEN_FILE</a:t>
+            </a:r>
+            <a:r>
+              <a:rPr lang="en-GB" sz="1400" dirty="0">
+                <a:solidFill>
+                  <a:srgbClr val="BCBEC4"/>
+                </a:solidFill>
+                <a:effectLst/>
+                <a:latin typeface="Consolas" panose="020B0609020204030204" pitchFamily="49" charset="0"/>
+                <a:cs typeface="Consolas" panose="020B0609020204030204" pitchFamily="49" charset="0"/>
+              </a:rPr>
+              <a:t>.getStringValueOrThrow()));</a:t>
+            </a:r>
+          </a:p>
+        </p:txBody>
+      </p:sp>
+      <p:cxnSp>
+        <p:nvCxnSpPr>
+          <p:cNvPr id="10" name="Straight Arrow Connector 9">
+            <a:extLst>
+              <a:ext uri="{FF2B5EF4-FFF2-40B4-BE49-F238E27FC236}">
+                <a16:creationId xmlns:a16="http://schemas.microsoft.com/office/drawing/2014/main" id="{143363FB-0A55-C4A5-CB77-62D861B5972C}"/>
+              </a:ext>
+            </a:extLst>
+          </p:cNvPr>
+          <p:cNvCxnSpPr/>
+          <p:nvPr/>
+        </p:nvCxnSpPr>
+        <p:spPr>
+          <a:xfrm>
+            <a:off x="5834742" y="2993571"/>
+            <a:ext cx="0" cy="522515"/>
+          </a:xfrm>
+          <a:prstGeom prst="straightConnector1">
+            <a:avLst/>
+          </a:prstGeom>
+          <a:ln>
+            <a:tailEnd type="triangle"/>
+          </a:ln>
+        </p:spPr>
+        <p:style>
+          <a:lnRef idx="2">
+            <a:schemeClr val="accent1"/>
+          </a:lnRef>
+          <a:fillRef idx="0">
+            <a:schemeClr val="accent1"/>
+          </a:fillRef>
+          <a:effectRef idx="1">
+            <a:schemeClr val="accent1"/>
+          </a:effectRef>
+          <a:fontRef idx="minor">
+            <a:schemeClr val="tx1"/>
+          </a:fontRef>
+        </p:style>
+      </p:cxnSp>
     </p:spTree>
     <p:extLst>
       <p:ext uri="{BB962C8B-B14F-4D97-AF65-F5344CB8AC3E}">
@@ -4263,7 +5318,13 @@
   <p:cSld>
     <p:spTree>
       <p:nvGrpSpPr>
-        <p:cNvPr id="1" name=""/>
+        <p:cNvPr id="1" name="">
+          <a:extLst>
+            <a:ext uri="{FF2B5EF4-FFF2-40B4-BE49-F238E27FC236}">
+              <a16:creationId xmlns:a16="http://schemas.microsoft.com/office/drawing/2014/main" id="{113040E8-06B6-8D1F-FF4E-48877E6D0FD2}"/>
+            </a:ext>
+          </a:extLst>
+        </p:cNvPr>
         <p:cNvGrpSpPr/>
         <p:nvPr/>
       </p:nvGrpSpPr>
@@ -4280,7 +5341,7 @@
           <p:cNvPr id="2" name="Title 1">
             <a:extLst>
               <a:ext uri="{FF2B5EF4-FFF2-40B4-BE49-F238E27FC236}">
-                <a16:creationId xmlns:a16="http://schemas.microsoft.com/office/drawing/2014/main" id="{AFD848B9-DEE5-157E-827D-C8696FFBC98F}"/>
+                <a16:creationId xmlns:a16="http://schemas.microsoft.com/office/drawing/2014/main" id="{9E7D7F03-118F-AFE0-4131-FEF7F8077364}"/>
               </a:ext>
             </a:extLst>
           </p:cNvPr>
@@ -4291,155 +5352,89 @@
             <p:ph type="title"/>
           </p:nvPr>
         </p:nvSpPr>
-        <p:spPr/>
-        <p:txBody>
-          <a:bodyPr/>
-          <a:lstStyle/>
-          <a:p>
-            <a:r>
-              <a:rPr lang="en-PL" dirty="0"/>
-              <a:t>GO templates</a:t>
-            </a:r>
-          </a:p>
-        </p:txBody>
-      </p:sp>
-      <p:sp>
-        <p:nvSpPr>
-          <p:cNvPr id="3" name="Content Placeholder 2">
-            <a:extLst>
-              <a:ext uri="{FF2B5EF4-FFF2-40B4-BE49-F238E27FC236}">
-                <a16:creationId xmlns:a16="http://schemas.microsoft.com/office/drawing/2014/main" id="{DA62A33F-BF07-8245-7988-2142E8534195}"/>
-              </a:ext>
-            </a:extLst>
-          </p:cNvPr>
-          <p:cNvSpPr>
-            <a:spLocks noGrp="1"/>
-          </p:cNvSpPr>
-          <p:nvPr>
-            <p:ph idx="1"/>
-          </p:nvPr>
-        </p:nvSpPr>
-        <p:spPr/>
-        <p:txBody>
-          <a:bodyPr/>
-          <a:lstStyle/>
-          <a:p>
-            <a:r>
-              <a:rPr lang="en-GB" dirty="0">
-                <a:hlinkClick r:id="rId3"/>
-              </a:rPr>
-              <a:t>https://pkg.go.dev/text/template</a:t>
-            </a:r>
-            <a:r>
-              <a:rPr lang="en-GB" dirty="0"/>
-              <a:t> (engine)</a:t>
-            </a:r>
-          </a:p>
-          <a:p>
-            <a:r>
-              <a:rPr lang="en-GB" dirty="0">
-                <a:hlinkClick r:id="rId4"/>
-              </a:rPr>
-              <a:t>https://pkg.go.dev/github.com/Masterminds/sprig</a:t>
-            </a:r>
-            <a:r>
-              <a:rPr lang="en-GB" dirty="0"/>
-              <a:t> (extra template functions - supported out of the box)</a:t>
-            </a:r>
-          </a:p>
-          <a:p>
-            <a:endParaRPr lang="en-GB" dirty="0"/>
-          </a:p>
-          <a:p>
-            <a:r>
-              <a:rPr lang="en-GB" dirty="0"/>
-              <a:t>The input text for a template is UTF-8-encoded text in any format.</a:t>
-            </a:r>
-          </a:p>
-          <a:p>
-            <a:r>
-              <a:rPr lang="en-GB" dirty="0"/>
-              <a:t> "</a:t>
-            </a:r>
-            <a:r>
-              <a:rPr lang="en-GB" b="1" dirty="0">
-                <a:solidFill>
-                  <a:srgbClr val="FF0000"/>
-                </a:solidFill>
-              </a:rPr>
-              <a:t>Actions</a:t>
-            </a:r>
-            <a:r>
-              <a:rPr lang="en-GB" dirty="0"/>
-              <a:t>"--data evaluations or control structures--are delimited by "</a:t>
-            </a:r>
-            <a:r>
-              <a:rPr lang="en-GB" b="1" dirty="0">
-                <a:solidFill>
-                  <a:srgbClr val="FF0000"/>
-                </a:solidFill>
-              </a:rPr>
-              <a:t>{{</a:t>
-            </a:r>
-            <a:r>
-              <a:rPr lang="en-GB" dirty="0"/>
-              <a:t>" and "</a:t>
-            </a:r>
-            <a:r>
-              <a:rPr lang="en-GB" b="1" dirty="0">
-                <a:solidFill>
-                  <a:srgbClr val="FF0000"/>
-                </a:solidFill>
-              </a:rPr>
-              <a:t>}}</a:t>
-            </a:r>
-            <a:r>
-              <a:rPr lang="en-GB" dirty="0"/>
-              <a:t>"; </a:t>
-            </a:r>
-          </a:p>
-          <a:p>
-            <a:r>
-              <a:rPr lang="en-GB" dirty="0"/>
-              <a:t>all text </a:t>
-            </a:r>
-            <a:r>
-              <a:rPr lang="en-GB" b="1" dirty="0">
-                <a:solidFill>
-                  <a:srgbClr val="FF0000"/>
-                </a:solidFill>
-              </a:rPr>
-              <a:t>outside actions </a:t>
-            </a:r>
-            <a:r>
-              <a:rPr lang="en-GB" dirty="0"/>
-              <a:t>is copied to the output </a:t>
-            </a:r>
-            <a:r>
-              <a:rPr lang="en-GB" b="1" dirty="0">
-                <a:solidFill>
-                  <a:srgbClr val="FF0000"/>
-                </a:solidFill>
-              </a:rPr>
-              <a:t>unchanged</a:t>
-            </a:r>
-            <a:r>
-              <a:rPr lang="en-GB" dirty="0"/>
-              <a:t>. </a:t>
-            </a:r>
-          </a:p>
-          <a:p>
-            <a:endParaRPr lang="en-GB" dirty="0"/>
-          </a:p>
-          <a:p>
-            <a:endParaRPr lang="en-PL" dirty="0"/>
+        <p:spPr>
+          <a:xfrm>
+            <a:off x="2264228" y="1977231"/>
+            <a:ext cx="7663543" cy="2903537"/>
+          </a:xfrm>
+        </p:spPr>
+        <p:txBody>
+          <a:bodyPr>
+            <a:normAutofit/>
+          </a:bodyPr>
+          <a:lstStyle/>
+          <a:p>
+            <a:pPr algn="ctr"/>
+            <a:r>
+              <a:rPr lang="en-GB" sz="4800" dirty="0">
+                <a:latin typeface="Consolas" panose="020B0609020204030204" pitchFamily="49" charset="0"/>
+                <a:cs typeface="Consolas" panose="020B0609020204030204" pitchFamily="49" charset="0"/>
+              </a:rPr>
+              <a:t>D</a:t>
+            </a:r>
+            <a:r>
+              <a:rPr lang="en-PL" sz="4800" dirty="0">
+                <a:latin typeface="Consolas" panose="020B0609020204030204" pitchFamily="49" charset="0"/>
+                <a:cs typeface="Consolas" panose="020B0609020204030204" pitchFamily="49" charset="0"/>
+              </a:rPr>
+              <a:t>emo</a:t>
+            </a:r>
+            <a:br>
+              <a:rPr lang="en-PL" sz="2400" dirty="0">
+                <a:latin typeface="Consolas" panose="020B0609020204030204" pitchFamily="49" charset="0"/>
+                <a:cs typeface="Consolas" panose="020B0609020204030204" pitchFamily="49" charset="0"/>
+              </a:rPr>
+            </a:br>
+            <a:br>
+              <a:rPr lang="en-PL" sz="2400" dirty="0">
+                <a:latin typeface="Consolas" panose="020B0609020204030204" pitchFamily="49" charset="0"/>
+                <a:cs typeface="Consolas" panose="020B0609020204030204" pitchFamily="49" charset="0"/>
+              </a:rPr>
+            </a:br>
+            <a:r>
+              <a:rPr lang="en-GB" sz="2400" dirty="0" err="1">
+                <a:latin typeface="Consolas" panose="020B0609020204030204" pitchFamily="49" charset="0"/>
+                <a:cs typeface="Consolas" panose="020B0609020204030204" pitchFamily="49" charset="0"/>
+              </a:rPr>
+              <a:t>aws</a:t>
+            </a:r>
+            <a:r>
+              <a:rPr lang="en-GB" sz="2400" dirty="0">
+                <a:latin typeface="Consolas" panose="020B0609020204030204" pitchFamily="49" charset="0"/>
+                <a:cs typeface="Consolas" panose="020B0609020204030204" pitchFamily="49" charset="0"/>
+              </a:rPr>
+              <a:t>/create/7_setup_irsa.sh</a:t>
+            </a:r>
+            <a:br>
+              <a:rPr lang="en-GB" sz="2400" dirty="0">
+                <a:latin typeface="Consolas" panose="020B0609020204030204" pitchFamily="49" charset="0"/>
+                <a:cs typeface="Consolas" panose="020B0609020204030204" pitchFamily="49" charset="0"/>
+              </a:rPr>
+            </a:br>
+            <a:br>
+              <a:rPr lang="en-PL" sz="2400" dirty="0">
+                <a:latin typeface="Consolas" panose="020B0609020204030204" pitchFamily="49" charset="0"/>
+                <a:cs typeface="Consolas" panose="020B0609020204030204" pitchFamily="49" charset="0"/>
+              </a:rPr>
+            </a:br>
+            <a:r>
+              <a:rPr lang="en-GB" sz="2400" dirty="0">
+                <a:latin typeface="Consolas" panose="020B0609020204030204" pitchFamily="49" charset="0"/>
+                <a:cs typeface="Consolas" panose="020B0609020204030204" pitchFamily="49" charset="0"/>
+              </a:rPr>
+              <a:t>k8s/05_irsa</a:t>
+            </a:r>
+            <a:endParaRPr lang="en-PL" sz="2400" dirty="0">
+              <a:latin typeface="Consolas" panose="020B0609020204030204" pitchFamily="49" charset="0"/>
+              <a:cs typeface="Consolas" panose="020B0609020204030204" pitchFamily="49" charset="0"/>
+            </a:endParaRPr>
           </a:p>
         </p:txBody>
       </p:sp>
     </p:spTree>
     <p:extLst>
       <p:ext uri="{BB962C8B-B14F-4D97-AF65-F5344CB8AC3E}">
-        <p14:creationId xmlns:p14="http://schemas.microsoft.com/office/powerpoint/2010/main" val="3117201421"/>
+        <p14:creationId xmlns:p14="http://schemas.microsoft.com/office/powerpoint/2010/main" val="1870588679"/>
       </p:ext>
     </p:extLst>
   </p:cSld>
@@ -4454,7 +5449,13 @@
   <p:cSld>
     <p:spTree>
       <p:nvGrpSpPr>
-        <p:cNvPr id="1" name=""/>
+        <p:cNvPr id="1" name="">
+          <a:extLst>
+            <a:ext uri="{FF2B5EF4-FFF2-40B4-BE49-F238E27FC236}">
+              <a16:creationId xmlns:a16="http://schemas.microsoft.com/office/drawing/2014/main" id="{3E759C8C-7FCD-87D5-1F23-238823B66620}"/>
+            </a:ext>
+          </a:extLst>
+        </p:cNvPr>
         <p:cNvGrpSpPr/>
         <p:nvPr/>
       </p:nvGrpSpPr>
@@ -4471,354 +5472,79 @@
           <p:cNvPr id="2" name="Title 1">
             <a:extLst>
               <a:ext uri="{FF2B5EF4-FFF2-40B4-BE49-F238E27FC236}">
-                <a16:creationId xmlns:a16="http://schemas.microsoft.com/office/drawing/2014/main" id="{3738BDD9-FB97-A71E-3C12-51EA704D2593}"/>
-              </a:ext>
-            </a:extLst>
-          </p:cNvPr>
-          <p:cNvSpPr>
-            <a:spLocks noGrp="1"/>
-          </p:cNvSpPr>
-          <p:nvPr>
-            <p:ph type="title"/>
-          </p:nvPr>
-        </p:nvSpPr>
-        <p:spPr/>
-        <p:txBody>
-          <a:bodyPr/>
-          <a:lstStyle/>
-          <a:p>
-            <a:r>
-              <a:rPr lang="en-PL" dirty="0"/>
-              <a:t>Helm webooks</a:t>
-            </a:r>
-          </a:p>
-        </p:txBody>
-      </p:sp>
-      <p:sp>
-        <p:nvSpPr>
-          <p:cNvPr id="3" name="Content Placeholder 2">
-            <a:extLst>
-              <a:ext uri="{FF2B5EF4-FFF2-40B4-BE49-F238E27FC236}">
-                <a16:creationId xmlns:a16="http://schemas.microsoft.com/office/drawing/2014/main" id="{A8E8CC5A-26AC-8B86-34BE-44B7F98448B9}"/>
-              </a:ext>
-            </a:extLst>
-          </p:cNvPr>
-          <p:cNvSpPr>
-            <a:spLocks noGrp="1"/>
-          </p:cNvSpPr>
-          <p:nvPr>
-            <p:ph idx="1"/>
+                <a16:creationId xmlns:a16="http://schemas.microsoft.com/office/drawing/2014/main" id="{08972025-06DB-4257-202D-97BF8F476367}"/>
+              </a:ext>
+            </a:extLst>
+          </p:cNvPr>
+          <p:cNvSpPr>
+            <a:spLocks noGrp="1"/>
+          </p:cNvSpPr>
+          <p:nvPr>
+            <p:ph type="ctrTitle"/>
           </p:nvPr>
         </p:nvSpPr>
         <p:spPr>
           <a:xfrm>
-            <a:off x="838200" y="1825625"/>
-            <a:ext cx="10515600" cy="1906403"/>
+            <a:off x="1524000" y="1458686"/>
+            <a:ext cx="9144000" cy="1681163"/>
           </a:xfrm>
         </p:spPr>
         <p:txBody>
-          <a:bodyPr/>
-          <a:lstStyle/>
-          <a:p>
-            <a:r>
-              <a:rPr lang="en-GB" dirty="0"/>
-              <a:t>U</a:t>
-            </a:r>
-            <a:r>
-              <a:rPr lang="en-PL" dirty="0"/>
-              <a:t>sed by devops</a:t>
-            </a:r>
-          </a:p>
-          <a:p>
-            <a:r>
-              <a:rPr lang="en-GB" dirty="0"/>
-              <a:t>I</a:t>
-            </a:r>
-            <a:r>
-              <a:rPr lang="en-PL" dirty="0"/>
-              <a:t>n UP were used in pluto-api-service </a:t>
-            </a:r>
+          <a:bodyPr>
+            <a:normAutofit/>
+          </a:bodyPr>
+          <a:lstStyle/>
+          <a:p>
+            <a:r>
+              <a:rPr lang="en-PL" sz="8000" dirty="0"/>
+              <a:t>Helm</a:t>
+            </a:r>
+          </a:p>
+        </p:txBody>
+      </p:sp>
+      <p:sp>
+        <p:nvSpPr>
+          <p:cNvPr id="3" name="Subtitle 2">
+            <a:extLst>
+              <a:ext uri="{FF2B5EF4-FFF2-40B4-BE49-F238E27FC236}">
+                <a16:creationId xmlns:a16="http://schemas.microsoft.com/office/drawing/2014/main" id="{8E5AE9A7-5757-1660-5A28-9374A0C27AD4}"/>
+              </a:ext>
+            </a:extLst>
+          </p:cNvPr>
+          <p:cNvSpPr>
+            <a:spLocks noGrp="1"/>
+          </p:cNvSpPr>
+          <p:nvPr>
+            <p:ph type="subTitle" idx="1"/>
+          </p:nvPr>
+        </p:nvSpPr>
+        <p:spPr>
+          <a:xfrm>
+            <a:off x="1600200" y="3429000"/>
+            <a:ext cx="9144000" cy="1970314"/>
+          </a:xfrm>
+        </p:spPr>
+        <p:txBody>
+          <a:bodyPr>
+            <a:normAutofit/>
+          </a:bodyPr>
+          <a:lstStyle/>
+          <a:p>
             <a:br>
               <a:rPr lang="en-PL" dirty="0"/>
             </a:br>
             <a:r>
-              <a:rPr lang="en-GB" sz="1400" dirty="0">
-                <a:hlinkClick r:id="rId3"/>
-              </a:rPr>
-              <a:t>https://github.com/viacomcbs/up-pluto-api-service/blob/a7c19e9322268936ee864666a70ff84639f98418/deploy/helm/v2/ups-pluto-api-service/templates/secret.yaml</a:t>
-            </a:r>
-            <a:endParaRPr lang="en-GB" sz="1400" dirty="0"/>
-          </a:p>
-          <a:p>
-            <a:endParaRPr lang="en-GB" sz="1400" dirty="0"/>
-          </a:p>
-          <a:p>
-            <a:pPr marL="0" indent="0">
-              <a:buNone/>
-            </a:pPr>
-            <a:endParaRPr lang="en-PL" sz="1400" dirty="0"/>
-          </a:p>
-        </p:txBody>
-      </p:sp>
-      <p:sp>
-        <p:nvSpPr>
-          <p:cNvPr id="4" name="TextBox 3">
-            <a:extLst>
-              <a:ext uri="{FF2B5EF4-FFF2-40B4-BE49-F238E27FC236}">
-                <a16:creationId xmlns:a16="http://schemas.microsoft.com/office/drawing/2014/main" id="{0B538817-0D3C-0371-2ACB-7CD7C688768D}"/>
-              </a:ext>
-            </a:extLst>
-          </p:cNvPr>
-          <p:cNvSpPr txBox="1"/>
-          <p:nvPr/>
-        </p:nvSpPr>
-        <p:spPr>
-          <a:xfrm>
-            <a:off x="1158948" y="3221665"/>
-            <a:ext cx="9388549" cy="3539430"/>
-          </a:xfrm>
-          <a:prstGeom prst="rect">
-            <a:avLst/>
-          </a:prstGeom>
-          <a:noFill/>
-        </p:spPr>
-        <p:txBody>
-          <a:bodyPr wrap="square" rtlCol="0">
-            <a:spAutoFit/>
-          </a:bodyPr>
-          <a:lstStyle/>
-          <a:p>
-            <a:r>
-              <a:rPr lang="en-GB" sz="1600" dirty="0">
-                <a:latin typeface="Source Code Pro" panose="020F0502020204030204" pitchFamily="34" charset="0"/>
-                <a:cs typeface="Source Code Pro" panose="020F0502020204030204" pitchFamily="34" charset="0"/>
-              </a:rPr>
-              <a:t>{{- if not .</a:t>
-            </a:r>
-            <a:r>
-              <a:rPr lang="en-GB" sz="1600" dirty="0" err="1">
-                <a:latin typeface="Source Code Pro" panose="020F0502020204030204" pitchFamily="34" charset="0"/>
-                <a:cs typeface="Source Code Pro" panose="020F0502020204030204" pitchFamily="34" charset="0"/>
-              </a:rPr>
-              <a:t>Values.serviceAccount.forceDisabled</a:t>
-            </a:r>
-            <a:r>
-              <a:rPr lang="en-GB" sz="1600" dirty="0">
-                <a:latin typeface="Source Code Pro" panose="020F0502020204030204" pitchFamily="34" charset="0"/>
-                <a:cs typeface="Source Code Pro" panose="020F0502020204030204" pitchFamily="34" charset="0"/>
-              </a:rPr>
-              <a:t> | default false }}</a:t>
-            </a:r>
-          </a:p>
-          <a:p>
-            <a:r>
-              <a:rPr lang="en-GB" sz="1600" dirty="0">
-                <a:latin typeface="Source Code Pro" panose="020F0502020204030204" pitchFamily="34" charset="0"/>
-                <a:cs typeface="Source Code Pro" panose="020F0502020204030204" pitchFamily="34" charset="0"/>
-              </a:rPr>
-              <a:t>---</a:t>
-            </a:r>
-          </a:p>
-          <a:p>
-            <a:r>
-              <a:rPr lang="en-GB" sz="1600" dirty="0" err="1">
-                <a:latin typeface="Source Code Pro" panose="020F0502020204030204" pitchFamily="34" charset="0"/>
-                <a:cs typeface="Source Code Pro" panose="020F0502020204030204" pitchFamily="34" charset="0"/>
-              </a:rPr>
-              <a:t>apiVersion</a:t>
-            </a:r>
-            <a:r>
-              <a:rPr lang="en-GB" sz="1600" dirty="0">
-                <a:latin typeface="Source Code Pro" panose="020F0502020204030204" pitchFamily="34" charset="0"/>
-                <a:cs typeface="Source Code Pro" panose="020F0502020204030204" pitchFamily="34" charset="0"/>
-              </a:rPr>
-              <a:t>: v1</a:t>
-            </a:r>
-          </a:p>
-          <a:p>
-            <a:r>
-              <a:rPr lang="en-GB" sz="1600" dirty="0">
-                <a:latin typeface="Source Code Pro" panose="020F0502020204030204" pitchFamily="34" charset="0"/>
-                <a:cs typeface="Source Code Pro" panose="020F0502020204030204" pitchFamily="34" charset="0"/>
-              </a:rPr>
-              <a:t>kind: Secret</a:t>
-            </a:r>
-          </a:p>
-          <a:p>
-            <a:r>
-              <a:rPr lang="en-GB" sz="1600" dirty="0">
-                <a:latin typeface="Source Code Pro" panose="020F0502020204030204" pitchFamily="34" charset="0"/>
-                <a:cs typeface="Source Code Pro" panose="020F0502020204030204" pitchFamily="34" charset="0"/>
-              </a:rPr>
-              <a:t>type: </a:t>
-            </a:r>
-            <a:r>
-              <a:rPr lang="en-GB" sz="1600" dirty="0" err="1">
-                <a:latin typeface="Source Code Pro" panose="020F0502020204030204" pitchFamily="34" charset="0"/>
-                <a:cs typeface="Source Code Pro" panose="020F0502020204030204" pitchFamily="34" charset="0"/>
-              </a:rPr>
-              <a:t>kubernetes.io</a:t>
-            </a:r>
-            <a:r>
-              <a:rPr lang="en-GB" sz="1600" dirty="0">
-                <a:latin typeface="Source Code Pro" panose="020F0502020204030204" pitchFamily="34" charset="0"/>
-                <a:cs typeface="Source Code Pro" panose="020F0502020204030204" pitchFamily="34" charset="0"/>
-              </a:rPr>
-              <a:t>/service-account-token</a:t>
-            </a:r>
-          </a:p>
-          <a:p>
-            <a:r>
-              <a:rPr lang="en-GB" sz="1600" dirty="0">
-                <a:latin typeface="Source Code Pro" panose="020F0502020204030204" pitchFamily="34" charset="0"/>
-                <a:cs typeface="Source Code Pro" panose="020F0502020204030204" pitchFamily="34" charset="0"/>
-              </a:rPr>
-              <a:t>metadata:</a:t>
-            </a:r>
-          </a:p>
-          <a:p>
-            <a:r>
-              <a:rPr lang="en-GB" sz="1600" dirty="0">
-                <a:latin typeface="Source Code Pro" panose="020F0502020204030204" pitchFamily="34" charset="0"/>
-                <a:cs typeface="Source Code Pro" panose="020F0502020204030204" pitchFamily="34" charset="0"/>
-              </a:rPr>
-              <a:t>  name: {{ include "k8s.secretServiceAccountTokenName" . }}</a:t>
-            </a:r>
-          </a:p>
-          <a:p>
-            <a:r>
-              <a:rPr lang="en-GB" sz="1600" dirty="0">
-                <a:latin typeface="Source Code Pro" panose="020F0502020204030204" pitchFamily="34" charset="0"/>
-                <a:cs typeface="Source Code Pro" panose="020F0502020204030204" pitchFamily="34" charset="0"/>
-              </a:rPr>
-              <a:t>  annotations:</a:t>
-            </a:r>
-          </a:p>
-          <a:p>
-            <a:r>
-              <a:rPr lang="en-GB" sz="1600" dirty="0">
-                <a:latin typeface="Source Code Pro" panose="020F0502020204030204" pitchFamily="34" charset="0"/>
-                <a:cs typeface="Source Code Pro" panose="020F0502020204030204" pitchFamily="34" charset="0"/>
-              </a:rPr>
-              <a:t>    </a:t>
-            </a:r>
-            <a:r>
-              <a:rPr lang="en-GB" sz="1600" dirty="0" err="1">
-                <a:latin typeface="Source Code Pro" panose="020F0502020204030204" pitchFamily="34" charset="0"/>
-                <a:cs typeface="Source Code Pro" panose="020F0502020204030204" pitchFamily="34" charset="0"/>
-              </a:rPr>
-              <a:t>helm.sh</a:t>
-            </a:r>
-            <a:r>
-              <a:rPr lang="en-GB" sz="1600" dirty="0">
-                <a:latin typeface="Source Code Pro" panose="020F0502020204030204" pitchFamily="34" charset="0"/>
-                <a:cs typeface="Source Code Pro" panose="020F0502020204030204" pitchFamily="34" charset="0"/>
-              </a:rPr>
-              <a:t>/hook: "pre-install, pre-upgrade"</a:t>
-            </a:r>
-          </a:p>
-          <a:p>
-            <a:r>
-              <a:rPr lang="en-GB" sz="1600" dirty="0">
-                <a:latin typeface="Source Code Pro" panose="020F0502020204030204" pitchFamily="34" charset="0"/>
-                <a:cs typeface="Source Code Pro" panose="020F0502020204030204" pitchFamily="34" charset="0"/>
-              </a:rPr>
-              <a:t>    </a:t>
-            </a:r>
-            <a:r>
-              <a:rPr lang="en-GB" sz="1600" dirty="0" err="1">
-                <a:latin typeface="Source Code Pro" panose="020F0502020204030204" pitchFamily="34" charset="0"/>
-                <a:cs typeface="Source Code Pro" panose="020F0502020204030204" pitchFamily="34" charset="0"/>
-              </a:rPr>
-              <a:t>helm.sh</a:t>
-            </a:r>
-            <a:r>
-              <a:rPr lang="en-GB" sz="1600" dirty="0">
-                <a:latin typeface="Source Code Pro" panose="020F0502020204030204" pitchFamily="34" charset="0"/>
-                <a:cs typeface="Source Code Pro" panose="020F0502020204030204" pitchFamily="34" charset="0"/>
-              </a:rPr>
-              <a:t>/hook-delete-policy: "before-hook-creation"</a:t>
-            </a:r>
-          </a:p>
-          <a:p>
-            <a:r>
-              <a:rPr lang="en-GB" sz="1600" dirty="0">
-                <a:latin typeface="Source Code Pro" panose="020F0502020204030204" pitchFamily="34" charset="0"/>
-                <a:cs typeface="Source Code Pro" panose="020F0502020204030204" pitchFamily="34" charset="0"/>
-              </a:rPr>
-              <a:t>    </a:t>
-            </a:r>
-            <a:r>
-              <a:rPr lang="en-GB" sz="1600" dirty="0" err="1">
-                <a:latin typeface="Source Code Pro" panose="020F0502020204030204" pitchFamily="34" charset="0"/>
-                <a:cs typeface="Source Code Pro" panose="020F0502020204030204" pitchFamily="34" charset="0"/>
-              </a:rPr>
-              <a:t>helm.sh</a:t>
-            </a:r>
-            <a:r>
-              <a:rPr lang="en-GB" sz="1600" dirty="0">
-                <a:latin typeface="Source Code Pro" panose="020F0502020204030204" pitchFamily="34" charset="0"/>
-                <a:cs typeface="Source Code Pro" panose="020F0502020204030204" pitchFamily="34" charset="0"/>
-              </a:rPr>
-              <a:t>/hook-weight: "-5"</a:t>
-            </a:r>
-          </a:p>
-          <a:p>
-            <a:r>
-              <a:rPr lang="en-GB" sz="1600" dirty="0">
-                <a:latin typeface="Source Code Pro" panose="020F0502020204030204" pitchFamily="34" charset="0"/>
-                <a:cs typeface="Source Code Pro" panose="020F0502020204030204" pitchFamily="34" charset="0"/>
-              </a:rPr>
-              <a:t>    </a:t>
-            </a:r>
-            <a:r>
-              <a:rPr lang="en-GB" sz="1600" dirty="0" err="1">
-                <a:latin typeface="Source Code Pro" panose="020F0502020204030204" pitchFamily="34" charset="0"/>
-                <a:cs typeface="Source Code Pro" panose="020F0502020204030204" pitchFamily="34" charset="0"/>
-              </a:rPr>
-              <a:t>kubernetes.io</a:t>
-            </a:r>
-            <a:r>
-              <a:rPr lang="en-GB" sz="1600" dirty="0">
-                <a:latin typeface="Source Code Pro" panose="020F0502020204030204" pitchFamily="34" charset="0"/>
-                <a:cs typeface="Source Code Pro" panose="020F0502020204030204" pitchFamily="34" charset="0"/>
-              </a:rPr>
-              <a:t>/service-</a:t>
-            </a:r>
-            <a:r>
-              <a:rPr lang="en-GB" sz="1600" dirty="0" err="1">
-                <a:latin typeface="Source Code Pro" panose="020F0502020204030204" pitchFamily="34" charset="0"/>
-                <a:cs typeface="Source Code Pro" panose="020F0502020204030204" pitchFamily="34" charset="0"/>
-              </a:rPr>
-              <a:t>account.name</a:t>
-            </a:r>
-            <a:r>
-              <a:rPr lang="en-GB" sz="1600" dirty="0">
-                <a:latin typeface="Source Code Pro" panose="020F0502020204030204" pitchFamily="34" charset="0"/>
-                <a:cs typeface="Source Code Pro" panose="020F0502020204030204" pitchFamily="34" charset="0"/>
-              </a:rPr>
-              <a:t>: {{ include "k8s.serviceAccountName" . }}</a:t>
-            </a:r>
-          </a:p>
-          <a:p>
-            <a:r>
-              <a:rPr lang="en-GB" sz="1600" dirty="0">
-                <a:latin typeface="Source Code Pro" panose="020F0502020204030204" pitchFamily="34" charset="0"/>
-                <a:cs typeface="Source Code Pro" panose="020F0502020204030204" pitchFamily="34" charset="0"/>
-              </a:rPr>
-              <a:t>{{- end }}</a:t>
-            </a:r>
-            <a:endParaRPr lang="en-PL" sz="1600" dirty="0">
-              <a:latin typeface="Source Code Pro" panose="020F0502020204030204" pitchFamily="34" charset="0"/>
-              <a:cs typeface="Source Code Pro" panose="020F0502020204030204" pitchFamily="34" charset="0"/>
-            </a:endParaRPr>
+              <a:rPr lang="en-GB" dirty="0"/>
+              <a:t>package manager for Kubernetes</a:t>
+            </a:r>
+            <a:endParaRPr lang="en-PL" dirty="0"/>
           </a:p>
         </p:txBody>
       </p:sp>
     </p:spTree>
     <p:extLst>
       <p:ext uri="{BB962C8B-B14F-4D97-AF65-F5344CB8AC3E}">
-        <p14:creationId xmlns:p14="http://schemas.microsoft.com/office/powerpoint/2010/main" val="2604832239"/>
+        <p14:creationId xmlns:p14="http://schemas.microsoft.com/office/powerpoint/2010/main" val="2353385182"/>
       </p:ext>
     </p:extLst>
   </p:cSld>
@@ -4847,35 +5573,10 @@
       </p:grpSpPr>
       <p:sp>
         <p:nvSpPr>
-          <p:cNvPr id="2" name="Title 1">
-            <a:extLst>
-              <a:ext uri="{FF2B5EF4-FFF2-40B4-BE49-F238E27FC236}">
-                <a16:creationId xmlns:a16="http://schemas.microsoft.com/office/drawing/2014/main" id="{CB54ADC9-A7E3-9359-DADB-01CE8C4DA428}"/>
-              </a:ext>
-            </a:extLst>
-          </p:cNvPr>
-          <p:cNvSpPr>
-            <a:spLocks noGrp="1"/>
-          </p:cNvSpPr>
-          <p:nvPr>
-            <p:ph type="title"/>
-          </p:nvPr>
-        </p:nvSpPr>
-        <p:spPr/>
-        <p:txBody>
-          <a:bodyPr/>
-          <a:lstStyle/>
-          <a:p>
-            <a:endParaRPr lang="en-PL"/>
-          </a:p>
-        </p:txBody>
-      </p:sp>
-      <p:sp>
-        <p:nvSpPr>
           <p:cNvPr id="3" name="Content Placeholder 2">
             <a:extLst>
               <a:ext uri="{FF2B5EF4-FFF2-40B4-BE49-F238E27FC236}">
-                <a16:creationId xmlns:a16="http://schemas.microsoft.com/office/drawing/2014/main" id="{3CB93204-0343-681C-EAA7-F4E737809BB2}"/>
+                <a16:creationId xmlns:a16="http://schemas.microsoft.com/office/drawing/2014/main" id="{05B0C0A7-2A2E-F63E-AC33-16BE47423E8D}"/>
               </a:ext>
             </a:extLst>
           </p:cNvPr>
@@ -4886,19 +5587,372 @@
             <p:ph idx="1"/>
           </p:nvPr>
         </p:nvSpPr>
-        <p:spPr/>
-        <p:txBody>
-          <a:bodyPr/>
-          <a:lstStyle/>
-          <a:p>
-            <a:endParaRPr lang="en-PL"/>
+        <p:spPr>
+          <a:xfrm>
+            <a:off x="838200" y="1433740"/>
+            <a:ext cx="10515600" cy="4351338"/>
+          </a:xfrm>
+        </p:spPr>
+        <p:txBody>
+          <a:bodyPr>
+            <a:normAutofit fontScale="92500" lnSpcReduction="10000"/>
+          </a:bodyPr>
+          <a:lstStyle/>
+          <a:p>
+            <a:pPr marL="0" indent="0">
+              <a:buNone/>
+            </a:pPr>
+            <a:r>
+              <a:rPr lang="en-GB" dirty="0"/>
+              <a:t>A </a:t>
+            </a:r>
+            <a:r>
+              <a:rPr lang="en-GB" i="1" u="sng" dirty="0"/>
+              <a:t>Chart</a:t>
+            </a:r>
+            <a:r>
+              <a:rPr lang="en-GB" dirty="0"/>
+              <a:t> is a Helm </a:t>
+            </a:r>
+            <a:r>
+              <a:rPr lang="en-GB" b="1" dirty="0">
+                <a:solidFill>
+                  <a:srgbClr val="FF0000"/>
+                </a:solidFill>
+              </a:rPr>
+              <a:t>package</a:t>
+            </a:r>
+          </a:p>
+          <a:p>
+            <a:pPr marL="0" indent="0">
+              <a:buNone/>
+            </a:pPr>
+            <a:r>
+              <a:rPr lang="en-GB" sz="2000" b="1" dirty="0"/>
+              <a:t>(</a:t>
+            </a:r>
+            <a:r>
+              <a:rPr lang="en-GB" sz="2000" dirty="0"/>
+              <a:t>Helm uses a </a:t>
+            </a:r>
+            <a:r>
+              <a:rPr lang="en-GB" sz="2000" b="1" dirty="0">
+                <a:solidFill>
+                  <a:srgbClr val="FF0000"/>
+                </a:solidFill>
+              </a:rPr>
+              <a:t>packaging format </a:t>
+            </a:r>
+            <a:r>
+              <a:rPr lang="en-GB" sz="2000" dirty="0"/>
+              <a:t>called </a:t>
+            </a:r>
+            <a:r>
+              <a:rPr lang="en-GB" sz="2000" i="1" dirty="0"/>
+              <a:t>charts</a:t>
+            </a:r>
+            <a:r>
+              <a:rPr lang="en-GB" sz="2000" dirty="0"/>
+              <a:t>. A chart is a collection of files that describe a related set of Kubernetes resources.</a:t>
+            </a:r>
+            <a:r>
+              <a:rPr lang="en-GB" sz="2000" b="1" dirty="0"/>
+              <a:t>)</a:t>
+            </a:r>
+          </a:p>
+          <a:p>
+            <a:pPr marL="0" indent="0">
+              <a:buNone/>
+            </a:pPr>
+            <a:r>
+              <a:rPr lang="en-GB" sz="2000" b="1" dirty="0"/>
+              <a:t>[used by UP]</a:t>
+            </a:r>
+          </a:p>
+          <a:p>
+            <a:pPr marL="0" indent="0">
+              <a:buNone/>
+            </a:pPr>
+            <a:endParaRPr lang="en-GB" b="1" dirty="0">
+              <a:solidFill>
+                <a:srgbClr val="FF0000"/>
+              </a:solidFill>
+            </a:endParaRPr>
+          </a:p>
+          <a:p>
+            <a:pPr marL="0" indent="0">
+              <a:buNone/>
+            </a:pPr>
+            <a:r>
+              <a:rPr lang="en-GB" dirty="0"/>
+              <a:t>A </a:t>
+            </a:r>
+            <a:r>
+              <a:rPr lang="en-GB" i="1" u="sng" dirty="0"/>
+              <a:t>Repository</a:t>
+            </a:r>
+            <a:r>
+              <a:rPr lang="en-GB" dirty="0"/>
+              <a:t> is the place where charts can be collected and shared</a:t>
+            </a:r>
+          </a:p>
+          <a:p>
+            <a:pPr marL="0" indent="0">
+              <a:buNone/>
+            </a:pPr>
+            <a:r>
+              <a:rPr lang="en-GB" sz="2200" b="1" dirty="0"/>
+              <a:t>[not used by UP]</a:t>
+            </a:r>
+          </a:p>
+          <a:p>
+            <a:pPr marL="0" indent="0">
+              <a:buNone/>
+            </a:pPr>
+            <a:endParaRPr lang="en-GB" dirty="0"/>
+          </a:p>
+          <a:p>
+            <a:pPr marL="0" indent="0">
+              <a:buNone/>
+            </a:pPr>
+            <a:endParaRPr lang="en-GB" dirty="0"/>
+          </a:p>
+          <a:p>
+            <a:pPr marL="0" indent="0">
+              <a:buNone/>
+            </a:pPr>
+            <a:r>
+              <a:rPr lang="en-GB" dirty="0"/>
+              <a:t>A </a:t>
+            </a:r>
+            <a:r>
+              <a:rPr lang="en-GB" i="1" u="sng" dirty="0"/>
+              <a:t>Release</a:t>
+            </a:r>
+            <a:r>
+              <a:rPr lang="en-GB" dirty="0"/>
+              <a:t> is an </a:t>
+            </a:r>
+            <a:r>
+              <a:rPr lang="en-GB" b="1" dirty="0">
+                <a:solidFill>
+                  <a:srgbClr val="FF0000"/>
+                </a:solidFill>
+              </a:rPr>
+              <a:t>instance of a chart </a:t>
+            </a:r>
+            <a:r>
+              <a:rPr lang="en-GB" dirty="0"/>
+              <a:t>running in a Kubernetes cluster.</a:t>
+            </a:r>
+          </a:p>
+          <a:p>
+            <a:pPr marL="0" indent="0">
+              <a:buNone/>
+            </a:pPr>
+            <a:r>
+              <a:rPr lang="en-GB" sz="2200" b="1" dirty="0"/>
+              <a:t>[not used by UP]</a:t>
+            </a:r>
+          </a:p>
+          <a:p>
+            <a:pPr marL="0" indent="0">
+              <a:buNone/>
+            </a:pPr>
+            <a:endParaRPr lang="en-GB" dirty="0"/>
+          </a:p>
+          <a:p>
+            <a:endParaRPr lang="en-PL" dirty="0"/>
+          </a:p>
+        </p:txBody>
+      </p:sp>
+      <p:sp>
+        <p:nvSpPr>
+          <p:cNvPr id="6" name="&quot;No&quot; Symbol 5">
+            <a:extLst>
+              <a:ext uri="{FF2B5EF4-FFF2-40B4-BE49-F238E27FC236}">
+                <a16:creationId xmlns:a16="http://schemas.microsoft.com/office/drawing/2014/main" id="{74E10CB1-868E-5F34-FE91-F1483742DB52}"/>
+              </a:ext>
+            </a:extLst>
+          </p:cNvPr>
+          <p:cNvSpPr/>
+          <p:nvPr/>
+        </p:nvSpPr>
+        <p:spPr>
+          <a:xfrm>
+            <a:off x="2873826" y="3685609"/>
+            <a:ext cx="424543" cy="391885"/>
+          </a:xfrm>
+          <a:prstGeom prst="noSmoking">
+            <a:avLst/>
+          </a:prstGeom>
+          <a:gradFill flip="none" rotWithShape="1">
+            <a:gsLst>
+              <a:gs pos="0">
+                <a:schemeClr val="accent2">
+                  <a:lumMod val="67000"/>
+                </a:schemeClr>
+              </a:gs>
+              <a:gs pos="48000">
+                <a:schemeClr val="accent2">
+                  <a:lumMod val="97000"/>
+                  <a:lumOff val="3000"/>
+                </a:schemeClr>
+              </a:gs>
+              <a:gs pos="100000">
+                <a:schemeClr val="accent2">
+                  <a:lumMod val="60000"/>
+                  <a:lumOff val="40000"/>
+                </a:schemeClr>
+              </a:gs>
+            </a:gsLst>
+            <a:lin ang="16200000" scaled="1"/>
+            <a:tileRect/>
+          </a:gradFill>
+          <a:ln>
+            <a:noFill/>
+          </a:ln>
+        </p:spPr>
+        <p:style>
+          <a:lnRef idx="0">
+            <a:scrgbClr r="0" g="0" b="0"/>
+          </a:lnRef>
+          <a:fillRef idx="0">
+            <a:scrgbClr r="0" g="0" b="0"/>
+          </a:fillRef>
+          <a:effectRef idx="0">
+            <a:scrgbClr r="0" g="0" b="0"/>
+          </a:effectRef>
+          <a:fontRef idx="minor">
+            <a:schemeClr val="lt1"/>
+          </a:fontRef>
+        </p:style>
+        <p:txBody>
+          <a:bodyPr rtlCol="0" anchor="ctr"/>
+          <a:lstStyle/>
+          <a:p>
+            <a:pPr algn="ctr"/>
+            <a:endParaRPr lang="en-PL">
+              <a:solidFill>
+                <a:schemeClr val="tx1"/>
+              </a:solidFill>
+            </a:endParaRPr>
+          </a:p>
+        </p:txBody>
+      </p:sp>
+      <p:sp>
+        <p:nvSpPr>
+          <p:cNvPr id="7" name="&quot;No&quot; Symbol 6">
+            <a:extLst>
+              <a:ext uri="{FF2B5EF4-FFF2-40B4-BE49-F238E27FC236}">
+                <a16:creationId xmlns:a16="http://schemas.microsoft.com/office/drawing/2014/main" id="{C45177DB-5D4B-FE85-C1C7-F545C539CA63}"/>
+              </a:ext>
+            </a:extLst>
+          </p:cNvPr>
+          <p:cNvSpPr/>
+          <p:nvPr/>
+        </p:nvSpPr>
+        <p:spPr>
+          <a:xfrm>
+            <a:off x="2873826" y="5393193"/>
+            <a:ext cx="424543" cy="391885"/>
+          </a:xfrm>
+          <a:prstGeom prst="noSmoking">
+            <a:avLst/>
+          </a:prstGeom>
+          <a:gradFill flip="none" rotWithShape="1">
+            <a:gsLst>
+              <a:gs pos="0">
+                <a:schemeClr val="accent2">
+                  <a:lumMod val="67000"/>
+                </a:schemeClr>
+              </a:gs>
+              <a:gs pos="48000">
+                <a:schemeClr val="accent2">
+                  <a:lumMod val="97000"/>
+                  <a:lumOff val="3000"/>
+                </a:schemeClr>
+              </a:gs>
+              <a:gs pos="100000">
+                <a:schemeClr val="accent2">
+                  <a:lumMod val="60000"/>
+                  <a:lumOff val="40000"/>
+                </a:schemeClr>
+              </a:gs>
+            </a:gsLst>
+            <a:lin ang="16200000" scaled="1"/>
+            <a:tileRect/>
+          </a:gradFill>
+          <a:ln>
+            <a:noFill/>
+          </a:ln>
+        </p:spPr>
+        <p:style>
+          <a:lnRef idx="0">
+            <a:scrgbClr r="0" g="0" b="0"/>
+          </a:lnRef>
+          <a:fillRef idx="0">
+            <a:scrgbClr r="0" g="0" b="0"/>
+          </a:fillRef>
+          <a:effectRef idx="0">
+            <a:scrgbClr r="0" g="0" b="0"/>
+          </a:effectRef>
+          <a:fontRef idx="minor">
+            <a:schemeClr val="lt1"/>
+          </a:fontRef>
+        </p:style>
+        <p:txBody>
+          <a:bodyPr rtlCol="0" anchor="ctr"/>
+          <a:lstStyle/>
+          <a:p>
+            <a:pPr algn="ctr"/>
+            <a:endParaRPr lang="en-PL">
+              <a:solidFill>
+                <a:schemeClr val="tx1"/>
+              </a:solidFill>
+            </a:endParaRPr>
+          </a:p>
+        </p:txBody>
+      </p:sp>
+      <p:sp>
+        <p:nvSpPr>
+          <p:cNvPr id="9" name="TextBox 8">
+            <a:extLst>
+              <a:ext uri="{FF2B5EF4-FFF2-40B4-BE49-F238E27FC236}">
+                <a16:creationId xmlns:a16="http://schemas.microsoft.com/office/drawing/2014/main" id="{678718EF-5E47-5DFB-EB47-74C9E6D57677}"/>
+              </a:ext>
+            </a:extLst>
+          </p:cNvPr>
+          <p:cNvSpPr txBox="1"/>
+          <p:nvPr/>
+        </p:nvSpPr>
+        <p:spPr>
+          <a:xfrm>
+            <a:off x="9720944" y="5965763"/>
+            <a:ext cx="2079171" cy="369332"/>
+          </a:xfrm>
+          <a:prstGeom prst="rect">
+            <a:avLst/>
+          </a:prstGeom>
+          <a:noFill/>
+        </p:spPr>
+        <p:txBody>
+          <a:bodyPr wrap="square">
+            <a:spAutoFit/>
+          </a:bodyPr>
+          <a:lstStyle/>
+          <a:p>
+            <a:r>
+              <a:rPr lang="en-PL" sz="1800" dirty="0"/>
+              <a:t>Source: [Docs2]</a:t>
+            </a:r>
           </a:p>
         </p:txBody>
       </p:sp>
     </p:spTree>
     <p:extLst>
       <p:ext uri="{BB962C8B-B14F-4D97-AF65-F5344CB8AC3E}">
-        <p14:creationId xmlns:p14="http://schemas.microsoft.com/office/powerpoint/2010/main" val="3293073901"/>
+        <p14:creationId xmlns:p14="http://schemas.microsoft.com/office/powerpoint/2010/main" val="1031136423"/>
       </p:ext>
     </p:extLst>
   </p:cSld>
@@ -4927,18 +5981,18 @@
       </p:grpSpPr>
       <p:sp>
         <p:nvSpPr>
-          <p:cNvPr id="2" name="Title 1">
-            <a:extLst>
-              <a:ext uri="{FF2B5EF4-FFF2-40B4-BE49-F238E27FC236}">
-                <a16:creationId xmlns:a16="http://schemas.microsoft.com/office/drawing/2014/main" id="{63C5CC79-8E1A-4F51-563A-BEB7F4DDDBAE}"/>
-              </a:ext>
-            </a:extLst>
-          </p:cNvPr>
-          <p:cNvSpPr>
-            <a:spLocks noGrp="1"/>
-          </p:cNvSpPr>
-          <p:nvPr>
-            <p:ph type="title"/>
+          <p:cNvPr id="3" name="Content Placeholder 2">
+            <a:extLst>
+              <a:ext uri="{FF2B5EF4-FFF2-40B4-BE49-F238E27FC236}">
+                <a16:creationId xmlns:a16="http://schemas.microsoft.com/office/drawing/2014/main" id="{775FD164-F9CA-E7F1-86BD-450441DC0E46}"/>
+              </a:ext>
+            </a:extLst>
+          </p:cNvPr>
+          <p:cNvSpPr>
+            <a:spLocks noGrp="1"/>
+          </p:cNvSpPr>
+          <p:nvPr>
+            <p:ph idx="1"/>
           </p:nvPr>
         </p:nvSpPr>
         <p:spPr/>
@@ -4946,39 +6000,534 @@
           <a:bodyPr/>
           <a:lstStyle/>
           <a:p>
-            <a:endParaRPr lang="en-PL"/>
-          </a:p>
-        </p:txBody>
-      </p:sp>
-      <p:sp>
-        <p:nvSpPr>
-          <p:cNvPr id="3" name="Content Placeholder 2">
-            <a:extLst>
-              <a:ext uri="{FF2B5EF4-FFF2-40B4-BE49-F238E27FC236}">
-                <a16:creationId xmlns:a16="http://schemas.microsoft.com/office/drawing/2014/main" id="{9AB200A5-57CA-EC57-2BCF-B1DD4988CBCF}"/>
-              </a:ext>
-            </a:extLst>
-          </p:cNvPr>
-          <p:cNvSpPr>
-            <a:spLocks noGrp="1"/>
-          </p:cNvSpPr>
-          <p:nvPr>
-            <p:ph idx="1"/>
-          </p:nvPr>
-        </p:nvSpPr>
-        <p:spPr/>
-        <p:txBody>
-          <a:bodyPr/>
-          <a:lstStyle/>
-          <a:p>
-            <a:endParaRPr lang="en-PL"/>
+            <a:pPr marL="0" indent="0" algn="ctr">
+              <a:buNone/>
+            </a:pPr>
+            <a:r>
+              <a:rPr lang="en-PL" dirty="0"/>
+              <a:t>User Platform facilitates only one command of Helm</a:t>
+            </a:r>
+            <a:br>
+              <a:rPr lang="en-PL" dirty="0"/>
+            </a:br>
+            <a:r>
+              <a:rPr lang="en-PL" sz="1400" dirty="0"/>
+              <a:t>(under the hood – it is called by ArgoCD):</a:t>
+            </a:r>
+          </a:p>
+          <a:p>
+            <a:pPr marL="0" indent="0" algn="ctr">
+              <a:buNone/>
+            </a:pPr>
+            <a:endParaRPr lang="en-PL" dirty="0"/>
+          </a:p>
+          <a:p>
+            <a:pPr marL="0" indent="0" algn="ctr">
+              <a:buNone/>
+            </a:pPr>
+            <a:r>
+              <a:rPr lang="en-GB" sz="4000" dirty="0">
+                <a:latin typeface="Consolas" panose="020B0609020204030204" pitchFamily="49" charset="0"/>
+                <a:cs typeface="Consolas" panose="020B0609020204030204" pitchFamily="49" charset="0"/>
+              </a:rPr>
+              <a:t>h</a:t>
+            </a:r>
+            <a:r>
+              <a:rPr lang="en-PL" sz="4000" dirty="0">
+                <a:latin typeface="Consolas" panose="020B0609020204030204" pitchFamily="49" charset="0"/>
+                <a:cs typeface="Consolas" panose="020B0609020204030204" pitchFamily="49" charset="0"/>
+              </a:rPr>
+              <a:t>elm template</a:t>
+            </a:r>
           </a:p>
         </p:txBody>
       </p:sp>
     </p:spTree>
     <p:extLst>
       <p:ext uri="{BB962C8B-B14F-4D97-AF65-F5344CB8AC3E}">
-        <p14:creationId xmlns:p14="http://schemas.microsoft.com/office/powerpoint/2010/main" val="1092334499"/>
+        <p14:creationId xmlns:p14="http://schemas.microsoft.com/office/powerpoint/2010/main" val="4715646"/>
+      </p:ext>
+    </p:extLst>
+  </p:cSld>
+  <p:clrMapOvr>
+    <a:masterClrMapping/>
+  </p:clrMapOvr>
+</p:sld>
+</file>
+
+<file path=ppt/slides/slide17.xml><?xml version="1.0" encoding="utf-8"?>
+<p:sld xmlns:a="http://schemas.openxmlformats.org/drawingml/2006/main" xmlns:r="http://schemas.openxmlformats.org/officeDocument/2006/relationships" xmlns:p="http://schemas.openxmlformats.org/presentationml/2006/main">
+  <p:cSld>
+    <p:spTree>
+      <p:nvGrpSpPr>
+        <p:cNvPr id="1" name=""/>
+        <p:cNvGrpSpPr/>
+        <p:nvPr/>
+      </p:nvGrpSpPr>
+      <p:grpSpPr>
+        <a:xfrm>
+          <a:off x="0" y="0"/>
+          <a:ext cx="0" cy="0"/>
+          <a:chOff x="0" y="0"/>
+          <a:chExt cx="0" cy="0"/>
+        </a:xfrm>
+      </p:grpSpPr>
+      <p:sp>
+        <p:nvSpPr>
+          <p:cNvPr id="2" name="Title 1">
+            <a:extLst>
+              <a:ext uri="{FF2B5EF4-FFF2-40B4-BE49-F238E27FC236}">
+                <a16:creationId xmlns:a16="http://schemas.microsoft.com/office/drawing/2014/main" id="{AFD848B9-DEE5-157E-827D-C8696FFBC98F}"/>
+              </a:ext>
+            </a:extLst>
+          </p:cNvPr>
+          <p:cNvSpPr>
+            <a:spLocks noGrp="1"/>
+          </p:cNvSpPr>
+          <p:nvPr>
+            <p:ph type="title"/>
+          </p:nvPr>
+        </p:nvSpPr>
+        <p:spPr/>
+        <p:txBody>
+          <a:bodyPr/>
+          <a:lstStyle/>
+          <a:p>
+            <a:pPr algn="ctr"/>
+            <a:r>
+              <a:rPr lang="en-PL" dirty="0"/>
+              <a:t>GO templates</a:t>
+            </a:r>
+          </a:p>
+        </p:txBody>
+      </p:sp>
+      <p:sp>
+        <p:nvSpPr>
+          <p:cNvPr id="3" name="Content Placeholder 2">
+            <a:extLst>
+              <a:ext uri="{FF2B5EF4-FFF2-40B4-BE49-F238E27FC236}">
+                <a16:creationId xmlns:a16="http://schemas.microsoft.com/office/drawing/2014/main" id="{DA62A33F-BF07-8245-7988-2142E8534195}"/>
+              </a:ext>
+            </a:extLst>
+          </p:cNvPr>
+          <p:cNvSpPr>
+            <a:spLocks noGrp="1"/>
+          </p:cNvSpPr>
+          <p:nvPr>
+            <p:ph idx="1"/>
+          </p:nvPr>
+        </p:nvSpPr>
+        <p:spPr/>
+        <p:txBody>
+          <a:bodyPr/>
+          <a:lstStyle/>
+          <a:p>
+            <a:r>
+              <a:rPr lang="en-GB" dirty="0">
+                <a:hlinkClick r:id="rId3"/>
+              </a:rPr>
+              <a:t>https://pkg.go.dev/text/template</a:t>
+            </a:r>
+            <a:r>
+              <a:rPr lang="en-GB" dirty="0"/>
+              <a:t> (engine)</a:t>
+            </a:r>
+          </a:p>
+          <a:p>
+            <a:r>
+              <a:rPr lang="en-GB" dirty="0">
+                <a:hlinkClick r:id="rId4"/>
+              </a:rPr>
+              <a:t>https://pkg.go.dev/github.com/Masterminds/sprig</a:t>
+            </a:r>
+            <a:r>
+              <a:rPr lang="en-GB" dirty="0"/>
+              <a:t> (extra template functions - supported out of the box)</a:t>
+            </a:r>
+          </a:p>
+          <a:p>
+            <a:endParaRPr lang="en-GB" dirty="0"/>
+          </a:p>
+          <a:p>
+            <a:r>
+              <a:rPr lang="en-GB" dirty="0"/>
+              <a:t>"</a:t>
+            </a:r>
+            <a:r>
+              <a:rPr lang="en-GB" b="1" dirty="0">
+                <a:solidFill>
+                  <a:srgbClr val="FF0000"/>
+                </a:solidFill>
+              </a:rPr>
+              <a:t>Actions</a:t>
+            </a:r>
+            <a:r>
+              <a:rPr lang="en-GB" dirty="0"/>
+              <a:t>"--data evaluations or control structures--are delimited by "</a:t>
+            </a:r>
+            <a:r>
+              <a:rPr lang="en-GB" b="1" dirty="0">
+                <a:solidFill>
+                  <a:srgbClr val="FF0000"/>
+                </a:solidFill>
+              </a:rPr>
+              <a:t>{{</a:t>
+            </a:r>
+            <a:r>
+              <a:rPr lang="en-GB" dirty="0"/>
+              <a:t>" and "</a:t>
+            </a:r>
+            <a:r>
+              <a:rPr lang="en-GB" b="1" dirty="0">
+                <a:solidFill>
+                  <a:srgbClr val="FF0000"/>
+                </a:solidFill>
+              </a:rPr>
+              <a:t>}}</a:t>
+            </a:r>
+            <a:r>
+              <a:rPr lang="en-GB" dirty="0"/>
+              <a:t>"; </a:t>
+            </a:r>
+          </a:p>
+          <a:p>
+            <a:r>
+              <a:rPr lang="en-GB" dirty="0"/>
+              <a:t>all text </a:t>
+            </a:r>
+            <a:r>
+              <a:rPr lang="en-GB" b="1" dirty="0">
+                <a:solidFill>
+                  <a:srgbClr val="FF0000"/>
+                </a:solidFill>
+              </a:rPr>
+              <a:t>outside actions </a:t>
+            </a:r>
+            <a:r>
+              <a:rPr lang="en-GB" dirty="0"/>
+              <a:t>is copied to the output </a:t>
+            </a:r>
+            <a:r>
+              <a:rPr lang="en-GB" b="1" dirty="0">
+                <a:solidFill>
+                  <a:srgbClr val="FF0000"/>
+                </a:solidFill>
+              </a:rPr>
+              <a:t>unchanged</a:t>
+            </a:r>
+            <a:r>
+              <a:rPr lang="en-GB" dirty="0"/>
+              <a:t>. </a:t>
+            </a:r>
+          </a:p>
+          <a:p>
+            <a:endParaRPr lang="en-GB" dirty="0"/>
+          </a:p>
+          <a:p>
+            <a:endParaRPr lang="en-PL" dirty="0"/>
+          </a:p>
+        </p:txBody>
+      </p:sp>
+      <p:sp>
+        <p:nvSpPr>
+          <p:cNvPr id="4" name="TextBox 3">
+            <a:extLst>
+              <a:ext uri="{FF2B5EF4-FFF2-40B4-BE49-F238E27FC236}">
+                <a16:creationId xmlns:a16="http://schemas.microsoft.com/office/drawing/2014/main" id="{14803E5B-C36D-1E78-E1C1-386D4AFC95A1}"/>
+              </a:ext>
+            </a:extLst>
+          </p:cNvPr>
+          <p:cNvSpPr txBox="1"/>
+          <p:nvPr/>
+        </p:nvSpPr>
+        <p:spPr>
+          <a:xfrm>
+            <a:off x="9720944" y="5965763"/>
+            <a:ext cx="2079171" cy="369332"/>
+          </a:xfrm>
+          <a:prstGeom prst="rect">
+            <a:avLst/>
+          </a:prstGeom>
+          <a:noFill/>
+        </p:spPr>
+        <p:txBody>
+          <a:bodyPr wrap="square">
+            <a:spAutoFit/>
+          </a:bodyPr>
+          <a:lstStyle/>
+          <a:p>
+            <a:r>
+              <a:rPr lang="en-PL" sz="1800" dirty="0"/>
+              <a:t>Source: [Docs2]</a:t>
+            </a:r>
+          </a:p>
+        </p:txBody>
+      </p:sp>
+    </p:spTree>
+    <p:extLst>
+      <p:ext uri="{BB962C8B-B14F-4D97-AF65-F5344CB8AC3E}">
+        <p14:creationId xmlns:p14="http://schemas.microsoft.com/office/powerpoint/2010/main" val="3117201421"/>
+      </p:ext>
+    </p:extLst>
+  </p:cSld>
+  <p:clrMapOvr>
+    <a:masterClrMapping/>
+  </p:clrMapOvr>
+</p:sld>
+</file>
+
+<file path=ppt/slides/slide18.xml><?xml version="1.0" encoding="utf-8"?>
+<p:sld xmlns:a="http://schemas.openxmlformats.org/drawingml/2006/main" xmlns:r="http://schemas.openxmlformats.org/officeDocument/2006/relationships" xmlns:p="http://schemas.openxmlformats.org/presentationml/2006/main">
+  <p:cSld>
+    <p:spTree>
+      <p:nvGrpSpPr>
+        <p:cNvPr id="1" name="">
+          <a:extLst>
+            <a:ext uri="{FF2B5EF4-FFF2-40B4-BE49-F238E27FC236}">
+              <a16:creationId xmlns:a16="http://schemas.microsoft.com/office/drawing/2014/main" id="{07EAC503-8D79-C1CC-D07E-BD9718A01E19}"/>
+            </a:ext>
+          </a:extLst>
+        </p:cNvPr>
+        <p:cNvGrpSpPr/>
+        <p:nvPr/>
+      </p:nvGrpSpPr>
+      <p:grpSpPr>
+        <a:xfrm>
+          <a:off x="0" y="0"/>
+          <a:ext cx="0" cy="0"/>
+          <a:chOff x="0" y="0"/>
+          <a:chExt cx="0" cy="0"/>
+        </a:xfrm>
+      </p:grpSpPr>
+      <p:sp>
+        <p:nvSpPr>
+          <p:cNvPr id="2" name="Title 1">
+            <a:extLst>
+              <a:ext uri="{FF2B5EF4-FFF2-40B4-BE49-F238E27FC236}">
+                <a16:creationId xmlns:a16="http://schemas.microsoft.com/office/drawing/2014/main" id="{3BA28DD5-B3D0-E772-8104-E4AA09D119B3}"/>
+              </a:ext>
+            </a:extLst>
+          </p:cNvPr>
+          <p:cNvSpPr>
+            <a:spLocks noGrp="1"/>
+          </p:cNvSpPr>
+          <p:nvPr>
+            <p:ph type="title"/>
+          </p:nvPr>
+        </p:nvSpPr>
+        <p:spPr>
+          <a:xfrm>
+            <a:off x="2264228" y="1977231"/>
+            <a:ext cx="7663543" cy="2903537"/>
+          </a:xfrm>
+        </p:spPr>
+        <p:txBody>
+          <a:bodyPr>
+            <a:normAutofit/>
+          </a:bodyPr>
+          <a:lstStyle/>
+          <a:p>
+            <a:pPr algn="ctr"/>
+            <a:r>
+              <a:rPr lang="en-GB" sz="4800" dirty="0">
+                <a:latin typeface="Consolas" panose="020B0609020204030204" pitchFamily="49" charset="0"/>
+                <a:cs typeface="Consolas" panose="020B0609020204030204" pitchFamily="49" charset="0"/>
+              </a:rPr>
+              <a:t>D</a:t>
+            </a:r>
+            <a:r>
+              <a:rPr lang="en-PL" sz="4800" dirty="0">
+                <a:latin typeface="Consolas" panose="020B0609020204030204" pitchFamily="49" charset="0"/>
+                <a:cs typeface="Consolas" panose="020B0609020204030204" pitchFamily="49" charset="0"/>
+              </a:rPr>
+              <a:t>emo</a:t>
+            </a:r>
+            <a:br>
+              <a:rPr lang="en-PL" sz="2400" dirty="0">
+                <a:latin typeface="Consolas" panose="020B0609020204030204" pitchFamily="49" charset="0"/>
+                <a:cs typeface="Consolas" panose="020B0609020204030204" pitchFamily="49" charset="0"/>
+              </a:rPr>
+            </a:br>
+            <a:br>
+              <a:rPr lang="en-GB" sz="2400" dirty="0">
+                <a:latin typeface="Consolas" panose="020B0609020204030204" pitchFamily="49" charset="0"/>
+                <a:cs typeface="Consolas" panose="020B0609020204030204" pitchFamily="49" charset="0"/>
+              </a:rPr>
+            </a:br>
+            <a:r>
+              <a:rPr lang="en-GB" sz="2400" dirty="0" err="1">
+                <a:latin typeface="Consolas" panose="020B0609020204030204" pitchFamily="49" charset="0"/>
+                <a:cs typeface="Consolas" panose="020B0609020204030204" pitchFamily="49" charset="0"/>
+              </a:rPr>
+              <a:t>aws</a:t>
+            </a:r>
+            <a:r>
+              <a:rPr lang="en-GB" sz="2400" dirty="0">
+                <a:latin typeface="Consolas" panose="020B0609020204030204" pitchFamily="49" charset="0"/>
+                <a:cs typeface="Consolas" panose="020B0609020204030204" pitchFamily="49" charset="0"/>
+              </a:rPr>
+              <a:t>/create/5_create_ingress_controller.sh</a:t>
+            </a:r>
+            <a:br>
+              <a:rPr lang="en-GB" sz="2400" dirty="0">
+                <a:latin typeface="Consolas" panose="020B0609020204030204" pitchFamily="49" charset="0"/>
+                <a:cs typeface="Consolas" panose="020B0609020204030204" pitchFamily="49" charset="0"/>
+              </a:rPr>
+            </a:br>
+            <a:r>
+              <a:rPr lang="en-GB" sz="2400" dirty="0" err="1">
+                <a:latin typeface="Consolas" panose="020B0609020204030204" pitchFamily="49" charset="0"/>
+                <a:cs typeface="Consolas" panose="020B0609020204030204" pitchFamily="49" charset="0"/>
+              </a:rPr>
+              <a:t>aws</a:t>
+            </a:r>
+            <a:r>
+              <a:rPr lang="en-GB" sz="2400" dirty="0">
+                <a:latin typeface="Consolas" panose="020B0609020204030204" pitchFamily="49" charset="0"/>
+                <a:cs typeface="Consolas" panose="020B0609020204030204" pitchFamily="49" charset="0"/>
+              </a:rPr>
+              <a:t>/create/8_install_keda.sh</a:t>
+            </a:r>
+            <a:br>
+              <a:rPr lang="en-GB" sz="2400" dirty="0">
+                <a:latin typeface="Consolas" panose="020B0609020204030204" pitchFamily="49" charset="0"/>
+                <a:cs typeface="Consolas" panose="020B0609020204030204" pitchFamily="49" charset="0"/>
+              </a:rPr>
+            </a:br>
+            <a:br>
+              <a:rPr lang="en-GB" sz="2400" dirty="0">
+                <a:latin typeface="Consolas" panose="020B0609020204030204" pitchFamily="49" charset="0"/>
+                <a:cs typeface="Consolas" panose="020B0609020204030204" pitchFamily="49" charset="0"/>
+              </a:rPr>
+            </a:br>
+            <a:r>
+              <a:rPr lang="en-GB" sz="1400" dirty="0">
+                <a:solidFill>
+                  <a:schemeClr val="tx1">
+                    <a:lumMod val="65000"/>
+                    <a:lumOff val="35000"/>
+                  </a:schemeClr>
+                </a:solidFill>
+                <a:latin typeface="Consolas" panose="020B0609020204030204" pitchFamily="49" charset="0"/>
+                <a:cs typeface="Consolas" panose="020B0609020204030204" pitchFamily="49" charset="0"/>
+              </a:rPr>
+              <a:t>(as regular package manager: helm install)</a:t>
+            </a:r>
+            <a:endParaRPr lang="en-PL" sz="1400" dirty="0">
+              <a:solidFill>
+                <a:schemeClr val="tx1">
+                  <a:lumMod val="65000"/>
+                  <a:lumOff val="35000"/>
+                </a:schemeClr>
+              </a:solidFill>
+              <a:latin typeface="Consolas" panose="020B0609020204030204" pitchFamily="49" charset="0"/>
+              <a:cs typeface="Consolas" panose="020B0609020204030204" pitchFamily="49" charset="0"/>
+            </a:endParaRPr>
+          </a:p>
+        </p:txBody>
+      </p:sp>
+    </p:spTree>
+    <p:extLst>
+      <p:ext uri="{BB962C8B-B14F-4D97-AF65-F5344CB8AC3E}">
+        <p14:creationId xmlns:p14="http://schemas.microsoft.com/office/powerpoint/2010/main" val="3167222281"/>
+      </p:ext>
+    </p:extLst>
+  </p:cSld>
+  <p:clrMapOvr>
+    <a:masterClrMapping/>
+  </p:clrMapOvr>
+</p:sld>
+</file>
+
+<file path=ppt/slides/slide19.xml><?xml version="1.0" encoding="utf-8"?>
+<p:sld xmlns:a="http://schemas.openxmlformats.org/drawingml/2006/main" xmlns:r="http://schemas.openxmlformats.org/officeDocument/2006/relationships" xmlns:p="http://schemas.openxmlformats.org/presentationml/2006/main">
+  <p:cSld>
+    <p:spTree>
+      <p:nvGrpSpPr>
+        <p:cNvPr id="1" name=""/>
+        <p:cNvGrpSpPr/>
+        <p:nvPr/>
+      </p:nvGrpSpPr>
+      <p:grpSpPr>
+        <a:xfrm>
+          <a:off x="0" y="0"/>
+          <a:ext cx="0" cy="0"/>
+          <a:chOff x="0" y="0"/>
+          <a:chExt cx="0" cy="0"/>
+        </a:xfrm>
+      </p:grpSpPr>
+      <p:sp>
+        <p:nvSpPr>
+          <p:cNvPr id="2" name="Title 1">
+            <a:extLst>
+              <a:ext uri="{FF2B5EF4-FFF2-40B4-BE49-F238E27FC236}">
+                <a16:creationId xmlns:a16="http://schemas.microsoft.com/office/drawing/2014/main" id="{19AAC2B3-5228-245C-A4BA-F93E5B084490}"/>
+              </a:ext>
+            </a:extLst>
+          </p:cNvPr>
+          <p:cNvSpPr>
+            <a:spLocks noGrp="1"/>
+          </p:cNvSpPr>
+          <p:nvPr>
+            <p:ph type="title"/>
+          </p:nvPr>
+        </p:nvSpPr>
+        <p:spPr/>
+        <p:txBody>
+          <a:bodyPr/>
+          <a:lstStyle/>
+          <a:p>
+            <a:endParaRPr lang="en-PL"/>
+          </a:p>
+        </p:txBody>
+      </p:sp>
+      <p:sp>
+        <p:nvSpPr>
+          <p:cNvPr id="3" name="Content Placeholder 2">
+            <a:extLst>
+              <a:ext uri="{FF2B5EF4-FFF2-40B4-BE49-F238E27FC236}">
+                <a16:creationId xmlns:a16="http://schemas.microsoft.com/office/drawing/2014/main" id="{69A31939-0107-43E3-6B23-756EC1486CCA}"/>
+              </a:ext>
+            </a:extLst>
+          </p:cNvPr>
+          <p:cNvSpPr>
+            <a:spLocks noGrp="1"/>
+          </p:cNvSpPr>
+          <p:nvPr>
+            <p:ph idx="1"/>
+          </p:nvPr>
+        </p:nvSpPr>
+        <p:spPr/>
+        <p:txBody>
+          <a:bodyPr/>
+          <a:lstStyle/>
+          <a:p>
+            <a:r>
+              <a:rPr lang="en-GB" dirty="0" err="1"/>
+              <a:t>aws</a:t>
+            </a:r>
+            <a:r>
+              <a:rPr lang="en-GB" dirty="0"/>
+              <a:t>/create/5_create_ingress_controller.sh</a:t>
+            </a:r>
+          </a:p>
+          <a:p>
+            <a:r>
+              <a:rPr lang="en-GB" dirty="0" err="1"/>
+              <a:t>aws</a:t>
+            </a:r>
+            <a:r>
+              <a:rPr lang="en-GB" dirty="0"/>
+              <a:t>/create/8_install_keda.sh</a:t>
+            </a:r>
+            <a:endParaRPr lang="en-PL" dirty="0"/>
+          </a:p>
+        </p:txBody>
+      </p:sp>
+    </p:spTree>
+    <p:extLst>
+      <p:ext uri="{BB962C8B-B14F-4D97-AF65-F5344CB8AC3E}">
+        <p14:creationId xmlns:p14="http://schemas.microsoft.com/office/powerpoint/2010/main" val="3742290374"/>
       </p:ext>
     </p:extLst>
   </p:cSld>
@@ -5066,6 +6615,951 @@
     <p:extLst>
       <p:ext uri="{BB962C8B-B14F-4D97-AF65-F5344CB8AC3E}">
         <p14:creationId xmlns:p14="http://schemas.microsoft.com/office/powerpoint/2010/main" val="3496270105"/>
+      </p:ext>
+    </p:extLst>
+  </p:cSld>
+  <p:clrMapOvr>
+    <a:masterClrMapping/>
+  </p:clrMapOvr>
+</p:sld>
+</file>
+
+<file path=ppt/slides/slide20.xml><?xml version="1.0" encoding="utf-8"?>
+<p:sld xmlns:a="http://schemas.openxmlformats.org/drawingml/2006/main" xmlns:r="http://schemas.openxmlformats.org/officeDocument/2006/relationships" xmlns:p="http://schemas.openxmlformats.org/presentationml/2006/main">
+  <p:cSld>
+    <p:spTree>
+      <p:nvGrpSpPr>
+        <p:cNvPr id="1" name="">
+          <a:extLst>
+            <a:ext uri="{FF2B5EF4-FFF2-40B4-BE49-F238E27FC236}">
+              <a16:creationId xmlns:a16="http://schemas.microsoft.com/office/drawing/2014/main" id="{D9BEF1E0-7491-7FC9-85C9-6258D2F011F7}"/>
+            </a:ext>
+          </a:extLst>
+        </p:cNvPr>
+        <p:cNvGrpSpPr/>
+        <p:nvPr/>
+      </p:nvGrpSpPr>
+      <p:grpSpPr>
+        <a:xfrm>
+          <a:off x="0" y="0"/>
+          <a:ext cx="0" cy="0"/>
+          <a:chOff x="0" y="0"/>
+          <a:chExt cx="0" cy="0"/>
+        </a:xfrm>
+      </p:grpSpPr>
+      <p:sp>
+        <p:nvSpPr>
+          <p:cNvPr id="2" name="Title 1">
+            <a:extLst>
+              <a:ext uri="{FF2B5EF4-FFF2-40B4-BE49-F238E27FC236}">
+                <a16:creationId xmlns:a16="http://schemas.microsoft.com/office/drawing/2014/main" id="{5843DB67-628C-AF37-76F7-B4800D6D495D}"/>
+              </a:ext>
+            </a:extLst>
+          </p:cNvPr>
+          <p:cNvSpPr>
+            <a:spLocks noGrp="1"/>
+          </p:cNvSpPr>
+          <p:nvPr>
+            <p:ph type="title"/>
+          </p:nvPr>
+        </p:nvSpPr>
+        <p:spPr>
+          <a:xfrm>
+            <a:off x="2264228" y="1977231"/>
+            <a:ext cx="7663543" cy="2903537"/>
+          </a:xfrm>
+        </p:spPr>
+        <p:txBody>
+          <a:bodyPr>
+            <a:normAutofit/>
+          </a:bodyPr>
+          <a:lstStyle/>
+          <a:p>
+            <a:pPr algn="ctr"/>
+            <a:r>
+              <a:rPr lang="en-GB" sz="4800" dirty="0">
+                <a:latin typeface="Consolas" panose="020B0609020204030204" pitchFamily="49" charset="0"/>
+                <a:cs typeface="Consolas" panose="020B0609020204030204" pitchFamily="49" charset="0"/>
+              </a:rPr>
+              <a:t>D</a:t>
+            </a:r>
+            <a:r>
+              <a:rPr lang="en-PL" sz="4800" dirty="0">
+                <a:latin typeface="Consolas" panose="020B0609020204030204" pitchFamily="49" charset="0"/>
+                <a:cs typeface="Consolas" panose="020B0609020204030204" pitchFamily="49" charset="0"/>
+              </a:rPr>
+              <a:t>emo</a:t>
+            </a:r>
+            <a:br>
+              <a:rPr lang="en-PL" sz="2400" dirty="0">
+                <a:latin typeface="Consolas" panose="020B0609020204030204" pitchFamily="49" charset="0"/>
+                <a:cs typeface="Consolas" panose="020B0609020204030204" pitchFamily="49" charset="0"/>
+              </a:rPr>
+            </a:br>
+            <a:br>
+              <a:rPr lang="en-PL" sz="2400" dirty="0">
+                <a:latin typeface="Consolas" panose="020B0609020204030204" pitchFamily="49" charset="0"/>
+                <a:cs typeface="Consolas" panose="020B0609020204030204" pitchFamily="49" charset="0"/>
+              </a:rPr>
+            </a:br>
+            <a:r>
+              <a:rPr lang="en-GB" sz="2400" dirty="0">
+                <a:latin typeface="Consolas" panose="020B0609020204030204" pitchFamily="49" charset="0"/>
+                <a:cs typeface="Consolas" panose="020B0609020204030204" pitchFamily="49" charset="0"/>
+              </a:rPr>
+              <a:t>k8s/06_helm</a:t>
+            </a:r>
+            <a:br>
+              <a:rPr lang="en-GB" sz="2400" dirty="0">
+                <a:latin typeface="Consolas" panose="020B0609020204030204" pitchFamily="49" charset="0"/>
+                <a:cs typeface="Consolas" panose="020B0609020204030204" pitchFamily="49" charset="0"/>
+              </a:rPr>
+            </a:br>
+            <a:r>
+              <a:rPr lang="en-GB" sz="1400" dirty="0">
+                <a:solidFill>
+                  <a:schemeClr val="tx1">
+                    <a:lumMod val="65000"/>
+                    <a:lumOff val="35000"/>
+                  </a:schemeClr>
+                </a:solidFill>
+                <a:latin typeface="Consolas" panose="020B0609020204030204" pitchFamily="49" charset="0"/>
+                <a:cs typeface="Consolas" panose="020B0609020204030204" pitchFamily="49" charset="0"/>
+              </a:rPr>
+              <a:t>(helm template)</a:t>
+            </a:r>
+            <a:endParaRPr lang="en-PL" sz="1400" dirty="0">
+              <a:solidFill>
+                <a:schemeClr val="tx1">
+                  <a:lumMod val="65000"/>
+                  <a:lumOff val="35000"/>
+                </a:schemeClr>
+              </a:solidFill>
+              <a:latin typeface="Consolas" panose="020B0609020204030204" pitchFamily="49" charset="0"/>
+              <a:cs typeface="Consolas" panose="020B0609020204030204" pitchFamily="49" charset="0"/>
+            </a:endParaRPr>
+          </a:p>
+        </p:txBody>
+      </p:sp>
+    </p:spTree>
+    <p:extLst>
+      <p:ext uri="{BB962C8B-B14F-4D97-AF65-F5344CB8AC3E}">
+        <p14:creationId xmlns:p14="http://schemas.microsoft.com/office/powerpoint/2010/main" val="3425719009"/>
+      </p:ext>
+    </p:extLst>
+  </p:cSld>
+  <p:clrMapOvr>
+    <a:masterClrMapping/>
+  </p:clrMapOvr>
+</p:sld>
+</file>
+
+<file path=ppt/slides/slide21.xml><?xml version="1.0" encoding="utf-8"?>
+<p:sld xmlns:a="http://schemas.openxmlformats.org/drawingml/2006/main" xmlns:r="http://schemas.openxmlformats.org/officeDocument/2006/relationships" xmlns:p="http://schemas.openxmlformats.org/presentationml/2006/main">
+  <p:cSld>
+    <p:spTree>
+      <p:nvGrpSpPr>
+        <p:cNvPr id="1" name="">
+          <a:extLst>
+            <a:ext uri="{FF2B5EF4-FFF2-40B4-BE49-F238E27FC236}">
+              <a16:creationId xmlns:a16="http://schemas.microsoft.com/office/drawing/2014/main" id="{AFBE7A11-C14A-5471-D069-542C8B273A43}"/>
+            </a:ext>
+          </a:extLst>
+        </p:cNvPr>
+        <p:cNvGrpSpPr/>
+        <p:nvPr/>
+      </p:nvGrpSpPr>
+      <p:grpSpPr>
+        <a:xfrm>
+          <a:off x="0" y="0"/>
+          <a:ext cx="0" cy="0"/>
+          <a:chOff x="0" y="0"/>
+          <a:chExt cx="0" cy="0"/>
+        </a:xfrm>
+      </p:grpSpPr>
+      <p:sp>
+        <p:nvSpPr>
+          <p:cNvPr id="2" name="Title 1">
+            <a:extLst>
+              <a:ext uri="{FF2B5EF4-FFF2-40B4-BE49-F238E27FC236}">
+                <a16:creationId xmlns:a16="http://schemas.microsoft.com/office/drawing/2014/main" id="{01C2A13C-3448-8013-E83C-CFAC810BA9C9}"/>
+              </a:ext>
+            </a:extLst>
+          </p:cNvPr>
+          <p:cNvSpPr>
+            <a:spLocks noGrp="1"/>
+          </p:cNvSpPr>
+          <p:nvPr>
+            <p:ph type="ctrTitle"/>
+          </p:nvPr>
+        </p:nvSpPr>
+        <p:spPr>
+          <a:xfrm>
+            <a:off x="1524000" y="1458686"/>
+            <a:ext cx="9144000" cy="1681163"/>
+          </a:xfrm>
+        </p:spPr>
+        <p:txBody>
+          <a:bodyPr>
+            <a:normAutofit/>
+          </a:bodyPr>
+          <a:lstStyle/>
+          <a:p>
+            <a:r>
+              <a:rPr lang="en-PL" sz="8000" dirty="0"/>
+              <a:t>ArgoCD</a:t>
+            </a:r>
+          </a:p>
+        </p:txBody>
+      </p:sp>
+      <p:sp>
+        <p:nvSpPr>
+          <p:cNvPr id="3" name="Subtitle 2">
+            <a:extLst>
+              <a:ext uri="{FF2B5EF4-FFF2-40B4-BE49-F238E27FC236}">
+                <a16:creationId xmlns:a16="http://schemas.microsoft.com/office/drawing/2014/main" id="{551F728E-B94A-562E-3127-EFE8320FF74B}"/>
+              </a:ext>
+            </a:extLst>
+          </p:cNvPr>
+          <p:cNvSpPr>
+            <a:spLocks noGrp="1"/>
+          </p:cNvSpPr>
+          <p:nvPr>
+            <p:ph type="subTitle" idx="1"/>
+          </p:nvPr>
+        </p:nvSpPr>
+        <p:spPr>
+          <a:xfrm>
+            <a:off x="1600200" y="3429000"/>
+            <a:ext cx="9144000" cy="1970314"/>
+          </a:xfrm>
+        </p:spPr>
+        <p:txBody>
+          <a:bodyPr>
+            <a:normAutofit/>
+          </a:bodyPr>
+          <a:lstStyle/>
+          <a:p>
+            <a:br>
+              <a:rPr lang="en-PL" dirty="0"/>
+            </a:br>
+            <a:r>
+              <a:rPr lang="en-GB" dirty="0"/>
+              <a:t>continuous delivery tool for Kubernetes</a:t>
+            </a:r>
+            <a:endParaRPr lang="en-PL" dirty="0"/>
+          </a:p>
+        </p:txBody>
+      </p:sp>
+    </p:spTree>
+    <p:extLst>
+      <p:ext uri="{BB962C8B-B14F-4D97-AF65-F5344CB8AC3E}">
+        <p14:creationId xmlns:p14="http://schemas.microsoft.com/office/powerpoint/2010/main" val="1015289644"/>
+      </p:ext>
+    </p:extLst>
+  </p:cSld>
+  <p:clrMapOvr>
+    <a:masterClrMapping/>
+  </p:clrMapOvr>
+</p:sld>
+</file>
+
+<file path=ppt/slides/slide22.xml><?xml version="1.0" encoding="utf-8"?>
+<p:sld xmlns:a="http://schemas.openxmlformats.org/drawingml/2006/main" xmlns:r="http://schemas.openxmlformats.org/officeDocument/2006/relationships" xmlns:p="http://schemas.openxmlformats.org/presentationml/2006/main">
+  <p:cSld>
+    <p:spTree>
+      <p:nvGrpSpPr>
+        <p:cNvPr id="1" name=""/>
+        <p:cNvGrpSpPr/>
+        <p:nvPr/>
+      </p:nvGrpSpPr>
+      <p:grpSpPr>
+        <a:xfrm>
+          <a:off x="0" y="0"/>
+          <a:ext cx="0" cy="0"/>
+          <a:chOff x="0" y="0"/>
+          <a:chExt cx="0" cy="0"/>
+        </a:xfrm>
+      </p:grpSpPr>
+      <p:sp>
+        <p:nvSpPr>
+          <p:cNvPr id="4" name="Rectangle 3">
+            <a:extLst>
+              <a:ext uri="{FF2B5EF4-FFF2-40B4-BE49-F238E27FC236}">
+                <a16:creationId xmlns:a16="http://schemas.microsoft.com/office/drawing/2014/main" id="{F24676DA-A08E-F3DC-2CD0-67AE7A3DC7A8}"/>
+              </a:ext>
+            </a:extLst>
+          </p:cNvPr>
+          <p:cNvSpPr/>
+          <p:nvPr/>
+        </p:nvSpPr>
+        <p:spPr>
+          <a:xfrm>
+            <a:off x="1928388" y="2121905"/>
+            <a:ext cx="3132499" cy="2614189"/>
+          </a:xfrm>
+          <a:prstGeom prst="rect">
+            <a:avLst/>
+          </a:prstGeom>
+        </p:spPr>
+        <p:style>
+          <a:lnRef idx="2">
+            <a:schemeClr val="accent1">
+              <a:shade val="15000"/>
+            </a:schemeClr>
+          </a:lnRef>
+          <a:fillRef idx="1">
+            <a:schemeClr val="accent1"/>
+          </a:fillRef>
+          <a:effectRef idx="0">
+            <a:schemeClr val="accent1"/>
+          </a:effectRef>
+          <a:fontRef idx="minor">
+            <a:schemeClr val="lt1"/>
+          </a:fontRef>
+        </p:style>
+        <p:txBody>
+          <a:bodyPr rtlCol="0" anchor="ctr"/>
+          <a:lstStyle/>
+          <a:p>
+            <a:pPr algn="ctr"/>
+            <a:r>
+              <a:rPr lang="en-PL" sz="3600" dirty="0"/>
+              <a:t>Target state</a:t>
+            </a:r>
+            <a:br>
+              <a:rPr lang="en-PL" sz="3600" dirty="0"/>
+            </a:br>
+            <a:r>
+              <a:rPr lang="en-PL" sz="2000" dirty="0"/>
+              <a:t>(github)</a:t>
+            </a:r>
+          </a:p>
+        </p:txBody>
+      </p:sp>
+      <p:sp>
+        <p:nvSpPr>
+          <p:cNvPr id="5" name="Rectangle 4">
+            <a:extLst>
+              <a:ext uri="{FF2B5EF4-FFF2-40B4-BE49-F238E27FC236}">
+                <a16:creationId xmlns:a16="http://schemas.microsoft.com/office/drawing/2014/main" id="{780BC0DC-D2D3-6D93-EA24-BCC512E30DB3}"/>
+              </a:ext>
+            </a:extLst>
+          </p:cNvPr>
+          <p:cNvSpPr/>
+          <p:nvPr/>
+        </p:nvSpPr>
+        <p:spPr>
+          <a:xfrm>
+            <a:off x="7087355" y="2121906"/>
+            <a:ext cx="3197381" cy="2614188"/>
+          </a:xfrm>
+          <a:prstGeom prst="rect">
+            <a:avLst/>
+          </a:prstGeom>
+        </p:spPr>
+        <p:style>
+          <a:lnRef idx="2">
+            <a:schemeClr val="accent1">
+              <a:shade val="15000"/>
+            </a:schemeClr>
+          </a:lnRef>
+          <a:fillRef idx="1">
+            <a:schemeClr val="accent1"/>
+          </a:fillRef>
+          <a:effectRef idx="0">
+            <a:schemeClr val="accent1"/>
+          </a:effectRef>
+          <a:fontRef idx="minor">
+            <a:schemeClr val="lt1"/>
+          </a:fontRef>
+        </p:style>
+        <p:txBody>
+          <a:bodyPr rtlCol="0" anchor="ctr"/>
+          <a:lstStyle/>
+          <a:p>
+            <a:pPr algn="ctr"/>
+            <a:r>
+              <a:rPr lang="en-PL" sz="3600" dirty="0"/>
+              <a:t>Live state</a:t>
+            </a:r>
+            <a:br>
+              <a:rPr lang="en-PL" sz="3600" dirty="0"/>
+            </a:br>
+            <a:r>
+              <a:rPr lang="en-PL" sz="2000" dirty="0"/>
+              <a:t>(kubernetes cluster)</a:t>
+            </a:r>
+          </a:p>
+        </p:txBody>
+      </p:sp>
+      <p:cxnSp>
+        <p:nvCxnSpPr>
+          <p:cNvPr id="7" name="Straight Arrow Connector 6">
+            <a:extLst>
+              <a:ext uri="{FF2B5EF4-FFF2-40B4-BE49-F238E27FC236}">
+                <a16:creationId xmlns:a16="http://schemas.microsoft.com/office/drawing/2014/main" id="{697521FB-55B4-99C2-A05D-9E55D1EB11BB}"/>
+              </a:ext>
+            </a:extLst>
+          </p:cNvPr>
+          <p:cNvCxnSpPr>
+            <a:cxnSpLocks/>
+            <a:stCxn id="4" idx="3"/>
+            <a:endCxn id="5" idx="1"/>
+          </p:cNvCxnSpPr>
+          <p:nvPr/>
+        </p:nvCxnSpPr>
+        <p:spPr>
+          <a:xfrm>
+            <a:off x="5060887" y="3429000"/>
+            <a:ext cx="2026468" cy="0"/>
+          </a:xfrm>
+          <a:prstGeom prst="straightConnector1">
+            <a:avLst/>
+          </a:prstGeom>
+          <a:ln w="76200">
+            <a:tailEnd type="triangle"/>
+          </a:ln>
+        </p:spPr>
+        <p:style>
+          <a:lnRef idx="1">
+            <a:schemeClr val="accent2"/>
+          </a:lnRef>
+          <a:fillRef idx="0">
+            <a:schemeClr val="accent2"/>
+          </a:fillRef>
+          <a:effectRef idx="0">
+            <a:schemeClr val="accent2"/>
+          </a:effectRef>
+          <a:fontRef idx="minor">
+            <a:schemeClr val="tx1"/>
+          </a:fontRef>
+        </p:style>
+      </p:cxnSp>
+      <p:sp>
+        <p:nvSpPr>
+          <p:cNvPr id="8" name="TextBox 7">
+            <a:extLst>
+              <a:ext uri="{FF2B5EF4-FFF2-40B4-BE49-F238E27FC236}">
+                <a16:creationId xmlns:a16="http://schemas.microsoft.com/office/drawing/2014/main" id="{CB90FDAD-D6F7-7BCC-8163-13688C4B2C7B}"/>
+              </a:ext>
+            </a:extLst>
+          </p:cNvPr>
+          <p:cNvSpPr txBox="1"/>
+          <p:nvPr/>
+        </p:nvSpPr>
+        <p:spPr>
+          <a:xfrm>
+            <a:off x="5513910" y="2649526"/>
+            <a:ext cx="1152431" cy="646331"/>
+          </a:xfrm>
+          <a:prstGeom prst="rect">
+            <a:avLst/>
+          </a:prstGeom>
+          <a:noFill/>
+        </p:spPr>
+        <p:txBody>
+          <a:bodyPr wrap="none" rtlCol="0">
+            <a:spAutoFit/>
+          </a:bodyPr>
+          <a:lstStyle/>
+          <a:p>
+            <a:r>
+              <a:rPr lang="en-PL" sz="3600" dirty="0">
+                <a:solidFill>
+                  <a:schemeClr val="accent2">
+                    <a:lumMod val="75000"/>
+                  </a:schemeClr>
+                </a:solidFill>
+              </a:rPr>
+              <a:t>Sync</a:t>
+            </a:r>
+          </a:p>
+        </p:txBody>
+      </p:sp>
+    </p:spTree>
+    <p:extLst>
+      <p:ext uri="{BB962C8B-B14F-4D97-AF65-F5344CB8AC3E}">
+        <p14:creationId xmlns:p14="http://schemas.microsoft.com/office/powerpoint/2010/main" val="1456726916"/>
+      </p:ext>
+    </p:extLst>
+  </p:cSld>
+  <p:clrMapOvr>
+    <a:masterClrMapping/>
+  </p:clrMapOvr>
+</p:sld>
+</file>
+
+<file path=ppt/slides/slide23.xml><?xml version="1.0" encoding="utf-8"?>
+<p:sld xmlns:a="http://schemas.openxmlformats.org/drawingml/2006/main" xmlns:r="http://schemas.openxmlformats.org/officeDocument/2006/relationships" xmlns:p="http://schemas.openxmlformats.org/presentationml/2006/main">
+  <p:cSld>
+    <p:spTree>
+      <p:nvGrpSpPr>
+        <p:cNvPr id="1" name="">
+          <a:extLst>
+            <a:ext uri="{FF2B5EF4-FFF2-40B4-BE49-F238E27FC236}">
+              <a16:creationId xmlns:a16="http://schemas.microsoft.com/office/drawing/2014/main" id="{1285B941-FFF2-4A96-C026-CCBBE5F47B4D}"/>
+            </a:ext>
+          </a:extLst>
+        </p:cNvPr>
+        <p:cNvGrpSpPr/>
+        <p:nvPr/>
+      </p:nvGrpSpPr>
+      <p:grpSpPr>
+        <a:xfrm>
+          <a:off x="0" y="0"/>
+          <a:ext cx="0" cy="0"/>
+          <a:chOff x="0" y="0"/>
+          <a:chExt cx="0" cy="0"/>
+        </a:xfrm>
+      </p:grpSpPr>
+      <p:sp>
+        <p:nvSpPr>
+          <p:cNvPr id="2" name="Title 1">
+            <a:extLst>
+              <a:ext uri="{FF2B5EF4-FFF2-40B4-BE49-F238E27FC236}">
+                <a16:creationId xmlns:a16="http://schemas.microsoft.com/office/drawing/2014/main" id="{DD61344D-2FDD-EF89-8DBE-F86D5B708AB9}"/>
+              </a:ext>
+            </a:extLst>
+          </p:cNvPr>
+          <p:cNvSpPr>
+            <a:spLocks noGrp="1"/>
+          </p:cNvSpPr>
+          <p:nvPr>
+            <p:ph type="title"/>
+          </p:nvPr>
+        </p:nvSpPr>
+        <p:spPr>
+          <a:xfrm>
+            <a:off x="2264228" y="1977231"/>
+            <a:ext cx="7663543" cy="2903537"/>
+          </a:xfrm>
+        </p:spPr>
+        <p:txBody>
+          <a:bodyPr>
+            <a:normAutofit/>
+          </a:bodyPr>
+          <a:lstStyle/>
+          <a:p>
+            <a:pPr algn="ctr"/>
+            <a:r>
+              <a:rPr lang="en-GB" sz="4800" dirty="0">
+                <a:latin typeface="Consolas" panose="020B0609020204030204" pitchFamily="49" charset="0"/>
+                <a:cs typeface="Consolas" panose="020B0609020204030204" pitchFamily="49" charset="0"/>
+              </a:rPr>
+              <a:t>D</a:t>
+            </a:r>
+            <a:r>
+              <a:rPr lang="en-PL" sz="4800" dirty="0">
+                <a:latin typeface="Consolas" panose="020B0609020204030204" pitchFamily="49" charset="0"/>
+                <a:cs typeface="Consolas" panose="020B0609020204030204" pitchFamily="49" charset="0"/>
+              </a:rPr>
+              <a:t>emo</a:t>
+            </a:r>
+            <a:br>
+              <a:rPr lang="en-PL" sz="2400" dirty="0">
+                <a:latin typeface="Consolas" panose="020B0609020204030204" pitchFamily="49" charset="0"/>
+                <a:cs typeface="Consolas" panose="020B0609020204030204" pitchFamily="49" charset="0"/>
+              </a:rPr>
+            </a:br>
+            <a:br>
+              <a:rPr lang="en-PL" sz="2400" dirty="0">
+                <a:latin typeface="Consolas" panose="020B0609020204030204" pitchFamily="49" charset="0"/>
+                <a:cs typeface="Consolas" panose="020B0609020204030204" pitchFamily="49" charset="0"/>
+              </a:rPr>
+            </a:br>
+            <a:r>
+              <a:rPr lang="en-GB" sz="2400" dirty="0">
+                <a:latin typeface="Consolas" panose="020B0609020204030204" pitchFamily="49" charset="0"/>
+                <a:cs typeface="Consolas" panose="020B0609020204030204" pitchFamily="49" charset="0"/>
+              </a:rPr>
+              <a:t>k8s/07_argo</a:t>
+            </a:r>
+            <a:endParaRPr lang="en-PL" sz="2400" dirty="0">
+              <a:latin typeface="Consolas" panose="020B0609020204030204" pitchFamily="49" charset="0"/>
+              <a:cs typeface="Consolas" panose="020B0609020204030204" pitchFamily="49" charset="0"/>
+            </a:endParaRPr>
+          </a:p>
+        </p:txBody>
+      </p:sp>
+    </p:spTree>
+    <p:extLst>
+      <p:ext uri="{BB962C8B-B14F-4D97-AF65-F5344CB8AC3E}">
+        <p14:creationId xmlns:p14="http://schemas.microsoft.com/office/powerpoint/2010/main" val="2402412717"/>
+      </p:ext>
+    </p:extLst>
+  </p:cSld>
+  <p:clrMapOvr>
+    <a:masterClrMapping/>
+  </p:clrMapOvr>
+</p:sld>
+</file>
+
+<file path=ppt/slides/slide24.xml><?xml version="1.0" encoding="utf-8"?>
+<p:sld xmlns:a="http://schemas.openxmlformats.org/drawingml/2006/main" xmlns:r="http://schemas.openxmlformats.org/officeDocument/2006/relationships" xmlns:p="http://schemas.openxmlformats.org/presentationml/2006/main">
+  <p:cSld>
+    <p:spTree>
+      <p:nvGrpSpPr>
+        <p:cNvPr id="1" name="">
+          <a:extLst>
+            <a:ext uri="{FF2B5EF4-FFF2-40B4-BE49-F238E27FC236}">
+              <a16:creationId xmlns:a16="http://schemas.microsoft.com/office/drawing/2014/main" id="{D732560D-9DC7-D53A-33D3-705BE4520055}"/>
+            </a:ext>
+          </a:extLst>
+        </p:cNvPr>
+        <p:cNvGrpSpPr/>
+        <p:nvPr/>
+      </p:nvGrpSpPr>
+      <p:grpSpPr>
+        <a:xfrm>
+          <a:off x="0" y="0"/>
+          <a:ext cx="0" cy="0"/>
+          <a:chOff x="0" y="0"/>
+          <a:chExt cx="0" cy="0"/>
+        </a:xfrm>
+      </p:grpSpPr>
+      <p:sp>
+        <p:nvSpPr>
+          <p:cNvPr id="2" name="Title 1">
+            <a:extLst>
+              <a:ext uri="{FF2B5EF4-FFF2-40B4-BE49-F238E27FC236}">
+                <a16:creationId xmlns:a16="http://schemas.microsoft.com/office/drawing/2014/main" id="{68130EF9-4AB6-9E58-6066-8702A710948F}"/>
+              </a:ext>
+            </a:extLst>
+          </p:cNvPr>
+          <p:cNvSpPr>
+            <a:spLocks noGrp="1"/>
+          </p:cNvSpPr>
+          <p:nvPr>
+            <p:ph type="title"/>
+          </p:nvPr>
+        </p:nvSpPr>
+        <p:spPr>
+          <a:xfrm>
+            <a:off x="2264228" y="1977231"/>
+            <a:ext cx="7663543" cy="2903537"/>
+          </a:xfrm>
+        </p:spPr>
+        <p:txBody>
+          <a:bodyPr>
+            <a:normAutofit/>
+          </a:bodyPr>
+          <a:lstStyle/>
+          <a:p>
+            <a:pPr algn="ctr"/>
+            <a:r>
+              <a:rPr lang="en-GB" sz="4800" dirty="0">
+                <a:latin typeface="Consolas" panose="020B0609020204030204" pitchFamily="49" charset="0"/>
+                <a:cs typeface="Consolas" panose="020B0609020204030204" pitchFamily="49" charset="0"/>
+              </a:rPr>
+              <a:t>D</a:t>
+            </a:r>
+            <a:r>
+              <a:rPr lang="en-PL" sz="4800" dirty="0">
+                <a:latin typeface="Consolas" panose="020B0609020204030204" pitchFamily="49" charset="0"/>
+                <a:cs typeface="Consolas" panose="020B0609020204030204" pitchFamily="49" charset="0"/>
+              </a:rPr>
+              <a:t>emo</a:t>
+            </a:r>
+            <a:br>
+              <a:rPr lang="en-PL" sz="2400" dirty="0">
+                <a:latin typeface="Consolas" panose="020B0609020204030204" pitchFamily="49" charset="0"/>
+                <a:cs typeface="Consolas" panose="020B0609020204030204" pitchFamily="49" charset="0"/>
+              </a:rPr>
+            </a:br>
+            <a:br>
+              <a:rPr lang="en-PL" sz="2400" dirty="0">
+                <a:latin typeface="Consolas" panose="020B0609020204030204" pitchFamily="49" charset="0"/>
+                <a:cs typeface="Consolas" panose="020B0609020204030204" pitchFamily="49" charset="0"/>
+              </a:rPr>
+            </a:br>
+            <a:r>
+              <a:rPr lang="en-GB" sz="2400" dirty="0">
+                <a:latin typeface="Consolas" panose="020B0609020204030204" pitchFamily="49" charset="0"/>
+                <a:cs typeface="Consolas" panose="020B0609020204030204" pitchFamily="49" charset="0"/>
+              </a:rPr>
+              <a:t>apply change in GH repo </a:t>
+            </a:r>
+            <a:r>
+              <a:rPr lang="en-GB" sz="2400" b="1" dirty="0">
+                <a:solidFill>
+                  <a:srgbClr val="FF0000"/>
+                </a:solidFill>
+                <a:latin typeface="Consolas" panose="020B0609020204030204" pitchFamily="49" charset="0"/>
+                <a:cs typeface="Consolas" panose="020B0609020204030204" pitchFamily="49" charset="0"/>
+              </a:rPr>
+              <a:t>(source) </a:t>
+            </a:r>
+            <a:r>
+              <a:rPr lang="en-GB" sz="2400" dirty="0">
+                <a:latin typeface="Consolas" panose="020B0609020204030204" pitchFamily="49" charset="0"/>
+                <a:cs typeface="Consolas" panose="020B0609020204030204" pitchFamily="49" charset="0"/>
+              </a:rPr>
+              <a:t>and see changes reflected in k8s cluster </a:t>
+            </a:r>
+            <a:r>
+              <a:rPr lang="en-GB" sz="2400" b="1" dirty="0">
+                <a:solidFill>
+                  <a:srgbClr val="FF0000"/>
+                </a:solidFill>
+                <a:latin typeface="Consolas" panose="020B0609020204030204" pitchFamily="49" charset="0"/>
+                <a:cs typeface="Consolas" panose="020B0609020204030204" pitchFamily="49" charset="0"/>
+              </a:rPr>
+              <a:t>(target)</a:t>
+            </a:r>
+            <a:endParaRPr lang="en-PL" sz="2400" b="1" dirty="0">
+              <a:solidFill>
+                <a:srgbClr val="FF0000"/>
+              </a:solidFill>
+              <a:latin typeface="Consolas" panose="020B0609020204030204" pitchFamily="49" charset="0"/>
+              <a:cs typeface="Consolas" panose="020B0609020204030204" pitchFamily="49" charset="0"/>
+            </a:endParaRPr>
+          </a:p>
+        </p:txBody>
+      </p:sp>
+    </p:spTree>
+    <p:extLst>
+      <p:ext uri="{BB962C8B-B14F-4D97-AF65-F5344CB8AC3E}">
+        <p14:creationId xmlns:p14="http://schemas.microsoft.com/office/powerpoint/2010/main" val="2908782905"/>
+      </p:ext>
+    </p:extLst>
+  </p:cSld>
+  <p:clrMapOvr>
+    <a:masterClrMapping/>
+  </p:clrMapOvr>
+</p:sld>
+</file>
+
+<file path=ppt/slides/slide25.xml><?xml version="1.0" encoding="utf-8"?>
+<p:sld xmlns:a="http://schemas.openxmlformats.org/drawingml/2006/main" xmlns:r="http://schemas.openxmlformats.org/officeDocument/2006/relationships" xmlns:p="http://schemas.openxmlformats.org/presentationml/2006/main">
+  <p:cSld>
+    <p:spTree>
+      <p:nvGrpSpPr>
+        <p:cNvPr id="1" name="">
+          <a:extLst>
+            <a:ext uri="{FF2B5EF4-FFF2-40B4-BE49-F238E27FC236}">
+              <a16:creationId xmlns:a16="http://schemas.microsoft.com/office/drawing/2014/main" id="{8BE49778-AC65-6D05-C9E0-C4F99BE05E63}"/>
+            </a:ext>
+          </a:extLst>
+        </p:cNvPr>
+        <p:cNvGrpSpPr/>
+        <p:nvPr/>
+      </p:nvGrpSpPr>
+      <p:grpSpPr>
+        <a:xfrm>
+          <a:off x="0" y="0"/>
+          <a:ext cx="0" cy="0"/>
+          <a:chOff x="0" y="0"/>
+          <a:chExt cx="0" cy="0"/>
+        </a:xfrm>
+      </p:grpSpPr>
+      <p:sp>
+        <p:nvSpPr>
+          <p:cNvPr id="2" name="Title 1">
+            <a:extLst>
+              <a:ext uri="{FF2B5EF4-FFF2-40B4-BE49-F238E27FC236}">
+                <a16:creationId xmlns:a16="http://schemas.microsoft.com/office/drawing/2014/main" id="{8F4F0C95-F61A-B419-7FEC-D1B328A7262B}"/>
+              </a:ext>
+            </a:extLst>
+          </p:cNvPr>
+          <p:cNvSpPr>
+            <a:spLocks noGrp="1"/>
+          </p:cNvSpPr>
+          <p:nvPr>
+            <p:ph type="ctrTitle"/>
+          </p:nvPr>
+        </p:nvSpPr>
+        <p:spPr>
+          <a:xfrm>
+            <a:off x="1524000" y="1458686"/>
+            <a:ext cx="9144000" cy="1681163"/>
+          </a:xfrm>
+        </p:spPr>
+        <p:txBody>
+          <a:bodyPr>
+            <a:normAutofit/>
+          </a:bodyPr>
+          <a:lstStyle/>
+          <a:p>
+            <a:r>
+              <a:rPr lang="en-PL" sz="8000" dirty="0"/>
+              <a:t>Keda</a:t>
+            </a:r>
+          </a:p>
+        </p:txBody>
+      </p:sp>
+      <p:sp>
+        <p:nvSpPr>
+          <p:cNvPr id="3" name="Subtitle 2">
+            <a:extLst>
+              <a:ext uri="{FF2B5EF4-FFF2-40B4-BE49-F238E27FC236}">
+                <a16:creationId xmlns:a16="http://schemas.microsoft.com/office/drawing/2014/main" id="{6C7F780A-FC9E-84A1-030D-A0284D4AB6DA}"/>
+              </a:ext>
+            </a:extLst>
+          </p:cNvPr>
+          <p:cNvSpPr>
+            <a:spLocks noGrp="1"/>
+          </p:cNvSpPr>
+          <p:nvPr>
+            <p:ph type="subTitle" idx="1"/>
+          </p:nvPr>
+        </p:nvSpPr>
+        <p:spPr>
+          <a:xfrm>
+            <a:off x="1600200" y="3429000"/>
+            <a:ext cx="9144000" cy="1970314"/>
+          </a:xfrm>
+        </p:spPr>
+        <p:txBody>
+          <a:bodyPr>
+            <a:normAutofit/>
+          </a:bodyPr>
+          <a:lstStyle/>
+          <a:p>
+            <a:endParaRPr lang="en-PL" dirty="0"/>
+          </a:p>
+        </p:txBody>
+      </p:sp>
+    </p:spTree>
+    <p:extLst>
+      <p:ext uri="{BB962C8B-B14F-4D97-AF65-F5344CB8AC3E}">
+        <p14:creationId xmlns:p14="http://schemas.microsoft.com/office/powerpoint/2010/main" val="2150785153"/>
+      </p:ext>
+    </p:extLst>
+  </p:cSld>
+  <p:clrMapOvr>
+    <a:masterClrMapping/>
+  </p:clrMapOvr>
+</p:sld>
+</file>
+
+<file path=ppt/slides/slide26.xml><?xml version="1.0" encoding="utf-8"?>
+<p:sld xmlns:a="http://schemas.openxmlformats.org/drawingml/2006/main" xmlns:r="http://schemas.openxmlformats.org/officeDocument/2006/relationships" xmlns:p="http://schemas.openxmlformats.org/presentationml/2006/main">
+  <p:cSld>
+    <p:spTree>
+      <p:nvGrpSpPr>
+        <p:cNvPr id="1" name=""/>
+        <p:cNvGrpSpPr/>
+        <p:nvPr/>
+      </p:nvGrpSpPr>
+      <p:grpSpPr>
+        <a:xfrm>
+          <a:off x="0" y="0"/>
+          <a:ext cx="0" cy="0"/>
+          <a:chOff x="0" y="0"/>
+          <a:chExt cx="0" cy="0"/>
+        </a:xfrm>
+      </p:grpSpPr>
+      <p:sp>
+        <p:nvSpPr>
+          <p:cNvPr id="2" name="Title 1">
+            <a:extLst>
+              <a:ext uri="{FF2B5EF4-FFF2-40B4-BE49-F238E27FC236}">
+                <a16:creationId xmlns:a16="http://schemas.microsoft.com/office/drawing/2014/main" id="{63C5CC79-8E1A-4F51-563A-BEB7F4DDDBAE}"/>
+              </a:ext>
+            </a:extLst>
+          </p:cNvPr>
+          <p:cNvSpPr>
+            <a:spLocks noGrp="1"/>
+          </p:cNvSpPr>
+          <p:nvPr>
+            <p:ph type="title"/>
+          </p:nvPr>
+        </p:nvSpPr>
+        <p:spPr/>
+        <p:txBody>
+          <a:bodyPr/>
+          <a:lstStyle/>
+          <a:p>
+            <a:r>
+              <a:rPr lang="en-PL" dirty="0"/>
+              <a:t>Sources</a:t>
+            </a:r>
+          </a:p>
+        </p:txBody>
+      </p:sp>
+      <p:sp>
+        <p:nvSpPr>
+          <p:cNvPr id="3" name="Content Placeholder 2">
+            <a:extLst>
+              <a:ext uri="{FF2B5EF4-FFF2-40B4-BE49-F238E27FC236}">
+                <a16:creationId xmlns:a16="http://schemas.microsoft.com/office/drawing/2014/main" id="{9AB200A5-57CA-EC57-2BCF-B1DD4988CBCF}"/>
+              </a:ext>
+            </a:extLst>
+          </p:cNvPr>
+          <p:cNvSpPr>
+            <a:spLocks noGrp="1"/>
+          </p:cNvSpPr>
+          <p:nvPr>
+            <p:ph idx="1"/>
+          </p:nvPr>
+        </p:nvSpPr>
+        <p:spPr/>
+        <p:txBody>
+          <a:bodyPr/>
+          <a:lstStyle/>
+          <a:p>
+            <a:r>
+              <a:rPr lang="en-PL" dirty="0"/>
+              <a:t>Docs1 - </a:t>
+            </a:r>
+            <a:r>
+              <a:rPr lang="en-GB" dirty="0"/>
+              <a:t>https://</a:t>
+            </a:r>
+            <a:r>
+              <a:rPr lang="en-GB" dirty="0" err="1"/>
+              <a:t>kubernetes.io</a:t>
+            </a:r>
+            <a:r>
+              <a:rPr lang="en-GB" dirty="0"/>
+              <a:t>/docs/home/</a:t>
+            </a:r>
+            <a:endParaRPr lang="en-PL" dirty="0"/>
+          </a:p>
+          <a:p>
+            <a:r>
+              <a:rPr lang="en-PL" dirty="0"/>
+              <a:t>Docs2 - </a:t>
+            </a:r>
+            <a:r>
+              <a:rPr lang="en-GB" dirty="0"/>
+              <a:t>https://</a:t>
+            </a:r>
+            <a:r>
+              <a:rPr lang="en-GB" dirty="0" err="1"/>
+              <a:t>helm.sh</a:t>
+            </a:r>
+            <a:r>
+              <a:rPr lang="en-GB" dirty="0"/>
+              <a:t>/docs/topics/charts/</a:t>
+            </a:r>
+            <a:endParaRPr lang="en-PL" dirty="0"/>
+          </a:p>
+          <a:p>
+            <a:endParaRPr lang="en-PL" dirty="0"/>
+          </a:p>
+          <a:p>
+            <a:r>
+              <a:rPr lang="en-GB" dirty="0"/>
+              <a:t>Diagram</a:t>
+            </a:r>
+            <a:r>
+              <a:rPr lang="en-PL" dirty="0"/>
+              <a:t>1 [IRSA] - </a:t>
+            </a:r>
+            <a:r>
+              <a:rPr lang="en-GB" dirty="0"/>
+              <a:t>https://mohaamer5.medium.com/iam-roles-for-service-accounts-with-eks-irsa-good-bye-aws-credentials-1cdf1fa5192</a:t>
+            </a:r>
+            <a:endParaRPr lang="en-PL" dirty="0"/>
+          </a:p>
+        </p:txBody>
+      </p:sp>
+    </p:spTree>
+    <p:extLst>
+      <p:ext uri="{BB962C8B-B14F-4D97-AF65-F5344CB8AC3E}">
+        <p14:creationId xmlns:p14="http://schemas.microsoft.com/office/powerpoint/2010/main" val="1092334499"/>
       </p:ext>
     </p:extLst>
   </p:cSld>
@@ -5312,11 +7806,13 @@
           </a:xfrm>
         </p:spPr>
         <p:txBody>
-          <a:bodyPr/>
-          <a:lstStyle/>
-          <a:p>
-            <a:r>
-              <a:rPr lang="en-PL" dirty="0"/>
+          <a:bodyPr>
+            <a:normAutofit/>
+          </a:bodyPr>
+          <a:lstStyle/>
+          <a:p>
+            <a:r>
+              <a:rPr lang="en-PL" sz="8000" dirty="0"/>
               <a:t>Ingress</a:t>
             </a:r>
           </a:p>
@@ -5783,11 +8279,13 @@
           </a:xfrm>
         </p:spPr>
         <p:txBody>
-          <a:bodyPr/>
-          <a:lstStyle/>
-          <a:p>
-            <a:r>
-              <a:rPr lang="en-PL" dirty="0"/>
+          <a:bodyPr>
+            <a:normAutofit/>
+          </a:bodyPr>
+          <a:lstStyle/>
+          <a:p>
+            <a:r>
+              <a:rPr lang="en-PL" sz="8000" dirty="0"/>
               <a:t>Service Accounts</a:t>
             </a:r>
           </a:p>
@@ -5835,10 +8333,22 @@
             </a:r>
             <a:r>
               <a:rPr lang="en-GB" dirty="0"/>
-              <a:t> credentials to identify as that </a:t>
-            </a:r>
-            <a:r>
-              <a:rPr lang="en-GB" dirty="0" err="1"/>
+              <a:t> credentials </a:t>
+            </a:r>
+            <a:r>
+              <a:rPr lang="en-GB" b="1" dirty="0">
+                <a:solidFill>
+                  <a:srgbClr val="FF0000"/>
+                </a:solidFill>
+              </a:rPr>
+              <a:t>to identify as that </a:t>
+            </a:r>
+            <a:r>
+              <a:rPr lang="en-GB" b="1" dirty="0" err="1">
+                <a:solidFill>
+                  <a:srgbClr val="FF0000"/>
+                </a:solidFill>
+              </a:rPr>
               <a:t>ServiceAccount</a:t>
             </a:r>
             <a:r>

</xml_diff>

<commit_message>
Add ArgoCD diagram for UP applications
</commit_message>
<xml_diff>
--- a/kubernetes_vol2.pptx
+++ b/kubernetes_vol2.pptx
@@ -5,7 +5,7 @@
     <p:sldMasterId id="2147483648" r:id="rId1"/>
   </p:sldMasterIdLst>
   <p:notesMasterIdLst>
-    <p:notesMasterId r:id="rId28"/>
+    <p:notesMasterId r:id="rId34"/>
   </p:notesMasterIdLst>
   <p:sldIdLst>
     <p:sldId id="270" r:id="rId2"/>
@@ -26,14 +26,20 @@
     <p:sldId id="280" r:id="rId17"/>
     <p:sldId id="259" r:id="rId18"/>
     <p:sldId id="288" r:id="rId19"/>
-    <p:sldId id="287" r:id="rId20"/>
-    <p:sldId id="281" r:id="rId21"/>
-    <p:sldId id="282" r:id="rId22"/>
-    <p:sldId id="284" r:id="rId23"/>
-    <p:sldId id="283" r:id="rId24"/>
-    <p:sldId id="285" r:id="rId25"/>
-    <p:sldId id="286" r:id="rId26"/>
-    <p:sldId id="262" r:id="rId27"/>
+    <p:sldId id="281" r:id="rId20"/>
+    <p:sldId id="282" r:id="rId21"/>
+    <p:sldId id="284" r:id="rId22"/>
+    <p:sldId id="283" r:id="rId23"/>
+    <p:sldId id="289" r:id="rId24"/>
+    <p:sldId id="295" r:id="rId25"/>
+    <p:sldId id="285" r:id="rId26"/>
+    <p:sldId id="290" r:id="rId27"/>
+    <p:sldId id="291" r:id="rId28"/>
+    <p:sldId id="292" r:id="rId29"/>
+    <p:sldId id="293" r:id="rId30"/>
+    <p:sldId id="286" r:id="rId31"/>
+    <p:sldId id="262" r:id="rId32"/>
+    <p:sldId id="294" r:id="rId33"/>
   </p:sldIdLst>
   <p:sldSz cx="12192000" cy="6858000"/>
   <p:notesSz cx="6858000" cy="9144000"/>
@@ -573,6 +579,90 @@
     <p:extLst>
       <p:ext uri="{BB962C8B-B14F-4D97-AF65-F5344CB8AC3E}">
         <p14:creationId xmlns:p14="http://schemas.microsoft.com/office/powerpoint/2010/main" val="857860165"/>
+      </p:ext>
+    </p:extLst>
+  </p:cSld>
+  <p:clrMapOvr>
+    <a:masterClrMapping/>
+  </p:clrMapOvr>
+</p:notes>
+</file>
+
+<file path=ppt/notesSlides/notesSlide2.xml><?xml version="1.0" encoding="utf-8"?>
+<p:notes xmlns:a="http://schemas.openxmlformats.org/drawingml/2006/main" xmlns:r="http://schemas.openxmlformats.org/officeDocument/2006/relationships" xmlns:p="http://schemas.openxmlformats.org/presentationml/2006/main">
+  <p:cSld>
+    <p:spTree>
+      <p:nvGrpSpPr>
+        <p:cNvPr id="1" name=""/>
+        <p:cNvGrpSpPr/>
+        <p:nvPr/>
+      </p:nvGrpSpPr>
+      <p:grpSpPr>
+        <a:xfrm>
+          <a:off x="0" y="0"/>
+          <a:ext cx="0" cy="0"/>
+          <a:chOff x="0" y="0"/>
+          <a:chExt cx="0" cy="0"/>
+        </a:xfrm>
+      </p:grpSpPr>
+      <p:sp>
+        <p:nvSpPr>
+          <p:cNvPr id="2" name="Slide Image Placeholder 1"/>
+          <p:cNvSpPr>
+            <a:spLocks noGrp="1" noRot="1" noChangeAspect="1"/>
+          </p:cNvSpPr>
+          <p:nvPr>
+            <p:ph type="sldImg"/>
+          </p:nvPr>
+        </p:nvSpPr>
+        <p:spPr/>
+      </p:sp>
+      <p:sp>
+        <p:nvSpPr>
+          <p:cNvPr id="3" name="Notes Placeholder 2"/>
+          <p:cNvSpPr>
+            <a:spLocks noGrp="1"/>
+          </p:cNvSpPr>
+          <p:nvPr>
+            <p:ph type="body" idx="1"/>
+          </p:nvPr>
+        </p:nvSpPr>
+        <p:spPr/>
+        <p:txBody>
+          <a:bodyPr/>
+          <a:lstStyle/>
+          <a:p>
+            <a:endParaRPr lang="en-PL" dirty="0"/>
+          </a:p>
+        </p:txBody>
+      </p:sp>
+      <p:sp>
+        <p:nvSpPr>
+          <p:cNvPr id="4" name="Slide Number Placeholder 3"/>
+          <p:cNvSpPr>
+            <a:spLocks noGrp="1"/>
+          </p:cNvSpPr>
+          <p:nvPr>
+            <p:ph type="sldNum" sz="quarter" idx="5"/>
+          </p:nvPr>
+        </p:nvSpPr>
+        <p:spPr/>
+        <p:txBody>
+          <a:bodyPr/>
+          <a:lstStyle/>
+          <a:p>
+            <a:fld id="{86963E6A-0AE7-3244-B105-59B2DE698F05}" type="slidenum">
+              <a:rPr lang="en-PL" smtClean="0"/>
+              <a:t>23</a:t>
+            </a:fld>
+            <a:endParaRPr lang="en-PL"/>
+          </a:p>
+        </p:txBody>
+      </p:sp>
+    </p:spTree>
+    <p:extLst>
+      <p:ext uri="{BB962C8B-B14F-4D97-AF65-F5344CB8AC3E}">
+        <p14:creationId xmlns:p14="http://schemas.microsoft.com/office/powerpoint/2010/main" val="2181577762"/>
       </p:ext>
     </p:extLst>
   </p:cSld>
@@ -6444,7 +6534,13 @@
   <p:cSld>
     <p:spTree>
       <p:nvGrpSpPr>
-        <p:cNvPr id="1" name=""/>
+        <p:cNvPr id="1" name="">
+          <a:extLst>
+            <a:ext uri="{FF2B5EF4-FFF2-40B4-BE49-F238E27FC236}">
+              <a16:creationId xmlns:a16="http://schemas.microsoft.com/office/drawing/2014/main" id="{D9BEF1E0-7491-7FC9-85C9-6258D2F011F7}"/>
+            </a:ext>
+          </a:extLst>
+        </p:cNvPr>
         <p:cNvGrpSpPr/>
         <p:nvPr/>
       </p:nvGrpSpPr>
@@ -6461,7 +6557,7 @@
           <p:cNvPr id="2" name="Title 1">
             <a:extLst>
               <a:ext uri="{FF2B5EF4-FFF2-40B4-BE49-F238E27FC236}">
-                <a16:creationId xmlns:a16="http://schemas.microsoft.com/office/drawing/2014/main" id="{19AAC2B3-5228-245C-A4BA-F93E5B084490}"/>
+                <a16:creationId xmlns:a16="http://schemas.microsoft.com/office/drawing/2014/main" id="{5843DB67-628C-AF37-76F7-B4800D6D495D}"/>
               </a:ext>
             </a:extLst>
           </p:cNvPr>
@@ -6472,62 +6568,88 @@
             <p:ph type="title"/>
           </p:nvPr>
         </p:nvSpPr>
-        <p:spPr/>
-        <p:txBody>
-          <a:bodyPr/>
-          <a:lstStyle/>
-          <a:p>
-            <a:endParaRPr lang="en-PL"/>
-          </a:p>
-        </p:txBody>
-      </p:sp>
-      <p:sp>
-        <p:nvSpPr>
-          <p:cNvPr id="3" name="Content Placeholder 2">
-            <a:extLst>
-              <a:ext uri="{FF2B5EF4-FFF2-40B4-BE49-F238E27FC236}">
-                <a16:creationId xmlns:a16="http://schemas.microsoft.com/office/drawing/2014/main" id="{69A31939-0107-43E3-6B23-756EC1486CCA}"/>
-              </a:ext>
-            </a:extLst>
-          </p:cNvPr>
-          <p:cNvSpPr>
-            <a:spLocks noGrp="1"/>
-          </p:cNvSpPr>
-          <p:nvPr>
-            <p:ph idx="1"/>
-          </p:nvPr>
-        </p:nvSpPr>
-        <p:spPr/>
-        <p:txBody>
-          <a:bodyPr/>
-          <a:lstStyle/>
-          <a:p>
-            <a:r>
-              <a:rPr lang="en-GB" dirty="0" err="1"/>
-              <a:t>aws</a:t>
-            </a:r>
-            <a:r>
-              <a:rPr lang="en-GB" dirty="0"/>
-              <a:t>/create/5_create_ingress_controller.sh</a:t>
-            </a:r>
-          </a:p>
-          <a:p>
-            <a:r>
-              <a:rPr lang="en-GB" dirty="0" err="1"/>
-              <a:t>aws</a:t>
-            </a:r>
-            <a:r>
-              <a:rPr lang="en-GB" dirty="0"/>
-              <a:t>/create/8_install_keda.sh</a:t>
-            </a:r>
-            <a:endParaRPr lang="en-PL" dirty="0"/>
+        <p:spPr>
+          <a:xfrm>
+            <a:off x="2264228" y="1977231"/>
+            <a:ext cx="7663543" cy="2903537"/>
+          </a:xfrm>
+        </p:spPr>
+        <p:txBody>
+          <a:bodyPr>
+            <a:normAutofit/>
+          </a:bodyPr>
+          <a:lstStyle/>
+          <a:p>
+            <a:pPr algn="ctr"/>
+            <a:r>
+              <a:rPr lang="en-GB" sz="4800" dirty="0">
+                <a:latin typeface="Consolas" panose="020B0609020204030204" pitchFamily="49" charset="0"/>
+                <a:cs typeface="Consolas" panose="020B0609020204030204" pitchFamily="49" charset="0"/>
+              </a:rPr>
+              <a:t>D</a:t>
+            </a:r>
+            <a:r>
+              <a:rPr lang="en-PL" sz="4800" dirty="0">
+                <a:latin typeface="Consolas" panose="020B0609020204030204" pitchFamily="49" charset="0"/>
+                <a:cs typeface="Consolas" panose="020B0609020204030204" pitchFamily="49" charset="0"/>
+              </a:rPr>
+              <a:t>emo</a:t>
+            </a:r>
+            <a:br>
+              <a:rPr lang="en-PL" sz="2400" dirty="0">
+                <a:latin typeface="Consolas" panose="020B0609020204030204" pitchFamily="49" charset="0"/>
+                <a:cs typeface="Consolas" panose="020B0609020204030204" pitchFamily="49" charset="0"/>
+              </a:rPr>
+            </a:br>
+            <a:br>
+              <a:rPr lang="en-PL" sz="2400" dirty="0">
+                <a:latin typeface="Consolas" panose="020B0609020204030204" pitchFamily="49" charset="0"/>
+                <a:cs typeface="Consolas" panose="020B0609020204030204" pitchFamily="49" charset="0"/>
+              </a:rPr>
+            </a:br>
+            <a:r>
+              <a:rPr lang="en-GB" sz="2400" dirty="0">
+                <a:latin typeface="Consolas" panose="020B0609020204030204" pitchFamily="49" charset="0"/>
+                <a:cs typeface="Consolas" panose="020B0609020204030204" pitchFamily="49" charset="0"/>
+              </a:rPr>
+              <a:t>k8s/06_helm</a:t>
+            </a:r>
+            <a:br>
+              <a:rPr lang="en-GB" sz="2400" dirty="0">
+                <a:latin typeface="Consolas" panose="020B0609020204030204" pitchFamily="49" charset="0"/>
+                <a:cs typeface="Consolas" panose="020B0609020204030204" pitchFamily="49" charset="0"/>
+              </a:rPr>
+            </a:br>
+            <a:r>
+              <a:rPr lang="en-GB" sz="1400" dirty="0">
+                <a:solidFill>
+                  <a:schemeClr val="tx1">
+                    <a:lumMod val="65000"/>
+                    <a:lumOff val="35000"/>
+                  </a:schemeClr>
+                </a:solidFill>
+                <a:latin typeface="Consolas" panose="020B0609020204030204" pitchFamily="49" charset="0"/>
+                <a:cs typeface="Consolas" panose="020B0609020204030204" pitchFamily="49" charset="0"/>
+              </a:rPr>
+              <a:t>(helm template)</a:t>
+            </a:r>
+            <a:endParaRPr lang="en-PL" sz="1400" dirty="0">
+              <a:solidFill>
+                <a:schemeClr val="tx1">
+                  <a:lumMod val="65000"/>
+                  <a:lumOff val="35000"/>
+                </a:schemeClr>
+              </a:solidFill>
+              <a:latin typeface="Consolas" panose="020B0609020204030204" pitchFamily="49" charset="0"/>
+              <a:cs typeface="Consolas" panose="020B0609020204030204" pitchFamily="49" charset="0"/>
+            </a:endParaRPr>
           </a:p>
         </p:txBody>
       </p:sp>
     </p:spTree>
     <p:extLst>
       <p:ext uri="{BB962C8B-B14F-4D97-AF65-F5344CB8AC3E}">
-        <p14:creationId xmlns:p14="http://schemas.microsoft.com/office/powerpoint/2010/main" val="3742290374"/>
+        <p14:creationId xmlns:p14="http://schemas.microsoft.com/office/powerpoint/2010/main" val="3425719009"/>
       </p:ext>
     </p:extLst>
   </p:cSld>
@@ -6632,136 +6754,6 @@
         <p:cNvPr id="1" name="">
           <a:extLst>
             <a:ext uri="{FF2B5EF4-FFF2-40B4-BE49-F238E27FC236}">
-              <a16:creationId xmlns:a16="http://schemas.microsoft.com/office/drawing/2014/main" id="{D9BEF1E0-7491-7FC9-85C9-6258D2F011F7}"/>
-            </a:ext>
-          </a:extLst>
-        </p:cNvPr>
-        <p:cNvGrpSpPr/>
-        <p:nvPr/>
-      </p:nvGrpSpPr>
-      <p:grpSpPr>
-        <a:xfrm>
-          <a:off x="0" y="0"/>
-          <a:ext cx="0" cy="0"/>
-          <a:chOff x="0" y="0"/>
-          <a:chExt cx="0" cy="0"/>
-        </a:xfrm>
-      </p:grpSpPr>
-      <p:sp>
-        <p:nvSpPr>
-          <p:cNvPr id="2" name="Title 1">
-            <a:extLst>
-              <a:ext uri="{FF2B5EF4-FFF2-40B4-BE49-F238E27FC236}">
-                <a16:creationId xmlns:a16="http://schemas.microsoft.com/office/drawing/2014/main" id="{5843DB67-628C-AF37-76F7-B4800D6D495D}"/>
-              </a:ext>
-            </a:extLst>
-          </p:cNvPr>
-          <p:cNvSpPr>
-            <a:spLocks noGrp="1"/>
-          </p:cNvSpPr>
-          <p:nvPr>
-            <p:ph type="title"/>
-          </p:nvPr>
-        </p:nvSpPr>
-        <p:spPr>
-          <a:xfrm>
-            <a:off x="2264228" y="1977231"/>
-            <a:ext cx="7663543" cy="2903537"/>
-          </a:xfrm>
-        </p:spPr>
-        <p:txBody>
-          <a:bodyPr>
-            <a:normAutofit/>
-          </a:bodyPr>
-          <a:lstStyle/>
-          <a:p>
-            <a:pPr algn="ctr"/>
-            <a:r>
-              <a:rPr lang="en-GB" sz="4800" dirty="0">
-                <a:latin typeface="Consolas" panose="020B0609020204030204" pitchFamily="49" charset="0"/>
-                <a:cs typeface="Consolas" panose="020B0609020204030204" pitchFamily="49" charset="0"/>
-              </a:rPr>
-              <a:t>D</a:t>
-            </a:r>
-            <a:r>
-              <a:rPr lang="en-PL" sz="4800" dirty="0">
-                <a:latin typeface="Consolas" panose="020B0609020204030204" pitchFamily="49" charset="0"/>
-                <a:cs typeface="Consolas" panose="020B0609020204030204" pitchFamily="49" charset="0"/>
-              </a:rPr>
-              <a:t>emo</a:t>
-            </a:r>
-            <a:br>
-              <a:rPr lang="en-PL" sz="2400" dirty="0">
-                <a:latin typeface="Consolas" panose="020B0609020204030204" pitchFamily="49" charset="0"/>
-                <a:cs typeface="Consolas" panose="020B0609020204030204" pitchFamily="49" charset="0"/>
-              </a:rPr>
-            </a:br>
-            <a:br>
-              <a:rPr lang="en-PL" sz="2400" dirty="0">
-                <a:latin typeface="Consolas" panose="020B0609020204030204" pitchFamily="49" charset="0"/>
-                <a:cs typeface="Consolas" panose="020B0609020204030204" pitchFamily="49" charset="0"/>
-              </a:rPr>
-            </a:br>
-            <a:r>
-              <a:rPr lang="en-GB" sz="2400" dirty="0">
-                <a:latin typeface="Consolas" panose="020B0609020204030204" pitchFamily="49" charset="0"/>
-                <a:cs typeface="Consolas" panose="020B0609020204030204" pitchFamily="49" charset="0"/>
-              </a:rPr>
-              <a:t>k8s/06_helm</a:t>
-            </a:r>
-            <a:br>
-              <a:rPr lang="en-GB" sz="2400" dirty="0">
-                <a:latin typeface="Consolas" panose="020B0609020204030204" pitchFamily="49" charset="0"/>
-                <a:cs typeface="Consolas" panose="020B0609020204030204" pitchFamily="49" charset="0"/>
-              </a:rPr>
-            </a:br>
-            <a:r>
-              <a:rPr lang="en-GB" sz="1400" dirty="0">
-                <a:solidFill>
-                  <a:schemeClr val="tx1">
-                    <a:lumMod val="65000"/>
-                    <a:lumOff val="35000"/>
-                  </a:schemeClr>
-                </a:solidFill>
-                <a:latin typeface="Consolas" panose="020B0609020204030204" pitchFamily="49" charset="0"/>
-                <a:cs typeface="Consolas" panose="020B0609020204030204" pitchFamily="49" charset="0"/>
-              </a:rPr>
-              <a:t>(helm template)</a:t>
-            </a:r>
-            <a:endParaRPr lang="en-PL" sz="1400" dirty="0">
-              <a:solidFill>
-                <a:schemeClr val="tx1">
-                  <a:lumMod val="65000"/>
-                  <a:lumOff val="35000"/>
-                </a:schemeClr>
-              </a:solidFill>
-              <a:latin typeface="Consolas" panose="020B0609020204030204" pitchFamily="49" charset="0"/>
-              <a:cs typeface="Consolas" panose="020B0609020204030204" pitchFamily="49" charset="0"/>
-            </a:endParaRPr>
-          </a:p>
-        </p:txBody>
-      </p:sp>
-    </p:spTree>
-    <p:extLst>
-      <p:ext uri="{BB962C8B-B14F-4D97-AF65-F5344CB8AC3E}">
-        <p14:creationId xmlns:p14="http://schemas.microsoft.com/office/powerpoint/2010/main" val="3425719009"/>
-      </p:ext>
-    </p:extLst>
-  </p:cSld>
-  <p:clrMapOvr>
-    <a:masterClrMapping/>
-  </p:clrMapOvr>
-</p:sld>
-</file>
-
-<file path=ppt/slides/slide21.xml><?xml version="1.0" encoding="utf-8"?>
-<p:sld xmlns:a="http://schemas.openxmlformats.org/drawingml/2006/main" xmlns:r="http://schemas.openxmlformats.org/officeDocument/2006/relationships" xmlns:p="http://schemas.openxmlformats.org/presentationml/2006/main">
-  <p:cSld>
-    <p:spTree>
-      <p:nvGrpSpPr>
-        <p:cNvPr id="1" name="">
-          <a:extLst>
-            <a:ext uri="{FF2B5EF4-FFF2-40B4-BE49-F238E27FC236}">
               <a16:creationId xmlns:a16="http://schemas.microsoft.com/office/drawing/2014/main" id="{AFBE7A11-C14A-5471-D069-542C8B273A43}"/>
             </a:ext>
           </a:extLst>
@@ -6864,7 +6856,7 @@
 </p:sld>
 </file>
 
-<file path=ppt/slides/slide22.xml><?xml version="1.0" encoding="utf-8"?>
+<file path=ppt/slides/slide21.xml><?xml version="1.0" encoding="utf-8"?>
 <p:sld xmlns:a="http://schemas.openxmlformats.org/drawingml/2006/main" xmlns:r="http://schemas.openxmlformats.org/officeDocument/2006/relationships" xmlns:p="http://schemas.openxmlformats.org/presentationml/2006/main">
   <p:cSld>
     <p:spTree>
@@ -7090,7 +7082,7 @@
 </p:sld>
 </file>
 
-<file path=ppt/slides/slide23.xml><?xml version="1.0" encoding="utf-8"?>
+<file path=ppt/slides/slide22.xml><?xml version="1.0" encoding="utf-8"?>
 <p:sld xmlns:a="http://schemas.openxmlformats.org/drawingml/2006/main" xmlns:r="http://schemas.openxmlformats.org/officeDocument/2006/relationships" xmlns:p="http://schemas.openxmlformats.org/presentationml/2006/main">
   <p:cSld>
     <p:spTree>
@@ -7195,7 +7187,1540 @@
 </p:sld>
 </file>
 
+<file path=ppt/slides/slide23.xml><?xml version="1.0" encoding="utf-8"?>
+<p:sld xmlns:a="http://schemas.openxmlformats.org/drawingml/2006/main" xmlns:r="http://schemas.openxmlformats.org/officeDocument/2006/relationships" xmlns:p="http://schemas.openxmlformats.org/presentationml/2006/main">
+  <p:cSld>
+    <p:spTree>
+      <p:nvGrpSpPr>
+        <p:cNvPr id="1" name=""/>
+        <p:cNvGrpSpPr/>
+        <p:nvPr/>
+      </p:nvGrpSpPr>
+      <p:grpSpPr>
+        <a:xfrm>
+          <a:off x="0" y="0"/>
+          <a:ext cx="0" cy="0"/>
+          <a:chOff x="0" y="0"/>
+          <a:chExt cx="0" cy="0"/>
+        </a:xfrm>
+      </p:grpSpPr>
+      <p:sp>
+        <p:nvSpPr>
+          <p:cNvPr id="2" name="Title 1">
+            <a:extLst>
+              <a:ext uri="{FF2B5EF4-FFF2-40B4-BE49-F238E27FC236}">
+                <a16:creationId xmlns:a16="http://schemas.microsoft.com/office/drawing/2014/main" id="{01EB90E3-EC0F-B587-8120-AD600DA67417}"/>
+              </a:ext>
+            </a:extLst>
+          </p:cNvPr>
+          <p:cNvSpPr>
+            <a:spLocks noGrp="1"/>
+          </p:cNvSpPr>
+          <p:nvPr>
+            <p:ph type="title"/>
+          </p:nvPr>
+        </p:nvSpPr>
+        <p:spPr>
+          <a:xfrm>
+            <a:off x="2438400" y="757011"/>
+            <a:ext cx="7315200" cy="1325563"/>
+          </a:xfrm>
+        </p:spPr>
+        <p:txBody>
+          <a:bodyPr/>
+          <a:lstStyle/>
+          <a:p>
+            <a:r>
+              <a:rPr lang="en-PL" dirty="0"/>
+              <a:t>UP applications setup in EKS</a:t>
+            </a:r>
+          </a:p>
+        </p:txBody>
+      </p:sp>
+      <p:sp>
+        <p:nvSpPr>
+          <p:cNvPr id="3" name="Content Placeholder 2">
+            <a:extLst>
+              <a:ext uri="{FF2B5EF4-FFF2-40B4-BE49-F238E27FC236}">
+                <a16:creationId xmlns:a16="http://schemas.microsoft.com/office/drawing/2014/main" id="{2AEF5F7E-11E1-F248-45A2-7C60618FDEF3}"/>
+              </a:ext>
+            </a:extLst>
+          </p:cNvPr>
+          <p:cNvSpPr>
+            <a:spLocks noGrp="1"/>
+          </p:cNvSpPr>
+          <p:nvPr>
+            <p:ph idx="1"/>
+          </p:nvPr>
+        </p:nvSpPr>
+        <p:spPr>
+          <a:xfrm>
+            <a:off x="2762924" y="2281473"/>
+            <a:ext cx="6666152" cy="3290718"/>
+          </a:xfrm>
+        </p:spPr>
+        <p:txBody>
+          <a:bodyPr>
+            <a:normAutofit/>
+          </a:bodyPr>
+          <a:lstStyle/>
+          <a:p>
+            <a:pPr marL="0" indent="0">
+              <a:buNone/>
+            </a:pPr>
+            <a:r>
+              <a:rPr lang="en-GB" dirty="0">
+                <a:hlinkClick r:id="rId3"/>
+              </a:rPr>
+              <a:t>ApplicationSet – generator #1 (tenants)</a:t>
+            </a:r>
+            <a:endParaRPr lang="en-GB" dirty="0"/>
+          </a:p>
+          <a:p>
+            <a:pPr marL="0" indent="0">
+              <a:buNone/>
+            </a:pPr>
+            <a:r>
+              <a:rPr lang="en-GB" sz="1800" dirty="0"/>
+              <a:t>	(line 23: - path: "applications/eu-west-1/*.</a:t>
+            </a:r>
+            <a:r>
+              <a:rPr lang="en-GB" sz="1800" dirty="0" err="1"/>
+              <a:t>yaml</a:t>
+            </a:r>
+            <a:r>
+              <a:rPr lang="en-GB" sz="1800" dirty="0"/>
+              <a:t>” )</a:t>
+            </a:r>
+          </a:p>
+          <a:p>
+            <a:pPr marL="0" indent="0">
+              <a:buNone/>
+            </a:pPr>
+            <a:r>
+              <a:rPr lang="en-GB" sz="1800" dirty="0"/>
+              <a:t>	</a:t>
+            </a:r>
+            <a:r>
+              <a:rPr lang="en-GB" sz="1800" dirty="0">
+                <a:hlinkClick r:id="rId4"/>
+              </a:rPr>
+              <a:t>UP applications - input to #1 generator</a:t>
+            </a:r>
+            <a:endParaRPr lang="en-GB" sz="1800" dirty="0"/>
+          </a:p>
+          <a:p>
+            <a:pPr marL="0" indent="0">
+              <a:buNone/>
+            </a:pPr>
+            <a:endParaRPr lang="en-GB" dirty="0">
+              <a:hlinkClick r:id="rId5"/>
+            </a:endParaRPr>
+          </a:p>
+          <a:p>
+            <a:pPr marL="0" indent="0">
+              <a:buNone/>
+            </a:pPr>
+            <a:r>
+              <a:rPr lang="en-GB" dirty="0">
+                <a:hlinkClick r:id="rId5"/>
+              </a:rPr>
+              <a:t>ApplicationSet – generator #2</a:t>
+            </a:r>
+            <a:endParaRPr lang="en-GB" sz="1600" dirty="0"/>
+          </a:p>
+          <a:p>
+            <a:pPr marL="0" indent="0">
+              <a:buNone/>
+            </a:pPr>
+            <a:r>
+              <a:rPr lang="en-GB" sz="1600" dirty="0"/>
+              <a:t>	</a:t>
+            </a:r>
+            <a:r>
+              <a:rPr lang="en-GB" sz="1800" dirty="0"/>
+              <a:t>(line 18: {{- range $d := .</a:t>
+            </a:r>
+            <a:r>
+              <a:rPr lang="en-GB" sz="1800" dirty="0" err="1"/>
+              <a:t>Values.destinations</a:t>
+            </a:r>
+            <a:r>
+              <a:rPr lang="en-GB" sz="1800" dirty="0"/>
+              <a:t> }} )</a:t>
+            </a:r>
+          </a:p>
+          <a:p>
+            <a:pPr marL="0" indent="0">
+              <a:buNone/>
+            </a:pPr>
+            <a:r>
+              <a:rPr lang="en-GB" sz="1800" dirty="0"/>
+              <a:t>	</a:t>
+            </a:r>
+            <a:r>
+              <a:rPr lang="en-GB" sz="1800" dirty="0">
+                <a:hlinkClick r:id="rId6"/>
+              </a:rPr>
+              <a:t>UP environments – input to #2 generator</a:t>
+            </a:r>
+            <a:endParaRPr lang="en-GB" sz="1800" dirty="0"/>
+          </a:p>
+          <a:p>
+            <a:pPr marL="0" indent="0">
+              <a:buNone/>
+            </a:pPr>
+            <a:endParaRPr lang="en-GB" sz="1600" dirty="0"/>
+          </a:p>
+          <a:p>
+            <a:endParaRPr lang="en-GB" sz="1600" dirty="0"/>
+          </a:p>
+          <a:p>
+            <a:endParaRPr lang="en-PL" dirty="0"/>
+          </a:p>
+        </p:txBody>
+      </p:sp>
+    </p:spTree>
+    <p:extLst>
+      <p:ext uri="{BB962C8B-B14F-4D97-AF65-F5344CB8AC3E}">
+        <p14:creationId xmlns:p14="http://schemas.microsoft.com/office/powerpoint/2010/main" val="2111105099"/>
+      </p:ext>
+    </p:extLst>
+  </p:cSld>
+  <p:clrMapOvr>
+    <a:masterClrMapping/>
+  </p:clrMapOvr>
+</p:sld>
+</file>
+
 <file path=ppt/slides/slide24.xml><?xml version="1.0" encoding="utf-8"?>
+<p:sld xmlns:a="http://schemas.openxmlformats.org/drawingml/2006/main" xmlns:r="http://schemas.openxmlformats.org/officeDocument/2006/relationships" xmlns:p="http://schemas.openxmlformats.org/presentationml/2006/main">
+  <p:cSld>
+    <p:spTree>
+      <p:nvGrpSpPr>
+        <p:cNvPr id="1" name=""/>
+        <p:cNvGrpSpPr/>
+        <p:nvPr/>
+      </p:nvGrpSpPr>
+      <p:grpSpPr>
+        <a:xfrm>
+          <a:off x="0" y="0"/>
+          <a:ext cx="0" cy="0"/>
+          <a:chOff x="0" y="0"/>
+          <a:chExt cx="0" cy="0"/>
+        </a:xfrm>
+      </p:grpSpPr>
+      <p:sp>
+        <p:nvSpPr>
+          <p:cNvPr id="4" name="Rectangle 3">
+            <a:extLst>
+              <a:ext uri="{FF2B5EF4-FFF2-40B4-BE49-F238E27FC236}">
+                <a16:creationId xmlns:a16="http://schemas.microsoft.com/office/drawing/2014/main" id="{C7F281F5-4A1F-3B48-8326-7B5475DFD75A}"/>
+              </a:ext>
+            </a:extLst>
+          </p:cNvPr>
+          <p:cNvSpPr/>
+          <p:nvPr/>
+        </p:nvSpPr>
+        <p:spPr>
+          <a:xfrm>
+            <a:off x="1756372" y="463364"/>
+            <a:ext cx="8030424" cy="6147303"/>
+          </a:xfrm>
+          <a:prstGeom prst="rect">
+            <a:avLst/>
+          </a:prstGeom>
+        </p:spPr>
+        <p:style>
+          <a:lnRef idx="2">
+            <a:schemeClr val="accent1">
+              <a:shade val="15000"/>
+            </a:schemeClr>
+          </a:lnRef>
+          <a:fillRef idx="1">
+            <a:schemeClr val="accent1"/>
+          </a:fillRef>
+          <a:effectRef idx="0">
+            <a:schemeClr val="accent1"/>
+          </a:effectRef>
+          <a:fontRef idx="minor">
+            <a:schemeClr val="lt1"/>
+          </a:fontRef>
+        </p:style>
+        <p:txBody>
+          <a:bodyPr rtlCol="0" anchor="t"/>
+          <a:lstStyle/>
+          <a:p>
+            <a:r>
+              <a:rPr lang="en-PL" dirty="0"/>
+              <a:t>ApplicationSet</a:t>
+            </a:r>
+          </a:p>
+          <a:p>
+            <a:r>
+              <a:rPr lang="en-PL" dirty="0"/>
+              <a:t>(</a:t>
+            </a:r>
+            <a:r>
+              <a:rPr lang="en-GB" dirty="0"/>
+              <a:t>use1-up</a:t>
+            </a:r>
+            <a:r>
+              <a:rPr lang="en-PL" dirty="0"/>
+              <a:t>)</a:t>
+            </a:r>
+          </a:p>
+        </p:txBody>
+      </p:sp>
+      <p:sp>
+        <p:nvSpPr>
+          <p:cNvPr id="5" name="Rectangle 4">
+            <a:extLst>
+              <a:ext uri="{FF2B5EF4-FFF2-40B4-BE49-F238E27FC236}">
+                <a16:creationId xmlns:a16="http://schemas.microsoft.com/office/drawing/2014/main" id="{06B25924-0C65-6EF8-7B63-F6D9A2FB73CB}"/>
+              </a:ext>
+            </a:extLst>
+          </p:cNvPr>
+          <p:cNvSpPr/>
+          <p:nvPr/>
+        </p:nvSpPr>
+        <p:spPr>
+          <a:xfrm>
+            <a:off x="3742853" y="819340"/>
+            <a:ext cx="5573162" cy="2589291"/>
+          </a:xfrm>
+          <a:prstGeom prst="rect">
+            <a:avLst/>
+          </a:prstGeom>
+        </p:spPr>
+        <p:style>
+          <a:lnRef idx="2">
+            <a:schemeClr val="accent4">
+              <a:shade val="15000"/>
+            </a:schemeClr>
+          </a:lnRef>
+          <a:fillRef idx="1">
+            <a:schemeClr val="accent4"/>
+          </a:fillRef>
+          <a:effectRef idx="0">
+            <a:schemeClr val="accent4"/>
+          </a:effectRef>
+          <a:fontRef idx="minor">
+            <a:schemeClr val="lt1"/>
+          </a:fontRef>
+        </p:style>
+        <p:txBody>
+          <a:bodyPr rtlCol="0" anchor="t"/>
+          <a:lstStyle/>
+          <a:p>
+            <a:r>
+              <a:rPr lang="en-PL" sz="1200" dirty="0"/>
+              <a:t>Application</a:t>
+            </a:r>
+          </a:p>
+          <a:p>
+            <a:r>
+              <a:rPr lang="en-PL" sz="1200" dirty="0"/>
+              <a:t>(use1-up-stream-concurrency)</a:t>
+            </a:r>
+          </a:p>
+        </p:txBody>
+      </p:sp>
+      <p:sp>
+        <p:nvSpPr>
+          <p:cNvPr id="6" name="Rectangle 5">
+            <a:extLst>
+              <a:ext uri="{FF2B5EF4-FFF2-40B4-BE49-F238E27FC236}">
+                <a16:creationId xmlns:a16="http://schemas.microsoft.com/office/drawing/2014/main" id="{06FCAE39-5743-5E1C-6B73-39BCF0C93A9D}"/>
+              </a:ext>
+            </a:extLst>
+          </p:cNvPr>
+          <p:cNvSpPr/>
+          <p:nvPr/>
+        </p:nvSpPr>
+        <p:spPr>
+          <a:xfrm>
+            <a:off x="5144253" y="1371602"/>
+            <a:ext cx="4035959" cy="1937441"/>
+          </a:xfrm>
+          <a:prstGeom prst="rect">
+            <a:avLst/>
+          </a:prstGeom>
+        </p:spPr>
+        <p:style>
+          <a:lnRef idx="2">
+            <a:schemeClr val="accent1">
+              <a:shade val="15000"/>
+            </a:schemeClr>
+          </a:lnRef>
+          <a:fillRef idx="1">
+            <a:schemeClr val="accent1"/>
+          </a:fillRef>
+          <a:effectRef idx="0">
+            <a:schemeClr val="accent1"/>
+          </a:effectRef>
+          <a:fontRef idx="minor">
+            <a:schemeClr val="lt1"/>
+          </a:fontRef>
+        </p:style>
+        <p:txBody>
+          <a:bodyPr rtlCol="0" anchor="t"/>
+          <a:lstStyle/>
+          <a:p>
+            <a:r>
+              <a:rPr lang="en-PL" sz="1200" dirty="0"/>
+              <a:t>ApplicationSet</a:t>
+            </a:r>
+          </a:p>
+          <a:p>
+            <a:r>
+              <a:rPr lang="en-PL" sz="1000" dirty="0"/>
+              <a:t>(</a:t>
+            </a:r>
+            <a:r>
+              <a:rPr lang="en-GB" sz="1000" dirty="0"/>
+              <a:t>use1-up-stream-concurrency-environments</a:t>
+            </a:r>
+            <a:r>
+              <a:rPr lang="en-PL" sz="1000" dirty="0"/>
+              <a:t>)</a:t>
+            </a:r>
+          </a:p>
+        </p:txBody>
+      </p:sp>
+      <p:sp>
+        <p:nvSpPr>
+          <p:cNvPr id="8" name="Rectangle 7">
+            <a:extLst>
+              <a:ext uri="{FF2B5EF4-FFF2-40B4-BE49-F238E27FC236}">
+                <a16:creationId xmlns:a16="http://schemas.microsoft.com/office/drawing/2014/main" id="{044F7687-94AD-DD69-7E45-6DB1B2694BC8}"/>
+              </a:ext>
+            </a:extLst>
+          </p:cNvPr>
+          <p:cNvSpPr/>
+          <p:nvPr/>
+        </p:nvSpPr>
+        <p:spPr>
+          <a:xfrm>
+            <a:off x="6312528" y="1785071"/>
+            <a:ext cx="2777150" cy="389259"/>
+          </a:xfrm>
+          <a:prstGeom prst="rect">
+            <a:avLst/>
+          </a:prstGeom>
+        </p:spPr>
+        <p:style>
+          <a:lnRef idx="2">
+            <a:schemeClr val="accent4">
+              <a:shade val="15000"/>
+            </a:schemeClr>
+          </a:lnRef>
+          <a:fillRef idx="1">
+            <a:schemeClr val="accent4"/>
+          </a:fillRef>
+          <a:effectRef idx="0">
+            <a:schemeClr val="accent4"/>
+          </a:effectRef>
+          <a:fontRef idx="minor">
+            <a:schemeClr val="lt1"/>
+          </a:fontRef>
+        </p:style>
+        <p:txBody>
+          <a:bodyPr rtlCol="0" anchor="t"/>
+          <a:lstStyle/>
+          <a:p>
+            <a:r>
+              <a:rPr lang="en-PL" sz="1000" dirty="0"/>
+              <a:t>Application</a:t>
+            </a:r>
+          </a:p>
+          <a:p>
+            <a:r>
+              <a:rPr lang="en-PL" sz="1000" dirty="0"/>
+              <a:t>(</a:t>
+            </a:r>
+            <a:r>
+              <a:rPr lang="en-GB" sz="1000" dirty="0"/>
+              <a:t>use1-up-stream-concurrency-qa)</a:t>
+            </a:r>
+            <a:endParaRPr lang="en-PL" sz="1000" dirty="0"/>
+          </a:p>
+        </p:txBody>
+      </p:sp>
+      <p:sp>
+        <p:nvSpPr>
+          <p:cNvPr id="9" name="Rectangle 8">
+            <a:extLst>
+              <a:ext uri="{FF2B5EF4-FFF2-40B4-BE49-F238E27FC236}">
+                <a16:creationId xmlns:a16="http://schemas.microsoft.com/office/drawing/2014/main" id="{4D4BF3CE-01AD-F69D-6C2B-0743252AFE87}"/>
+              </a:ext>
+            </a:extLst>
+          </p:cNvPr>
+          <p:cNvSpPr/>
+          <p:nvPr/>
+        </p:nvSpPr>
+        <p:spPr>
+          <a:xfrm>
+            <a:off x="6312528" y="2337333"/>
+            <a:ext cx="2777150" cy="389259"/>
+          </a:xfrm>
+          <a:prstGeom prst="rect">
+            <a:avLst/>
+          </a:prstGeom>
+        </p:spPr>
+        <p:style>
+          <a:lnRef idx="2">
+            <a:schemeClr val="accent4">
+              <a:shade val="15000"/>
+            </a:schemeClr>
+          </a:lnRef>
+          <a:fillRef idx="1">
+            <a:schemeClr val="accent4"/>
+          </a:fillRef>
+          <a:effectRef idx="0">
+            <a:schemeClr val="accent4"/>
+          </a:effectRef>
+          <a:fontRef idx="minor">
+            <a:schemeClr val="lt1"/>
+          </a:fontRef>
+        </p:style>
+        <p:txBody>
+          <a:bodyPr rtlCol="0" anchor="t"/>
+          <a:lstStyle/>
+          <a:p>
+            <a:r>
+              <a:rPr lang="en-PL" sz="1000" dirty="0"/>
+              <a:t>Application</a:t>
+            </a:r>
+          </a:p>
+          <a:p>
+            <a:r>
+              <a:rPr lang="en-PL" sz="1000" dirty="0"/>
+              <a:t>(</a:t>
+            </a:r>
+            <a:r>
+              <a:rPr lang="en-GB" sz="1000" dirty="0"/>
+              <a:t>use1-up-stream-concurrency-perf</a:t>
+            </a:r>
+            <a:r>
+              <a:rPr lang="en-PL" sz="1000" dirty="0"/>
+              <a:t>)</a:t>
+            </a:r>
+          </a:p>
+        </p:txBody>
+      </p:sp>
+      <p:sp>
+        <p:nvSpPr>
+          <p:cNvPr id="10" name="Rectangle 9">
+            <a:extLst>
+              <a:ext uri="{FF2B5EF4-FFF2-40B4-BE49-F238E27FC236}">
+                <a16:creationId xmlns:a16="http://schemas.microsoft.com/office/drawing/2014/main" id="{DEAB718E-723E-4A02-8981-B08A2129D4C9}"/>
+              </a:ext>
+            </a:extLst>
+          </p:cNvPr>
+          <p:cNvSpPr/>
+          <p:nvPr/>
+        </p:nvSpPr>
+        <p:spPr>
+          <a:xfrm>
+            <a:off x="6312528" y="2844327"/>
+            <a:ext cx="2777150" cy="389259"/>
+          </a:xfrm>
+          <a:prstGeom prst="rect">
+            <a:avLst/>
+          </a:prstGeom>
+        </p:spPr>
+        <p:style>
+          <a:lnRef idx="2">
+            <a:schemeClr val="accent4">
+              <a:shade val="15000"/>
+            </a:schemeClr>
+          </a:lnRef>
+          <a:fillRef idx="1">
+            <a:schemeClr val="accent4"/>
+          </a:fillRef>
+          <a:effectRef idx="0">
+            <a:schemeClr val="accent4"/>
+          </a:effectRef>
+          <a:fontRef idx="minor">
+            <a:schemeClr val="lt1"/>
+          </a:fontRef>
+        </p:style>
+        <p:txBody>
+          <a:bodyPr rtlCol="0" anchor="t"/>
+          <a:lstStyle/>
+          <a:p>
+            <a:r>
+              <a:rPr lang="en-PL" sz="1000" dirty="0"/>
+              <a:t>Application</a:t>
+            </a:r>
+          </a:p>
+          <a:p>
+            <a:r>
+              <a:rPr lang="en-PL" sz="1000" dirty="0"/>
+              <a:t>(</a:t>
+            </a:r>
+            <a:r>
+              <a:rPr lang="en-GB" sz="1000" dirty="0"/>
+              <a:t>use1-up-stream-concurrency-prod</a:t>
+            </a:r>
+            <a:r>
+              <a:rPr lang="en-PL" sz="1000" dirty="0"/>
+              <a:t>)</a:t>
+            </a:r>
+          </a:p>
+        </p:txBody>
+      </p:sp>
+      <p:sp>
+        <p:nvSpPr>
+          <p:cNvPr id="11" name="Rectangle 10">
+            <a:extLst>
+              <a:ext uri="{FF2B5EF4-FFF2-40B4-BE49-F238E27FC236}">
+                <a16:creationId xmlns:a16="http://schemas.microsoft.com/office/drawing/2014/main" id="{3996A044-33D3-A824-BD7B-571A972950BE}"/>
+              </a:ext>
+            </a:extLst>
+          </p:cNvPr>
+          <p:cNvSpPr/>
+          <p:nvPr/>
+        </p:nvSpPr>
+        <p:spPr>
+          <a:xfrm>
+            <a:off x="3742853" y="3490112"/>
+            <a:ext cx="5573162" cy="2251469"/>
+          </a:xfrm>
+          <a:prstGeom prst="rect">
+            <a:avLst/>
+          </a:prstGeom>
+        </p:spPr>
+        <p:style>
+          <a:lnRef idx="2">
+            <a:schemeClr val="accent4">
+              <a:shade val="15000"/>
+            </a:schemeClr>
+          </a:lnRef>
+          <a:fillRef idx="1">
+            <a:schemeClr val="accent4"/>
+          </a:fillRef>
+          <a:effectRef idx="0">
+            <a:schemeClr val="accent4"/>
+          </a:effectRef>
+          <a:fontRef idx="minor">
+            <a:schemeClr val="lt1"/>
+          </a:fontRef>
+        </p:style>
+        <p:txBody>
+          <a:bodyPr rtlCol="0" anchor="t"/>
+          <a:lstStyle/>
+          <a:p>
+            <a:r>
+              <a:rPr lang="en-PL" sz="1200" dirty="0"/>
+              <a:t>Application</a:t>
+            </a:r>
+          </a:p>
+          <a:p>
+            <a:r>
+              <a:rPr lang="en-PL" sz="1200" dirty="0"/>
+              <a:t>(use1-up-synthetic-monitor)</a:t>
+            </a:r>
+          </a:p>
+        </p:txBody>
+      </p:sp>
+      <p:sp>
+        <p:nvSpPr>
+          <p:cNvPr id="12" name="Rectangle 11">
+            <a:extLst>
+              <a:ext uri="{FF2B5EF4-FFF2-40B4-BE49-F238E27FC236}">
+                <a16:creationId xmlns:a16="http://schemas.microsoft.com/office/drawing/2014/main" id="{93F47418-8EC6-61CD-C784-91C5E573CD3A}"/>
+              </a:ext>
+            </a:extLst>
+          </p:cNvPr>
+          <p:cNvSpPr/>
+          <p:nvPr/>
+        </p:nvSpPr>
+        <p:spPr>
+          <a:xfrm>
+            <a:off x="5144253" y="4042375"/>
+            <a:ext cx="4035959" cy="1518454"/>
+          </a:xfrm>
+          <a:prstGeom prst="rect">
+            <a:avLst/>
+          </a:prstGeom>
+        </p:spPr>
+        <p:style>
+          <a:lnRef idx="2">
+            <a:schemeClr val="accent1">
+              <a:shade val="15000"/>
+            </a:schemeClr>
+          </a:lnRef>
+          <a:fillRef idx="1">
+            <a:schemeClr val="accent1"/>
+          </a:fillRef>
+          <a:effectRef idx="0">
+            <a:schemeClr val="accent1"/>
+          </a:effectRef>
+          <a:fontRef idx="minor">
+            <a:schemeClr val="lt1"/>
+          </a:fontRef>
+        </p:style>
+        <p:txBody>
+          <a:bodyPr rtlCol="0" anchor="t"/>
+          <a:lstStyle/>
+          <a:p>
+            <a:r>
+              <a:rPr lang="en-PL" sz="1200" dirty="0"/>
+              <a:t>ApplicationSet</a:t>
+            </a:r>
+          </a:p>
+          <a:p>
+            <a:r>
+              <a:rPr lang="en-PL" sz="1000" dirty="0"/>
+              <a:t>(</a:t>
+            </a:r>
+            <a:r>
+              <a:rPr lang="en-GB" sz="1000" dirty="0"/>
+              <a:t>use1-up-</a:t>
+            </a:r>
+            <a:r>
+              <a:rPr lang="en-PL" sz="1000" dirty="0"/>
+              <a:t>synthetic-monitor</a:t>
+            </a:r>
+            <a:r>
+              <a:rPr lang="en-GB" sz="1000" dirty="0"/>
+              <a:t>-environments</a:t>
+            </a:r>
+            <a:r>
+              <a:rPr lang="en-PL" sz="1000" dirty="0"/>
+              <a:t>)</a:t>
+            </a:r>
+          </a:p>
+        </p:txBody>
+      </p:sp>
+      <p:sp>
+        <p:nvSpPr>
+          <p:cNvPr id="14" name="Rectangle 13">
+            <a:extLst>
+              <a:ext uri="{FF2B5EF4-FFF2-40B4-BE49-F238E27FC236}">
+                <a16:creationId xmlns:a16="http://schemas.microsoft.com/office/drawing/2014/main" id="{C5437B74-793C-C8FF-43B9-7B09ACFDCA13}"/>
+              </a:ext>
+            </a:extLst>
+          </p:cNvPr>
+          <p:cNvSpPr/>
+          <p:nvPr/>
+        </p:nvSpPr>
+        <p:spPr>
+          <a:xfrm>
+            <a:off x="6312528" y="4499668"/>
+            <a:ext cx="2777150" cy="389259"/>
+          </a:xfrm>
+          <a:prstGeom prst="rect">
+            <a:avLst/>
+          </a:prstGeom>
+        </p:spPr>
+        <p:style>
+          <a:lnRef idx="2">
+            <a:schemeClr val="accent4">
+              <a:shade val="15000"/>
+            </a:schemeClr>
+          </a:lnRef>
+          <a:fillRef idx="1">
+            <a:schemeClr val="accent4"/>
+          </a:fillRef>
+          <a:effectRef idx="0">
+            <a:schemeClr val="accent4"/>
+          </a:effectRef>
+          <a:fontRef idx="minor">
+            <a:schemeClr val="lt1"/>
+          </a:fontRef>
+        </p:style>
+        <p:txBody>
+          <a:bodyPr rtlCol="0" anchor="t"/>
+          <a:lstStyle/>
+          <a:p>
+            <a:r>
+              <a:rPr lang="en-PL" sz="1000" dirty="0"/>
+              <a:t>Application</a:t>
+            </a:r>
+          </a:p>
+          <a:p>
+            <a:r>
+              <a:rPr lang="en-PL" sz="1000" dirty="0"/>
+              <a:t>(</a:t>
+            </a:r>
+            <a:r>
+              <a:rPr lang="en-GB" sz="1000" dirty="0"/>
+              <a:t>use1-up-</a:t>
+            </a:r>
+            <a:r>
+              <a:rPr lang="en-PL" sz="1000" dirty="0"/>
+              <a:t> synthetic-monitor</a:t>
+            </a:r>
+            <a:r>
+              <a:rPr lang="en-GB" sz="1000" dirty="0"/>
+              <a:t>-</a:t>
+            </a:r>
+            <a:r>
+              <a:rPr lang="en-GB" sz="1000" dirty="0" err="1"/>
+              <a:t>qa</a:t>
+            </a:r>
+            <a:r>
+              <a:rPr lang="en-PL" sz="1000" dirty="0"/>
+              <a:t>)</a:t>
+            </a:r>
+          </a:p>
+        </p:txBody>
+      </p:sp>
+      <p:sp>
+        <p:nvSpPr>
+          <p:cNvPr id="15" name="Rectangle 14">
+            <a:extLst>
+              <a:ext uri="{FF2B5EF4-FFF2-40B4-BE49-F238E27FC236}">
+                <a16:creationId xmlns:a16="http://schemas.microsoft.com/office/drawing/2014/main" id="{152B4181-052C-5BEE-9446-2038F24AD880}"/>
+              </a:ext>
+            </a:extLst>
+          </p:cNvPr>
+          <p:cNvSpPr/>
+          <p:nvPr/>
+        </p:nvSpPr>
+        <p:spPr>
+          <a:xfrm>
+            <a:off x="6312528" y="4989793"/>
+            <a:ext cx="2777150" cy="389259"/>
+          </a:xfrm>
+          <a:prstGeom prst="rect">
+            <a:avLst/>
+          </a:prstGeom>
+        </p:spPr>
+        <p:style>
+          <a:lnRef idx="2">
+            <a:schemeClr val="accent4">
+              <a:shade val="15000"/>
+            </a:schemeClr>
+          </a:lnRef>
+          <a:fillRef idx="1">
+            <a:schemeClr val="accent4"/>
+          </a:fillRef>
+          <a:effectRef idx="0">
+            <a:schemeClr val="accent4"/>
+          </a:effectRef>
+          <a:fontRef idx="minor">
+            <a:schemeClr val="lt1"/>
+          </a:fontRef>
+        </p:style>
+        <p:txBody>
+          <a:bodyPr rtlCol="0" anchor="t"/>
+          <a:lstStyle/>
+          <a:p>
+            <a:r>
+              <a:rPr lang="en-PL" sz="1000" dirty="0"/>
+              <a:t>Application</a:t>
+            </a:r>
+          </a:p>
+          <a:p>
+            <a:r>
+              <a:rPr lang="en-PL" sz="1000" dirty="0"/>
+              <a:t>(</a:t>
+            </a:r>
+            <a:r>
+              <a:rPr lang="en-GB" sz="1000" dirty="0"/>
+              <a:t>use1-up-</a:t>
+            </a:r>
+            <a:r>
+              <a:rPr lang="en-PL" sz="1000" dirty="0"/>
+              <a:t> synthetic-monitor</a:t>
+            </a:r>
+            <a:r>
+              <a:rPr lang="en-GB" sz="1000" dirty="0"/>
+              <a:t>-prod</a:t>
+            </a:r>
+            <a:r>
+              <a:rPr lang="en-PL" sz="1000" dirty="0"/>
+              <a:t>)</a:t>
+            </a:r>
+          </a:p>
+        </p:txBody>
+      </p:sp>
+      <p:cxnSp>
+        <p:nvCxnSpPr>
+          <p:cNvPr id="27" name="Straight Arrow Connector 26">
+            <a:extLst>
+              <a:ext uri="{FF2B5EF4-FFF2-40B4-BE49-F238E27FC236}">
+                <a16:creationId xmlns:a16="http://schemas.microsoft.com/office/drawing/2014/main" id="{B2F03838-106A-6F5D-6B71-4A1268A4B713}"/>
+              </a:ext>
+            </a:extLst>
+          </p:cNvPr>
+          <p:cNvCxnSpPr>
+            <a:cxnSpLocks/>
+          </p:cNvCxnSpPr>
+          <p:nvPr/>
+        </p:nvCxnSpPr>
+        <p:spPr>
+          <a:xfrm>
+            <a:off x="2502153" y="1213164"/>
+            <a:ext cx="1112817" cy="823866"/>
+          </a:xfrm>
+          <a:prstGeom prst="straightConnector1">
+            <a:avLst/>
+          </a:prstGeom>
+          <a:ln w="76200">
+            <a:tailEnd type="triangle"/>
+          </a:ln>
+        </p:spPr>
+        <p:style>
+          <a:lnRef idx="1">
+            <a:schemeClr val="accent6"/>
+          </a:lnRef>
+          <a:fillRef idx="0">
+            <a:schemeClr val="accent6"/>
+          </a:fillRef>
+          <a:effectRef idx="0">
+            <a:schemeClr val="accent6"/>
+          </a:effectRef>
+          <a:fontRef idx="minor">
+            <a:schemeClr val="tx1"/>
+          </a:fontRef>
+        </p:style>
+      </p:cxnSp>
+      <p:cxnSp>
+        <p:nvCxnSpPr>
+          <p:cNvPr id="28" name="Straight Arrow Connector 27">
+            <a:extLst>
+              <a:ext uri="{FF2B5EF4-FFF2-40B4-BE49-F238E27FC236}">
+                <a16:creationId xmlns:a16="http://schemas.microsoft.com/office/drawing/2014/main" id="{B7AC1DD5-2259-7E59-E93A-83FE041C591C}"/>
+              </a:ext>
+            </a:extLst>
+          </p:cNvPr>
+          <p:cNvCxnSpPr>
+            <a:cxnSpLocks/>
+          </p:cNvCxnSpPr>
+          <p:nvPr/>
+        </p:nvCxnSpPr>
+        <p:spPr>
+          <a:xfrm>
+            <a:off x="2502153" y="1213164"/>
+            <a:ext cx="1112817" cy="3023858"/>
+          </a:xfrm>
+          <a:prstGeom prst="straightConnector1">
+            <a:avLst/>
+          </a:prstGeom>
+          <a:ln w="76200">
+            <a:tailEnd type="triangle"/>
+          </a:ln>
+        </p:spPr>
+        <p:style>
+          <a:lnRef idx="1">
+            <a:schemeClr val="accent6"/>
+          </a:lnRef>
+          <a:fillRef idx="0">
+            <a:schemeClr val="accent6"/>
+          </a:fillRef>
+          <a:effectRef idx="0">
+            <a:schemeClr val="accent6"/>
+          </a:effectRef>
+          <a:fontRef idx="minor">
+            <a:schemeClr val="tx1"/>
+          </a:fontRef>
+        </p:style>
+      </p:cxnSp>
+      <p:cxnSp>
+        <p:nvCxnSpPr>
+          <p:cNvPr id="31" name="Straight Arrow Connector 30">
+            <a:extLst>
+              <a:ext uri="{FF2B5EF4-FFF2-40B4-BE49-F238E27FC236}">
+                <a16:creationId xmlns:a16="http://schemas.microsoft.com/office/drawing/2014/main" id="{45604296-235E-A23A-44B6-107442DD913E}"/>
+              </a:ext>
+            </a:extLst>
+          </p:cNvPr>
+          <p:cNvCxnSpPr>
+            <a:cxnSpLocks/>
+          </p:cNvCxnSpPr>
+          <p:nvPr/>
+        </p:nvCxnSpPr>
+        <p:spPr>
+          <a:xfrm>
+            <a:off x="2502153" y="1213164"/>
+            <a:ext cx="1112817" cy="4953720"/>
+          </a:xfrm>
+          <a:prstGeom prst="straightConnector1">
+            <a:avLst/>
+          </a:prstGeom>
+          <a:ln w="76200">
+            <a:tailEnd type="triangle"/>
+          </a:ln>
+        </p:spPr>
+        <p:style>
+          <a:lnRef idx="1">
+            <a:schemeClr val="accent6"/>
+          </a:lnRef>
+          <a:fillRef idx="0">
+            <a:schemeClr val="accent6"/>
+          </a:fillRef>
+          <a:effectRef idx="0">
+            <a:schemeClr val="accent6"/>
+          </a:effectRef>
+          <a:fontRef idx="minor">
+            <a:schemeClr val="tx1"/>
+          </a:fontRef>
+        </p:style>
+      </p:cxnSp>
+      <p:cxnSp>
+        <p:nvCxnSpPr>
+          <p:cNvPr id="39" name="Straight Arrow Connector 38">
+            <a:extLst>
+              <a:ext uri="{FF2B5EF4-FFF2-40B4-BE49-F238E27FC236}">
+                <a16:creationId xmlns:a16="http://schemas.microsoft.com/office/drawing/2014/main" id="{4163D276-A1ED-A308-1671-5F130B07D945}"/>
+              </a:ext>
+            </a:extLst>
+          </p:cNvPr>
+          <p:cNvCxnSpPr>
+            <a:cxnSpLocks/>
+          </p:cNvCxnSpPr>
+          <p:nvPr/>
+        </p:nvCxnSpPr>
+        <p:spPr>
+          <a:xfrm>
+            <a:off x="5719151" y="1798654"/>
+            <a:ext cx="593377" cy="233083"/>
+          </a:xfrm>
+          <a:prstGeom prst="straightConnector1">
+            <a:avLst/>
+          </a:prstGeom>
+          <a:ln w="76200">
+            <a:tailEnd type="triangle"/>
+          </a:ln>
+        </p:spPr>
+        <p:style>
+          <a:lnRef idx="1">
+            <a:schemeClr val="accent6"/>
+          </a:lnRef>
+          <a:fillRef idx="0">
+            <a:schemeClr val="accent6"/>
+          </a:fillRef>
+          <a:effectRef idx="0">
+            <a:schemeClr val="accent6"/>
+          </a:effectRef>
+          <a:fontRef idx="minor">
+            <a:schemeClr val="tx1"/>
+          </a:fontRef>
+        </p:style>
+      </p:cxnSp>
+      <p:cxnSp>
+        <p:nvCxnSpPr>
+          <p:cNvPr id="41" name="Straight Arrow Connector 40">
+            <a:extLst>
+              <a:ext uri="{FF2B5EF4-FFF2-40B4-BE49-F238E27FC236}">
+                <a16:creationId xmlns:a16="http://schemas.microsoft.com/office/drawing/2014/main" id="{76015B92-51EC-A4AC-EEE7-50F2B99B39FF}"/>
+              </a:ext>
+            </a:extLst>
+          </p:cNvPr>
+          <p:cNvCxnSpPr>
+            <a:cxnSpLocks/>
+            <a:endCxn id="9" idx="1"/>
+          </p:cNvCxnSpPr>
+          <p:nvPr/>
+        </p:nvCxnSpPr>
+        <p:spPr>
+          <a:xfrm>
+            <a:off x="5771584" y="1798654"/>
+            <a:ext cx="540944" cy="733309"/>
+          </a:xfrm>
+          <a:prstGeom prst="straightConnector1">
+            <a:avLst/>
+          </a:prstGeom>
+          <a:ln w="76200">
+            <a:tailEnd type="triangle"/>
+          </a:ln>
+        </p:spPr>
+        <p:style>
+          <a:lnRef idx="1">
+            <a:schemeClr val="accent6"/>
+          </a:lnRef>
+          <a:fillRef idx="0">
+            <a:schemeClr val="accent6"/>
+          </a:fillRef>
+          <a:effectRef idx="0">
+            <a:schemeClr val="accent6"/>
+          </a:effectRef>
+          <a:fontRef idx="minor">
+            <a:schemeClr val="tx1"/>
+          </a:fontRef>
+        </p:style>
+      </p:cxnSp>
+      <p:cxnSp>
+        <p:nvCxnSpPr>
+          <p:cNvPr id="44" name="Straight Arrow Connector 43">
+            <a:extLst>
+              <a:ext uri="{FF2B5EF4-FFF2-40B4-BE49-F238E27FC236}">
+                <a16:creationId xmlns:a16="http://schemas.microsoft.com/office/drawing/2014/main" id="{3B3D3C78-0F65-4D17-05F7-ADE5D12B8A38}"/>
+              </a:ext>
+            </a:extLst>
+          </p:cNvPr>
+          <p:cNvCxnSpPr>
+            <a:cxnSpLocks/>
+          </p:cNvCxnSpPr>
+          <p:nvPr/>
+        </p:nvCxnSpPr>
+        <p:spPr>
+          <a:xfrm>
+            <a:off x="5719151" y="1817881"/>
+            <a:ext cx="593377" cy="1308034"/>
+          </a:xfrm>
+          <a:prstGeom prst="straightConnector1">
+            <a:avLst/>
+          </a:prstGeom>
+          <a:ln w="76200">
+            <a:tailEnd type="triangle"/>
+          </a:ln>
+        </p:spPr>
+        <p:style>
+          <a:lnRef idx="1">
+            <a:schemeClr val="accent6"/>
+          </a:lnRef>
+          <a:fillRef idx="0">
+            <a:schemeClr val="accent6"/>
+          </a:fillRef>
+          <a:effectRef idx="0">
+            <a:schemeClr val="accent6"/>
+          </a:effectRef>
+          <a:fontRef idx="minor">
+            <a:schemeClr val="tx1"/>
+          </a:fontRef>
+        </p:style>
+      </p:cxnSp>
+      <p:cxnSp>
+        <p:nvCxnSpPr>
+          <p:cNvPr id="50" name="Straight Arrow Connector 49">
+            <a:extLst>
+              <a:ext uri="{FF2B5EF4-FFF2-40B4-BE49-F238E27FC236}">
+                <a16:creationId xmlns:a16="http://schemas.microsoft.com/office/drawing/2014/main" id="{7F300D5A-7547-5D7E-A1F0-DB58A19809CB}"/>
+              </a:ext>
+            </a:extLst>
+          </p:cNvPr>
+          <p:cNvCxnSpPr>
+            <a:cxnSpLocks/>
+          </p:cNvCxnSpPr>
+          <p:nvPr/>
+        </p:nvCxnSpPr>
+        <p:spPr>
+          <a:xfrm>
+            <a:off x="5719151" y="4480441"/>
+            <a:ext cx="593377" cy="233083"/>
+          </a:xfrm>
+          <a:prstGeom prst="straightConnector1">
+            <a:avLst/>
+          </a:prstGeom>
+          <a:ln w="76200">
+            <a:tailEnd type="triangle"/>
+          </a:ln>
+        </p:spPr>
+        <p:style>
+          <a:lnRef idx="1">
+            <a:schemeClr val="accent6"/>
+          </a:lnRef>
+          <a:fillRef idx="0">
+            <a:schemeClr val="accent6"/>
+          </a:fillRef>
+          <a:effectRef idx="0">
+            <a:schemeClr val="accent6"/>
+          </a:effectRef>
+          <a:fontRef idx="minor">
+            <a:schemeClr val="tx1"/>
+          </a:fontRef>
+        </p:style>
+      </p:cxnSp>
+      <p:cxnSp>
+        <p:nvCxnSpPr>
+          <p:cNvPr id="51" name="Straight Arrow Connector 50">
+            <a:extLst>
+              <a:ext uri="{FF2B5EF4-FFF2-40B4-BE49-F238E27FC236}">
+                <a16:creationId xmlns:a16="http://schemas.microsoft.com/office/drawing/2014/main" id="{AD8485D6-6A0B-D1CF-6BD4-F852DB96264D}"/>
+              </a:ext>
+            </a:extLst>
+          </p:cNvPr>
+          <p:cNvCxnSpPr>
+            <a:cxnSpLocks/>
+          </p:cNvCxnSpPr>
+          <p:nvPr/>
+        </p:nvCxnSpPr>
+        <p:spPr>
+          <a:xfrm>
+            <a:off x="5771584" y="4480441"/>
+            <a:ext cx="540944" cy="733309"/>
+          </a:xfrm>
+          <a:prstGeom prst="straightConnector1">
+            <a:avLst/>
+          </a:prstGeom>
+          <a:ln w="76200">
+            <a:tailEnd type="triangle"/>
+          </a:ln>
+        </p:spPr>
+        <p:style>
+          <a:lnRef idx="1">
+            <a:schemeClr val="accent6"/>
+          </a:lnRef>
+          <a:fillRef idx="0">
+            <a:schemeClr val="accent6"/>
+          </a:fillRef>
+          <a:effectRef idx="0">
+            <a:schemeClr val="accent6"/>
+          </a:effectRef>
+          <a:fontRef idx="minor">
+            <a:schemeClr val="tx1"/>
+          </a:fontRef>
+        </p:style>
+      </p:cxnSp>
+      <p:sp>
+        <p:nvSpPr>
+          <p:cNvPr id="53" name="Rectangle 52">
+            <a:extLst>
+              <a:ext uri="{FF2B5EF4-FFF2-40B4-BE49-F238E27FC236}">
+                <a16:creationId xmlns:a16="http://schemas.microsoft.com/office/drawing/2014/main" id="{DB3A2E92-2C91-69D1-00F3-7DE862EA0336}"/>
+              </a:ext>
+            </a:extLst>
+          </p:cNvPr>
+          <p:cNvSpPr/>
+          <p:nvPr/>
+        </p:nvSpPr>
+        <p:spPr>
+          <a:xfrm>
+            <a:off x="3742853" y="5878815"/>
+            <a:ext cx="5573162" cy="605148"/>
+          </a:xfrm>
+          <a:prstGeom prst="rect">
+            <a:avLst/>
+          </a:prstGeom>
+        </p:spPr>
+        <p:style>
+          <a:lnRef idx="2">
+            <a:schemeClr val="accent4">
+              <a:shade val="15000"/>
+            </a:schemeClr>
+          </a:lnRef>
+          <a:fillRef idx="1">
+            <a:schemeClr val="accent4"/>
+          </a:fillRef>
+          <a:effectRef idx="0">
+            <a:schemeClr val="accent4"/>
+          </a:effectRef>
+          <a:fontRef idx="minor">
+            <a:schemeClr val="lt1"/>
+          </a:fontRef>
+        </p:style>
+        <p:txBody>
+          <a:bodyPr rtlCol="0" anchor="t"/>
+          <a:lstStyle/>
+          <a:p>
+            <a:r>
+              <a:rPr lang="en-PL" sz="1200" dirty="0"/>
+              <a:t>…</a:t>
+            </a:r>
+          </a:p>
+        </p:txBody>
+      </p:sp>
+      <p:sp>
+        <p:nvSpPr>
+          <p:cNvPr id="55" name="TextBox 54">
+            <a:extLst>
+              <a:ext uri="{FF2B5EF4-FFF2-40B4-BE49-F238E27FC236}">
+                <a16:creationId xmlns:a16="http://schemas.microsoft.com/office/drawing/2014/main" id="{B8BA21A1-C27D-3EA9-36CC-0510F05916D1}"/>
+              </a:ext>
+            </a:extLst>
+          </p:cNvPr>
+          <p:cNvSpPr txBox="1"/>
+          <p:nvPr/>
+        </p:nvSpPr>
+        <p:spPr>
+          <a:xfrm>
+            <a:off x="5271624" y="2165308"/>
+            <a:ext cx="895053" cy="553998"/>
+          </a:xfrm>
+          <a:prstGeom prst="rect">
+            <a:avLst/>
+          </a:prstGeom>
+          <a:solidFill>
+            <a:schemeClr val="lt1">
+              <a:alpha val="25586"/>
+            </a:schemeClr>
+          </a:solidFill>
+        </p:spPr>
+        <p:style>
+          <a:lnRef idx="2">
+            <a:schemeClr val="accent4"/>
+          </a:lnRef>
+          <a:fillRef idx="1">
+            <a:schemeClr val="lt1"/>
+          </a:fillRef>
+          <a:effectRef idx="0">
+            <a:schemeClr val="accent4"/>
+          </a:effectRef>
+          <a:fontRef idx="minor">
+            <a:schemeClr val="dk1"/>
+          </a:fontRef>
+        </p:style>
+        <p:txBody>
+          <a:bodyPr wrap="square" rtlCol="0">
+            <a:spAutoFit/>
+          </a:bodyPr>
+          <a:lstStyle/>
+          <a:p>
+            <a:pPr algn="ctr"/>
+            <a:r>
+              <a:rPr lang="en-PL" sz="1000" dirty="0"/>
+              <a:t>Generates</a:t>
+            </a:r>
+            <a:br>
+              <a:rPr lang="en-PL" sz="1000" dirty="0"/>
+            </a:br>
+            <a:r>
+              <a:rPr lang="en-PL" sz="1000" dirty="0"/>
+              <a:t>3</a:t>
+            </a:r>
+            <a:br>
+              <a:rPr lang="en-PL" sz="1000" dirty="0"/>
+            </a:br>
+            <a:r>
+              <a:rPr lang="en-PL" sz="1000" dirty="0"/>
+              <a:t>Applications</a:t>
+            </a:r>
+          </a:p>
+        </p:txBody>
+      </p:sp>
+      <p:sp>
+        <p:nvSpPr>
+          <p:cNvPr id="56" name="TextBox 55">
+            <a:extLst>
+              <a:ext uri="{FF2B5EF4-FFF2-40B4-BE49-F238E27FC236}">
+                <a16:creationId xmlns:a16="http://schemas.microsoft.com/office/drawing/2014/main" id="{1B446F80-70E0-D0E1-2F82-411B630171A7}"/>
+              </a:ext>
+            </a:extLst>
+          </p:cNvPr>
+          <p:cNvSpPr txBox="1"/>
+          <p:nvPr/>
+        </p:nvSpPr>
+        <p:spPr>
+          <a:xfrm>
+            <a:off x="5260116" y="4784757"/>
+            <a:ext cx="895053" cy="553998"/>
+          </a:xfrm>
+          <a:prstGeom prst="rect">
+            <a:avLst/>
+          </a:prstGeom>
+          <a:solidFill>
+            <a:schemeClr val="lt1">
+              <a:alpha val="25586"/>
+            </a:schemeClr>
+          </a:solidFill>
+        </p:spPr>
+        <p:style>
+          <a:lnRef idx="2">
+            <a:schemeClr val="accent4"/>
+          </a:lnRef>
+          <a:fillRef idx="1">
+            <a:schemeClr val="lt1"/>
+          </a:fillRef>
+          <a:effectRef idx="0">
+            <a:schemeClr val="accent4"/>
+          </a:effectRef>
+          <a:fontRef idx="minor">
+            <a:schemeClr val="dk1"/>
+          </a:fontRef>
+        </p:style>
+        <p:txBody>
+          <a:bodyPr wrap="square" rtlCol="0">
+            <a:spAutoFit/>
+          </a:bodyPr>
+          <a:lstStyle/>
+          <a:p>
+            <a:pPr algn="ctr"/>
+            <a:r>
+              <a:rPr lang="en-PL" sz="1000" dirty="0"/>
+              <a:t>Generates</a:t>
+            </a:r>
+            <a:br>
+              <a:rPr lang="en-PL" sz="1000" dirty="0"/>
+            </a:br>
+            <a:r>
+              <a:rPr lang="en-PL" sz="1000" dirty="0"/>
+              <a:t>2</a:t>
+            </a:r>
+            <a:br>
+              <a:rPr lang="en-PL" sz="1000" dirty="0"/>
+            </a:br>
+            <a:r>
+              <a:rPr lang="en-PL" sz="1000" dirty="0"/>
+              <a:t>Applications</a:t>
+            </a:r>
+          </a:p>
+        </p:txBody>
+      </p:sp>
+      <p:sp>
+        <p:nvSpPr>
+          <p:cNvPr id="58" name="TextBox 57">
+            <a:extLst>
+              <a:ext uri="{FF2B5EF4-FFF2-40B4-BE49-F238E27FC236}">
+                <a16:creationId xmlns:a16="http://schemas.microsoft.com/office/drawing/2014/main" id="{CD123A3F-3C0E-0032-9F7A-6D60A904240F}"/>
+              </a:ext>
+            </a:extLst>
+          </p:cNvPr>
+          <p:cNvSpPr txBox="1"/>
+          <p:nvPr/>
+        </p:nvSpPr>
+        <p:spPr>
+          <a:xfrm>
+            <a:off x="1990685" y="3260016"/>
+            <a:ext cx="895053" cy="553998"/>
+          </a:xfrm>
+          <a:prstGeom prst="rect">
+            <a:avLst/>
+          </a:prstGeom>
+          <a:solidFill>
+            <a:schemeClr val="lt1">
+              <a:alpha val="25586"/>
+            </a:schemeClr>
+          </a:solidFill>
+        </p:spPr>
+        <p:style>
+          <a:lnRef idx="2">
+            <a:schemeClr val="accent4"/>
+          </a:lnRef>
+          <a:fillRef idx="1">
+            <a:schemeClr val="lt1"/>
+          </a:fillRef>
+          <a:effectRef idx="0">
+            <a:schemeClr val="accent4"/>
+          </a:effectRef>
+          <a:fontRef idx="minor">
+            <a:schemeClr val="dk1"/>
+          </a:fontRef>
+        </p:style>
+        <p:txBody>
+          <a:bodyPr wrap="square" rtlCol="0">
+            <a:spAutoFit/>
+          </a:bodyPr>
+          <a:lstStyle/>
+          <a:p>
+            <a:pPr algn="ctr"/>
+            <a:r>
+              <a:rPr lang="en-PL" sz="1000" dirty="0"/>
+              <a:t>Generates</a:t>
+            </a:r>
+            <a:br>
+              <a:rPr lang="en-PL" sz="1000" dirty="0"/>
+            </a:br>
+            <a:r>
+              <a:rPr lang="en-PL" sz="1000" dirty="0"/>
+              <a:t>41</a:t>
+            </a:r>
+            <a:br>
+              <a:rPr lang="en-PL" sz="1000" dirty="0"/>
+            </a:br>
+            <a:r>
+              <a:rPr lang="en-PL" sz="1000" dirty="0"/>
+              <a:t>Applications</a:t>
+            </a:r>
+          </a:p>
+        </p:txBody>
+      </p:sp>
+      <p:sp>
+        <p:nvSpPr>
+          <p:cNvPr id="59" name="TextBox 58">
+            <a:extLst>
+              <a:ext uri="{FF2B5EF4-FFF2-40B4-BE49-F238E27FC236}">
+                <a16:creationId xmlns:a16="http://schemas.microsoft.com/office/drawing/2014/main" id="{783FBA5F-B02A-5CA9-E0A7-80CBB41D0702}"/>
+              </a:ext>
+            </a:extLst>
+          </p:cNvPr>
+          <p:cNvSpPr txBox="1"/>
+          <p:nvPr/>
+        </p:nvSpPr>
+        <p:spPr>
+          <a:xfrm>
+            <a:off x="10128787" y="1795034"/>
+            <a:ext cx="1652568" cy="369332"/>
+          </a:xfrm>
+          <a:prstGeom prst="rect">
+            <a:avLst/>
+          </a:prstGeom>
+          <a:noFill/>
+        </p:spPr>
+        <p:txBody>
+          <a:bodyPr wrap="none" rtlCol="0">
+            <a:spAutoFit/>
+          </a:bodyPr>
+          <a:lstStyle/>
+          <a:p>
+            <a:r>
+              <a:rPr lang="en-GB" dirty="0">
+                <a:hlinkClick r:id="rId2"/>
+              </a:rPr>
+              <a:t>L</a:t>
+            </a:r>
+            <a:r>
+              <a:rPr lang="en-PL" dirty="0">
+                <a:hlinkClick r:id="rId2"/>
+              </a:rPr>
+              <a:t>ink to ArgoCD</a:t>
+            </a:r>
+            <a:endParaRPr lang="en-PL" dirty="0"/>
+          </a:p>
+        </p:txBody>
+      </p:sp>
+      <p:cxnSp>
+        <p:nvCxnSpPr>
+          <p:cNvPr id="60" name="Straight Arrow Connector 59">
+            <a:extLst>
+              <a:ext uri="{FF2B5EF4-FFF2-40B4-BE49-F238E27FC236}">
+                <a16:creationId xmlns:a16="http://schemas.microsoft.com/office/drawing/2014/main" id="{9F267F74-8497-F5C8-F9D9-6F25061B355B}"/>
+              </a:ext>
+            </a:extLst>
+          </p:cNvPr>
+          <p:cNvCxnSpPr>
+            <a:cxnSpLocks/>
+            <a:stCxn id="8" idx="3"/>
+            <a:endCxn id="59" idx="1"/>
+          </p:cNvCxnSpPr>
+          <p:nvPr/>
+        </p:nvCxnSpPr>
+        <p:spPr>
+          <a:xfrm flipV="1">
+            <a:off x="9089678" y="1979700"/>
+            <a:ext cx="1039109" cy="1"/>
+          </a:xfrm>
+          <a:prstGeom prst="straightConnector1">
+            <a:avLst/>
+          </a:prstGeom>
+          <a:ln w="76200">
+            <a:tailEnd type="triangle"/>
+          </a:ln>
+        </p:spPr>
+        <p:style>
+          <a:lnRef idx="1">
+            <a:schemeClr val="accent6"/>
+          </a:lnRef>
+          <a:fillRef idx="0">
+            <a:schemeClr val="accent6"/>
+          </a:fillRef>
+          <a:effectRef idx="0">
+            <a:schemeClr val="accent6"/>
+          </a:effectRef>
+          <a:fontRef idx="minor">
+            <a:schemeClr val="tx1"/>
+          </a:fontRef>
+        </p:style>
+      </p:cxnSp>
+    </p:spTree>
+    <p:extLst>
+      <p:ext uri="{BB962C8B-B14F-4D97-AF65-F5344CB8AC3E}">
+        <p14:creationId xmlns:p14="http://schemas.microsoft.com/office/powerpoint/2010/main" val="1259204667"/>
+      </p:ext>
+    </p:extLst>
+  </p:cSld>
+  <p:clrMapOvr>
+    <a:masterClrMapping/>
+  </p:clrMapOvr>
+</p:sld>
+</file>
+
+<file path=ppt/slides/slide25.xml><?xml version="1.0" encoding="utf-8"?>
 <p:sld xmlns:a="http://schemas.openxmlformats.org/drawingml/2006/main" xmlns:r="http://schemas.openxmlformats.org/officeDocument/2006/relationships" xmlns:p="http://schemas.openxmlformats.org/presentationml/2006/main">
   <p:cSld>
     <p:spTree>
@@ -7321,109 +8846,6 @@
     <p:extLst>
       <p:ext uri="{BB962C8B-B14F-4D97-AF65-F5344CB8AC3E}">
         <p14:creationId xmlns:p14="http://schemas.microsoft.com/office/powerpoint/2010/main" val="2908782905"/>
-      </p:ext>
-    </p:extLst>
-  </p:cSld>
-  <p:clrMapOvr>
-    <a:masterClrMapping/>
-  </p:clrMapOvr>
-</p:sld>
-</file>
-
-<file path=ppt/slides/slide25.xml><?xml version="1.0" encoding="utf-8"?>
-<p:sld xmlns:a="http://schemas.openxmlformats.org/drawingml/2006/main" xmlns:r="http://schemas.openxmlformats.org/officeDocument/2006/relationships" xmlns:p="http://schemas.openxmlformats.org/presentationml/2006/main">
-  <p:cSld>
-    <p:spTree>
-      <p:nvGrpSpPr>
-        <p:cNvPr id="1" name="">
-          <a:extLst>
-            <a:ext uri="{FF2B5EF4-FFF2-40B4-BE49-F238E27FC236}">
-              <a16:creationId xmlns:a16="http://schemas.microsoft.com/office/drawing/2014/main" id="{8BE49778-AC65-6D05-C9E0-C4F99BE05E63}"/>
-            </a:ext>
-          </a:extLst>
-        </p:cNvPr>
-        <p:cNvGrpSpPr/>
-        <p:nvPr/>
-      </p:nvGrpSpPr>
-      <p:grpSpPr>
-        <a:xfrm>
-          <a:off x="0" y="0"/>
-          <a:ext cx="0" cy="0"/>
-          <a:chOff x="0" y="0"/>
-          <a:chExt cx="0" cy="0"/>
-        </a:xfrm>
-      </p:grpSpPr>
-      <p:sp>
-        <p:nvSpPr>
-          <p:cNvPr id="2" name="Title 1">
-            <a:extLst>
-              <a:ext uri="{FF2B5EF4-FFF2-40B4-BE49-F238E27FC236}">
-                <a16:creationId xmlns:a16="http://schemas.microsoft.com/office/drawing/2014/main" id="{8F4F0C95-F61A-B419-7FEC-D1B328A7262B}"/>
-              </a:ext>
-            </a:extLst>
-          </p:cNvPr>
-          <p:cNvSpPr>
-            <a:spLocks noGrp="1"/>
-          </p:cNvSpPr>
-          <p:nvPr>
-            <p:ph type="ctrTitle"/>
-          </p:nvPr>
-        </p:nvSpPr>
-        <p:spPr>
-          <a:xfrm>
-            <a:off x="1524000" y="1458686"/>
-            <a:ext cx="9144000" cy="1681163"/>
-          </a:xfrm>
-        </p:spPr>
-        <p:txBody>
-          <a:bodyPr>
-            <a:normAutofit/>
-          </a:bodyPr>
-          <a:lstStyle/>
-          <a:p>
-            <a:r>
-              <a:rPr lang="en-PL" sz="8000" dirty="0"/>
-              <a:t>Keda</a:t>
-            </a:r>
-          </a:p>
-        </p:txBody>
-      </p:sp>
-      <p:sp>
-        <p:nvSpPr>
-          <p:cNvPr id="3" name="Subtitle 2">
-            <a:extLst>
-              <a:ext uri="{FF2B5EF4-FFF2-40B4-BE49-F238E27FC236}">
-                <a16:creationId xmlns:a16="http://schemas.microsoft.com/office/drawing/2014/main" id="{6C7F780A-FC9E-84A1-030D-A0284D4AB6DA}"/>
-              </a:ext>
-            </a:extLst>
-          </p:cNvPr>
-          <p:cNvSpPr>
-            <a:spLocks noGrp="1"/>
-          </p:cNvSpPr>
-          <p:nvPr>
-            <p:ph type="subTitle" idx="1"/>
-          </p:nvPr>
-        </p:nvSpPr>
-        <p:spPr>
-          <a:xfrm>
-            <a:off x="1600200" y="3429000"/>
-            <a:ext cx="9144000" cy="1970314"/>
-          </a:xfrm>
-        </p:spPr>
-        <p:txBody>
-          <a:bodyPr>
-            <a:normAutofit/>
-          </a:bodyPr>
-          <a:lstStyle/>
-          <a:p>
-            <a:endParaRPr lang="en-PL" dirty="0"/>
-          </a:p>
-        </p:txBody>
-      </p:sp>
-    </p:spTree>
-    <p:extLst>
-      <p:ext uri="{BB962C8B-B14F-4D97-AF65-F5344CB8AC3E}">
-        <p14:creationId xmlns:p14="http://schemas.microsoft.com/office/powerpoint/2010/main" val="2150785153"/>
       </p:ext>
     </p:extLst>
   </p:cSld>
@@ -7455,7 +8877,7 @@
           <p:cNvPr id="2" name="Title 1">
             <a:extLst>
               <a:ext uri="{FF2B5EF4-FFF2-40B4-BE49-F238E27FC236}">
-                <a16:creationId xmlns:a16="http://schemas.microsoft.com/office/drawing/2014/main" id="{63C5CC79-8E1A-4F51-563A-BEB7F4DDDBAE}"/>
+                <a16:creationId xmlns:a16="http://schemas.microsoft.com/office/drawing/2014/main" id="{1FB31EC8-0AA8-B3D6-A517-AADB52211F02}"/>
               </a:ext>
             </a:extLst>
           </p:cNvPr>
@@ -7473,7 +8895,7 @@
           <a:p>
             <a:r>
               <a:rPr lang="en-PL" dirty="0"/>
-              <a:t>Sources</a:t>
+              <a:t>UP pull request merge</a:t>
             </a:r>
           </a:p>
         </p:txBody>
@@ -7483,7 +8905,7 @@
           <p:cNvPr id="3" name="Content Placeholder 2">
             <a:extLst>
               <a:ext uri="{FF2B5EF4-FFF2-40B4-BE49-F238E27FC236}">
-                <a16:creationId xmlns:a16="http://schemas.microsoft.com/office/drawing/2014/main" id="{9AB200A5-57CA-EC57-2BCF-B1DD4988CBCF}"/>
+                <a16:creationId xmlns:a16="http://schemas.microsoft.com/office/drawing/2014/main" id="{48C873DA-5CBC-C801-AACF-A3C70EA23C30}"/>
               </a:ext>
             </a:extLst>
           </p:cNvPr>
@@ -7499,59 +8921,6 @@
           <a:bodyPr/>
           <a:lstStyle/>
           <a:p>
-            <a:r>
-              <a:rPr lang="en-PL" dirty="0"/>
-              <a:t>Docs1 - </a:t>
-            </a:r>
-            <a:r>
-              <a:rPr lang="en-GB" dirty="0"/>
-              <a:t>https://</a:t>
-            </a:r>
-            <a:r>
-              <a:rPr lang="en-GB" dirty="0" err="1"/>
-              <a:t>kubernetes.io</a:t>
-            </a:r>
-            <a:r>
-              <a:rPr lang="en-GB" dirty="0"/>
-              <a:t>/docs/home/</a:t>
-            </a:r>
-            <a:endParaRPr lang="en-PL" dirty="0"/>
-          </a:p>
-          <a:p>
-            <a:r>
-              <a:rPr lang="en-PL" dirty="0"/>
-              <a:t>Docs2 - </a:t>
-            </a:r>
-            <a:r>
-              <a:rPr lang="en-GB" dirty="0"/>
-              <a:t>https://</a:t>
-            </a:r>
-            <a:r>
-              <a:rPr lang="en-GB" dirty="0" err="1"/>
-              <a:t>helm.sh</a:t>
-            </a:r>
-            <a:r>
-              <a:rPr lang="en-GB" dirty="0"/>
-              <a:t>/docs/topics/charts/</a:t>
-            </a:r>
-            <a:endParaRPr lang="en-PL" dirty="0"/>
-          </a:p>
-          <a:p>
-            <a:endParaRPr lang="en-PL" dirty="0"/>
-          </a:p>
-          <a:p>
-            <a:r>
-              <a:rPr lang="en-GB" dirty="0"/>
-              <a:t>Diagram</a:t>
-            </a:r>
-            <a:r>
-              <a:rPr lang="en-PL" dirty="0"/>
-              <a:t>1 [IRSA] - </a:t>
-            </a:r>
-            <a:r>
-              <a:rPr lang="en-GB" dirty="0"/>
-              <a:t>https://mohaamer5.medium.com/iam-roles-for-service-accounts-with-eks-irsa-good-bye-aws-credentials-1cdf1fa5192</a:t>
-            </a:r>
             <a:endParaRPr lang="en-PL" dirty="0"/>
           </a:p>
         </p:txBody>
@@ -7559,7 +8928,263 @@
     </p:spTree>
     <p:extLst>
       <p:ext uri="{BB962C8B-B14F-4D97-AF65-F5344CB8AC3E}">
-        <p14:creationId xmlns:p14="http://schemas.microsoft.com/office/powerpoint/2010/main" val="1092334499"/>
+        <p14:creationId xmlns:p14="http://schemas.microsoft.com/office/powerpoint/2010/main" val="1092976792"/>
+      </p:ext>
+    </p:extLst>
+  </p:cSld>
+  <p:clrMapOvr>
+    <a:masterClrMapping/>
+  </p:clrMapOvr>
+</p:sld>
+</file>
+
+<file path=ppt/slides/slide27.xml><?xml version="1.0" encoding="utf-8"?>
+<p:sld xmlns:a="http://schemas.openxmlformats.org/drawingml/2006/main" xmlns:r="http://schemas.openxmlformats.org/officeDocument/2006/relationships" xmlns:p="http://schemas.openxmlformats.org/presentationml/2006/main">
+  <p:cSld>
+    <p:spTree>
+      <p:nvGrpSpPr>
+        <p:cNvPr id="1" name=""/>
+        <p:cNvGrpSpPr/>
+        <p:nvPr/>
+      </p:nvGrpSpPr>
+      <p:grpSpPr>
+        <a:xfrm>
+          <a:off x="0" y="0"/>
+          <a:ext cx="0" cy="0"/>
+          <a:chOff x="0" y="0"/>
+          <a:chExt cx="0" cy="0"/>
+        </a:xfrm>
+      </p:grpSpPr>
+      <p:sp>
+        <p:nvSpPr>
+          <p:cNvPr id="2" name="Title 1">
+            <a:extLst>
+              <a:ext uri="{FF2B5EF4-FFF2-40B4-BE49-F238E27FC236}">
+                <a16:creationId xmlns:a16="http://schemas.microsoft.com/office/drawing/2014/main" id="{1B61766A-D5B7-292F-B2C3-E0575136329B}"/>
+              </a:ext>
+            </a:extLst>
+          </p:cNvPr>
+          <p:cNvSpPr>
+            <a:spLocks noGrp="1"/>
+          </p:cNvSpPr>
+          <p:nvPr>
+            <p:ph type="title"/>
+          </p:nvPr>
+        </p:nvSpPr>
+        <p:spPr/>
+        <p:txBody>
+          <a:bodyPr/>
+          <a:lstStyle/>
+          <a:p>
+            <a:r>
+              <a:rPr lang="en-PL" dirty="0"/>
+              <a:t>UP service restart</a:t>
+            </a:r>
+            <a:br>
+              <a:rPr lang="en-PL" dirty="0"/>
+            </a:br>
+            <a:r>
+              <a:rPr lang="en-PL" dirty="0"/>
+              <a:t>(e.g. after configuration change)</a:t>
+            </a:r>
+          </a:p>
+        </p:txBody>
+      </p:sp>
+      <p:sp>
+        <p:nvSpPr>
+          <p:cNvPr id="3" name="Content Placeholder 2">
+            <a:extLst>
+              <a:ext uri="{FF2B5EF4-FFF2-40B4-BE49-F238E27FC236}">
+                <a16:creationId xmlns:a16="http://schemas.microsoft.com/office/drawing/2014/main" id="{C352D6FD-C1B8-8D58-B987-57AAB1E63D71}"/>
+              </a:ext>
+            </a:extLst>
+          </p:cNvPr>
+          <p:cNvSpPr>
+            <a:spLocks noGrp="1"/>
+          </p:cNvSpPr>
+          <p:nvPr>
+            <p:ph idx="1"/>
+          </p:nvPr>
+        </p:nvSpPr>
+        <p:spPr/>
+        <p:txBody>
+          <a:bodyPr/>
+          <a:lstStyle/>
+          <a:p>
+            <a:endParaRPr lang="en-PL" dirty="0"/>
+          </a:p>
+        </p:txBody>
+      </p:sp>
+    </p:spTree>
+    <p:extLst>
+      <p:ext uri="{BB962C8B-B14F-4D97-AF65-F5344CB8AC3E}">
+        <p14:creationId xmlns:p14="http://schemas.microsoft.com/office/powerpoint/2010/main" val="1796784042"/>
+      </p:ext>
+    </p:extLst>
+  </p:cSld>
+  <p:clrMapOvr>
+    <a:masterClrMapping/>
+  </p:clrMapOvr>
+</p:sld>
+</file>
+
+<file path=ppt/slides/slide28.xml><?xml version="1.0" encoding="utf-8"?>
+<p:sld xmlns:a="http://schemas.openxmlformats.org/drawingml/2006/main" xmlns:r="http://schemas.openxmlformats.org/officeDocument/2006/relationships" xmlns:p="http://schemas.openxmlformats.org/presentationml/2006/main">
+  <p:cSld>
+    <p:spTree>
+      <p:nvGrpSpPr>
+        <p:cNvPr id="1" name=""/>
+        <p:cNvGrpSpPr/>
+        <p:nvPr/>
+      </p:nvGrpSpPr>
+      <p:grpSpPr>
+        <a:xfrm>
+          <a:off x="0" y="0"/>
+          <a:ext cx="0" cy="0"/>
+          <a:chOff x="0" y="0"/>
+          <a:chExt cx="0" cy="0"/>
+        </a:xfrm>
+      </p:grpSpPr>
+      <p:sp>
+        <p:nvSpPr>
+          <p:cNvPr id="2" name="Title 1">
+            <a:extLst>
+              <a:ext uri="{FF2B5EF4-FFF2-40B4-BE49-F238E27FC236}">
+                <a16:creationId xmlns:a16="http://schemas.microsoft.com/office/drawing/2014/main" id="{B995D1DA-CF6D-4B47-86DF-968B96E23D0F}"/>
+              </a:ext>
+            </a:extLst>
+          </p:cNvPr>
+          <p:cNvSpPr>
+            <a:spLocks noGrp="1"/>
+          </p:cNvSpPr>
+          <p:nvPr>
+            <p:ph type="title"/>
+          </p:nvPr>
+        </p:nvSpPr>
+        <p:spPr/>
+        <p:txBody>
+          <a:bodyPr/>
+          <a:lstStyle/>
+          <a:p>
+            <a:r>
+              <a:rPr lang="en-PL" dirty="0"/>
+              <a:t>UP service horizontal scaling up/down</a:t>
+            </a:r>
+          </a:p>
+        </p:txBody>
+      </p:sp>
+      <p:sp>
+        <p:nvSpPr>
+          <p:cNvPr id="3" name="Content Placeholder 2">
+            <a:extLst>
+              <a:ext uri="{FF2B5EF4-FFF2-40B4-BE49-F238E27FC236}">
+                <a16:creationId xmlns:a16="http://schemas.microsoft.com/office/drawing/2014/main" id="{C3DDAD32-3404-EF53-8E8F-E50C6BA1D7C0}"/>
+              </a:ext>
+            </a:extLst>
+          </p:cNvPr>
+          <p:cNvSpPr>
+            <a:spLocks noGrp="1"/>
+          </p:cNvSpPr>
+          <p:nvPr>
+            <p:ph idx="1"/>
+          </p:nvPr>
+        </p:nvSpPr>
+        <p:spPr/>
+        <p:txBody>
+          <a:bodyPr/>
+          <a:lstStyle/>
+          <a:p>
+            <a:endParaRPr lang="en-PL"/>
+          </a:p>
+        </p:txBody>
+      </p:sp>
+    </p:spTree>
+    <p:extLst>
+      <p:ext uri="{BB962C8B-B14F-4D97-AF65-F5344CB8AC3E}">
+        <p14:creationId xmlns:p14="http://schemas.microsoft.com/office/powerpoint/2010/main" val="3823978147"/>
+      </p:ext>
+    </p:extLst>
+  </p:cSld>
+  <p:clrMapOvr>
+    <a:masterClrMapping/>
+  </p:clrMapOvr>
+</p:sld>
+</file>
+
+<file path=ppt/slides/slide29.xml><?xml version="1.0" encoding="utf-8"?>
+<p:sld xmlns:a="http://schemas.openxmlformats.org/drawingml/2006/main" xmlns:r="http://schemas.openxmlformats.org/officeDocument/2006/relationships" xmlns:p="http://schemas.openxmlformats.org/presentationml/2006/main">
+  <p:cSld>
+    <p:spTree>
+      <p:nvGrpSpPr>
+        <p:cNvPr id="1" name=""/>
+        <p:cNvGrpSpPr/>
+        <p:nvPr/>
+      </p:nvGrpSpPr>
+      <p:grpSpPr>
+        <a:xfrm>
+          <a:off x="0" y="0"/>
+          <a:ext cx="0" cy="0"/>
+          <a:chOff x="0" y="0"/>
+          <a:chExt cx="0" cy="0"/>
+        </a:xfrm>
+      </p:grpSpPr>
+      <p:sp>
+        <p:nvSpPr>
+          <p:cNvPr id="2" name="Title 1">
+            <a:extLst>
+              <a:ext uri="{FF2B5EF4-FFF2-40B4-BE49-F238E27FC236}">
+                <a16:creationId xmlns:a16="http://schemas.microsoft.com/office/drawing/2014/main" id="{7502BB1E-7B18-1D57-9112-EE47A569D626}"/>
+              </a:ext>
+            </a:extLst>
+          </p:cNvPr>
+          <p:cNvSpPr>
+            <a:spLocks noGrp="1"/>
+          </p:cNvSpPr>
+          <p:nvPr>
+            <p:ph type="title"/>
+          </p:nvPr>
+        </p:nvSpPr>
+        <p:spPr/>
+        <p:txBody>
+          <a:bodyPr/>
+          <a:lstStyle/>
+          <a:p>
+            <a:r>
+              <a:rPr lang="en-PL" dirty="0"/>
+              <a:t>UP autoscaling (Keda)</a:t>
+            </a:r>
+          </a:p>
+        </p:txBody>
+      </p:sp>
+      <p:sp>
+        <p:nvSpPr>
+          <p:cNvPr id="3" name="Content Placeholder 2">
+            <a:extLst>
+              <a:ext uri="{FF2B5EF4-FFF2-40B4-BE49-F238E27FC236}">
+                <a16:creationId xmlns:a16="http://schemas.microsoft.com/office/drawing/2014/main" id="{F937F714-33F4-9598-24BC-32DB60166F48}"/>
+              </a:ext>
+            </a:extLst>
+          </p:cNvPr>
+          <p:cNvSpPr>
+            <a:spLocks noGrp="1"/>
+          </p:cNvSpPr>
+          <p:nvPr>
+            <p:ph idx="1"/>
+          </p:nvPr>
+        </p:nvSpPr>
+        <p:spPr/>
+        <p:txBody>
+          <a:bodyPr/>
+          <a:lstStyle/>
+          <a:p>
+            <a:endParaRPr lang="en-PL"/>
+          </a:p>
+        </p:txBody>
+      </p:sp>
+    </p:spTree>
+    <p:extLst>
+      <p:ext uri="{BB962C8B-B14F-4D97-AF65-F5344CB8AC3E}">
+        <p14:creationId xmlns:p14="http://schemas.microsoft.com/office/powerpoint/2010/main" val="2534809687"/>
       </p:ext>
     </p:extLst>
   </p:cSld>
@@ -7618,6 +9243,328 @@
     <p:extLst>
       <p:ext uri="{BB962C8B-B14F-4D97-AF65-F5344CB8AC3E}">
         <p14:creationId xmlns:p14="http://schemas.microsoft.com/office/powerpoint/2010/main" val="4161032743"/>
+      </p:ext>
+    </p:extLst>
+  </p:cSld>
+  <p:clrMapOvr>
+    <a:masterClrMapping/>
+  </p:clrMapOvr>
+</p:sld>
+</file>
+
+<file path=ppt/slides/slide30.xml><?xml version="1.0" encoding="utf-8"?>
+<p:sld xmlns:a="http://schemas.openxmlformats.org/drawingml/2006/main" xmlns:r="http://schemas.openxmlformats.org/officeDocument/2006/relationships" xmlns:p="http://schemas.openxmlformats.org/presentationml/2006/main">
+  <p:cSld>
+    <p:spTree>
+      <p:nvGrpSpPr>
+        <p:cNvPr id="1" name="">
+          <a:extLst>
+            <a:ext uri="{FF2B5EF4-FFF2-40B4-BE49-F238E27FC236}">
+              <a16:creationId xmlns:a16="http://schemas.microsoft.com/office/drawing/2014/main" id="{8BE49778-AC65-6D05-C9E0-C4F99BE05E63}"/>
+            </a:ext>
+          </a:extLst>
+        </p:cNvPr>
+        <p:cNvGrpSpPr/>
+        <p:nvPr/>
+      </p:nvGrpSpPr>
+      <p:grpSpPr>
+        <a:xfrm>
+          <a:off x="0" y="0"/>
+          <a:ext cx="0" cy="0"/>
+          <a:chOff x="0" y="0"/>
+          <a:chExt cx="0" cy="0"/>
+        </a:xfrm>
+      </p:grpSpPr>
+      <p:sp>
+        <p:nvSpPr>
+          <p:cNvPr id="2" name="Title 1">
+            <a:extLst>
+              <a:ext uri="{FF2B5EF4-FFF2-40B4-BE49-F238E27FC236}">
+                <a16:creationId xmlns:a16="http://schemas.microsoft.com/office/drawing/2014/main" id="{8F4F0C95-F61A-B419-7FEC-D1B328A7262B}"/>
+              </a:ext>
+            </a:extLst>
+          </p:cNvPr>
+          <p:cNvSpPr>
+            <a:spLocks noGrp="1"/>
+          </p:cNvSpPr>
+          <p:nvPr>
+            <p:ph type="ctrTitle"/>
+          </p:nvPr>
+        </p:nvSpPr>
+        <p:spPr>
+          <a:xfrm>
+            <a:off x="1524000" y="1458686"/>
+            <a:ext cx="9144000" cy="1681163"/>
+          </a:xfrm>
+        </p:spPr>
+        <p:txBody>
+          <a:bodyPr>
+            <a:normAutofit/>
+          </a:bodyPr>
+          <a:lstStyle/>
+          <a:p>
+            <a:r>
+              <a:rPr lang="en-PL" sz="8000" dirty="0"/>
+              <a:t>Keda</a:t>
+            </a:r>
+          </a:p>
+        </p:txBody>
+      </p:sp>
+      <p:sp>
+        <p:nvSpPr>
+          <p:cNvPr id="3" name="Subtitle 2">
+            <a:extLst>
+              <a:ext uri="{FF2B5EF4-FFF2-40B4-BE49-F238E27FC236}">
+                <a16:creationId xmlns:a16="http://schemas.microsoft.com/office/drawing/2014/main" id="{6C7F780A-FC9E-84A1-030D-A0284D4AB6DA}"/>
+              </a:ext>
+            </a:extLst>
+          </p:cNvPr>
+          <p:cNvSpPr>
+            <a:spLocks noGrp="1"/>
+          </p:cNvSpPr>
+          <p:nvPr>
+            <p:ph type="subTitle" idx="1"/>
+          </p:nvPr>
+        </p:nvSpPr>
+        <p:spPr>
+          <a:xfrm>
+            <a:off x="1600200" y="3429000"/>
+            <a:ext cx="9144000" cy="1970314"/>
+          </a:xfrm>
+        </p:spPr>
+        <p:txBody>
+          <a:bodyPr>
+            <a:normAutofit/>
+          </a:bodyPr>
+          <a:lstStyle/>
+          <a:p>
+            <a:endParaRPr lang="en-PL" dirty="0"/>
+          </a:p>
+        </p:txBody>
+      </p:sp>
+    </p:spTree>
+    <p:extLst>
+      <p:ext uri="{BB962C8B-B14F-4D97-AF65-F5344CB8AC3E}">
+        <p14:creationId xmlns:p14="http://schemas.microsoft.com/office/powerpoint/2010/main" val="2150785153"/>
+      </p:ext>
+    </p:extLst>
+  </p:cSld>
+  <p:clrMapOvr>
+    <a:masterClrMapping/>
+  </p:clrMapOvr>
+</p:sld>
+</file>
+
+<file path=ppt/slides/slide31.xml><?xml version="1.0" encoding="utf-8"?>
+<p:sld xmlns:a="http://schemas.openxmlformats.org/drawingml/2006/main" xmlns:r="http://schemas.openxmlformats.org/officeDocument/2006/relationships" xmlns:p="http://schemas.openxmlformats.org/presentationml/2006/main">
+  <p:cSld>
+    <p:spTree>
+      <p:nvGrpSpPr>
+        <p:cNvPr id="1" name=""/>
+        <p:cNvGrpSpPr/>
+        <p:nvPr/>
+      </p:nvGrpSpPr>
+      <p:grpSpPr>
+        <a:xfrm>
+          <a:off x="0" y="0"/>
+          <a:ext cx="0" cy="0"/>
+          <a:chOff x="0" y="0"/>
+          <a:chExt cx="0" cy="0"/>
+        </a:xfrm>
+      </p:grpSpPr>
+      <p:sp>
+        <p:nvSpPr>
+          <p:cNvPr id="2" name="Title 1">
+            <a:extLst>
+              <a:ext uri="{FF2B5EF4-FFF2-40B4-BE49-F238E27FC236}">
+                <a16:creationId xmlns:a16="http://schemas.microsoft.com/office/drawing/2014/main" id="{63C5CC79-8E1A-4F51-563A-BEB7F4DDDBAE}"/>
+              </a:ext>
+            </a:extLst>
+          </p:cNvPr>
+          <p:cNvSpPr>
+            <a:spLocks noGrp="1"/>
+          </p:cNvSpPr>
+          <p:nvPr>
+            <p:ph type="title"/>
+          </p:nvPr>
+        </p:nvSpPr>
+        <p:spPr/>
+        <p:txBody>
+          <a:bodyPr/>
+          <a:lstStyle/>
+          <a:p>
+            <a:r>
+              <a:rPr lang="en-PL" dirty="0"/>
+              <a:t>Sources</a:t>
+            </a:r>
+          </a:p>
+        </p:txBody>
+      </p:sp>
+      <p:sp>
+        <p:nvSpPr>
+          <p:cNvPr id="3" name="Content Placeholder 2">
+            <a:extLst>
+              <a:ext uri="{FF2B5EF4-FFF2-40B4-BE49-F238E27FC236}">
+                <a16:creationId xmlns:a16="http://schemas.microsoft.com/office/drawing/2014/main" id="{9AB200A5-57CA-EC57-2BCF-B1DD4988CBCF}"/>
+              </a:ext>
+            </a:extLst>
+          </p:cNvPr>
+          <p:cNvSpPr>
+            <a:spLocks noGrp="1"/>
+          </p:cNvSpPr>
+          <p:nvPr>
+            <p:ph idx="1"/>
+          </p:nvPr>
+        </p:nvSpPr>
+        <p:spPr/>
+        <p:txBody>
+          <a:bodyPr/>
+          <a:lstStyle/>
+          <a:p>
+            <a:r>
+              <a:rPr lang="en-PL" dirty="0"/>
+              <a:t>Docs1 - </a:t>
+            </a:r>
+            <a:r>
+              <a:rPr lang="en-GB" dirty="0"/>
+              <a:t>https://</a:t>
+            </a:r>
+            <a:r>
+              <a:rPr lang="en-GB" dirty="0" err="1"/>
+              <a:t>kubernetes.io</a:t>
+            </a:r>
+            <a:r>
+              <a:rPr lang="en-GB" dirty="0"/>
+              <a:t>/docs/home/</a:t>
+            </a:r>
+            <a:endParaRPr lang="en-PL" dirty="0"/>
+          </a:p>
+          <a:p>
+            <a:r>
+              <a:rPr lang="en-PL" dirty="0"/>
+              <a:t>Docs2 - </a:t>
+            </a:r>
+            <a:r>
+              <a:rPr lang="en-GB" dirty="0"/>
+              <a:t>https://</a:t>
+            </a:r>
+            <a:r>
+              <a:rPr lang="en-GB" dirty="0" err="1"/>
+              <a:t>helm.sh</a:t>
+            </a:r>
+            <a:r>
+              <a:rPr lang="en-GB" dirty="0"/>
+              <a:t>/docs/topics/charts/</a:t>
+            </a:r>
+            <a:endParaRPr lang="en-PL" dirty="0"/>
+          </a:p>
+          <a:p>
+            <a:endParaRPr lang="en-PL" dirty="0"/>
+          </a:p>
+          <a:p>
+            <a:r>
+              <a:rPr lang="en-GB" dirty="0"/>
+              <a:t>Diagram</a:t>
+            </a:r>
+            <a:r>
+              <a:rPr lang="en-PL" dirty="0"/>
+              <a:t>1 [IRSA] - </a:t>
+            </a:r>
+            <a:r>
+              <a:rPr lang="en-GB" dirty="0"/>
+              <a:t>https://mohaamer5.medium.com/iam-roles-for-service-accounts-with-eks-irsa-good-bye-aws-credentials-1cdf1fa5192</a:t>
+            </a:r>
+            <a:endParaRPr lang="en-PL" dirty="0"/>
+          </a:p>
+        </p:txBody>
+      </p:sp>
+    </p:spTree>
+    <p:extLst>
+      <p:ext uri="{BB962C8B-B14F-4D97-AF65-F5344CB8AC3E}">
+        <p14:creationId xmlns:p14="http://schemas.microsoft.com/office/powerpoint/2010/main" val="1092334499"/>
+      </p:ext>
+    </p:extLst>
+  </p:cSld>
+  <p:clrMapOvr>
+    <a:masterClrMapping/>
+  </p:clrMapOvr>
+</p:sld>
+</file>
+
+<file path=ppt/slides/slide32.xml><?xml version="1.0" encoding="utf-8"?>
+<p:sld xmlns:a="http://schemas.openxmlformats.org/drawingml/2006/main" xmlns:r="http://schemas.openxmlformats.org/officeDocument/2006/relationships" xmlns:p="http://schemas.openxmlformats.org/presentationml/2006/main">
+  <p:cSld>
+    <p:spTree>
+      <p:nvGrpSpPr>
+        <p:cNvPr id="1" name=""/>
+        <p:cNvGrpSpPr/>
+        <p:nvPr/>
+      </p:nvGrpSpPr>
+      <p:grpSpPr>
+        <a:xfrm>
+          <a:off x="0" y="0"/>
+          <a:ext cx="0" cy="0"/>
+          <a:chOff x="0" y="0"/>
+          <a:chExt cx="0" cy="0"/>
+        </a:xfrm>
+      </p:grpSpPr>
+      <p:sp>
+        <p:nvSpPr>
+          <p:cNvPr id="2" name="Title 1">
+            <a:extLst>
+              <a:ext uri="{FF2B5EF4-FFF2-40B4-BE49-F238E27FC236}">
+                <a16:creationId xmlns:a16="http://schemas.microsoft.com/office/drawing/2014/main" id="{B8FDB9CF-FF85-DC08-65AF-3D5809393E38}"/>
+              </a:ext>
+            </a:extLst>
+          </p:cNvPr>
+          <p:cNvSpPr>
+            <a:spLocks noGrp="1"/>
+          </p:cNvSpPr>
+          <p:nvPr>
+            <p:ph type="title"/>
+          </p:nvPr>
+        </p:nvSpPr>
+        <p:spPr/>
+        <p:txBody>
+          <a:bodyPr/>
+          <a:lstStyle/>
+          <a:p>
+            <a:r>
+              <a:rPr lang="en-PL" dirty="0"/>
+              <a:t>Terraform</a:t>
+            </a:r>
+          </a:p>
+        </p:txBody>
+      </p:sp>
+      <p:sp>
+        <p:nvSpPr>
+          <p:cNvPr id="3" name="Content Placeholder 2">
+            <a:extLst>
+              <a:ext uri="{FF2B5EF4-FFF2-40B4-BE49-F238E27FC236}">
+                <a16:creationId xmlns:a16="http://schemas.microsoft.com/office/drawing/2014/main" id="{0AD69295-AA95-05AD-6F6C-475DD6758F27}"/>
+              </a:ext>
+            </a:extLst>
+          </p:cNvPr>
+          <p:cNvSpPr>
+            <a:spLocks noGrp="1"/>
+          </p:cNvSpPr>
+          <p:nvPr>
+            <p:ph idx="1"/>
+          </p:nvPr>
+        </p:nvSpPr>
+        <p:spPr/>
+        <p:txBody>
+          <a:bodyPr/>
+          <a:lstStyle/>
+          <a:p>
+            <a:endParaRPr lang="en-PL" dirty="0"/>
+          </a:p>
+        </p:txBody>
+      </p:sp>
+    </p:spTree>
+    <p:extLst>
+      <p:ext uri="{BB962C8B-B14F-4D97-AF65-F5344CB8AC3E}">
+        <p14:creationId xmlns:p14="http://schemas.microsoft.com/office/powerpoint/2010/main" val="1282584039"/>
       </p:ext>
     </p:extLst>
   </p:cSld>

</xml_diff>